<commit_message>
Added slide to explain how to update the Survey123
</commit_message>
<xml_diff>
--- a/documents/user_guides/Hydrologic-Monitoring-Project-Fieldwork-Instructions.pptx
+++ b/documents/user_guides/Hydrologic-Monitoring-Project-Fieldwork-Instructions.pptx
@@ -7,18 +7,19 @@
     <p:sldMasterId id="2147483751" r:id="rId6"/>
   </p:sldMasterIdLst>
   <p:notesMasterIdLst>
-    <p:notesMasterId r:id="rId13"/>
+    <p:notesMasterId r:id="rId14"/>
   </p:notesMasterIdLst>
   <p:handoutMasterIdLst>
-    <p:handoutMasterId r:id="rId14"/>
+    <p:handoutMasterId r:id="rId15"/>
   </p:handoutMasterIdLst>
   <p:sldIdLst>
     <p:sldId id="646" r:id="rId7"/>
     <p:sldId id="648" r:id="rId8"/>
     <p:sldId id="650" r:id="rId9"/>
-    <p:sldId id="647" r:id="rId10"/>
-    <p:sldId id="651" r:id="rId11"/>
-    <p:sldId id="652" r:id="rId12"/>
+    <p:sldId id="653" r:id="rId10"/>
+    <p:sldId id="647" r:id="rId11"/>
+    <p:sldId id="651" r:id="rId12"/>
+    <p:sldId id="652" r:id="rId13"/>
   </p:sldIdLst>
   <p:sldSz cx="12192000" cy="6858000"/>
   <p:notesSz cx="7010400" cy="9296400"/>
@@ -154,7 +155,7 @@
 <file path=ppt/revisionInfo.xml><?xml version="1.0" encoding="utf-8"?>
 <p1510:revInfo xmlns:a="http://schemas.openxmlformats.org/drawingml/2006/main" xmlns:r="http://schemas.openxmlformats.org/officeDocument/2006/relationships" xmlns:p1510="http://schemas.microsoft.com/office/powerpoint/2015/10/main">
   <p1510:revLst>
-    <p1510:client id="{6C0263C6-6730-4B10-9805-88F6F4903195}" v="49" dt="2023-12-18T18:32:20.731"/>
+    <p1510:client id="{FD6F4FBD-F2FB-4552-BE64-5E94CA647F13}" v="3" dt="2024-01-04T16:07:31.266"/>
   </p1510:revLst>
 </p1510:revInfo>
 </file>
@@ -973,6 +974,218 @@
       </pc:sldChg>
     </pc:docChg>
   </pc:docChgLst>
+  <pc:docChgLst>
+    <pc:chgData name="Morgan Miller" userId="4e7f1809-4b84-4880-97da-aa802892274f" providerId="ADAL" clId="{FD6F4FBD-F2FB-4552-BE64-5E94CA647F13}"/>
+    <pc:docChg chg="undo custSel addSld modSld">
+      <pc:chgData name="Morgan Miller" userId="4e7f1809-4b84-4880-97da-aa802892274f" providerId="ADAL" clId="{FD6F4FBD-F2FB-4552-BE64-5E94CA647F13}" dt="2024-01-04T16:16:40.419" v="365" actId="6549"/>
+      <pc:docMkLst>
+        <pc:docMk/>
+      </pc:docMkLst>
+      <pc:sldChg chg="modSp mod">
+        <pc:chgData name="Morgan Miller" userId="4e7f1809-4b84-4880-97da-aa802892274f" providerId="ADAL" clId="{FD6F4FBD-F2FB-4552-BE64-5E94CA647F13}" dt="2024-01-04T16:16:40.419" v="365" actId="6549"/>
+        <pc:sldMkLst>
+          <pc:docMk/>
+          <pc:sldMk cId="3264566659" sldId="647"/>
+        </pc:sldMkLst>
+        <pc:spChg chg="mod">
+          <ac:chgData name="Morgan Miller" userId="4e7f1809-4b84-4880-97da-aa802892274f" providerId="ADAL" clId="{FD6F4FBD-F2FB-4552-BE64-5E94CA647F13}" dt="2024-01-04T16:03:49.374" v="133" actId="255"/>
+          <ac:spMkLst>
+            <pc:docMk/>
+            <pc:sldMk cId="3264566659" sldId="647"/>
+            <ac:spMk id="2" creationId="{0046426E-F6F6-4A7C-9181-8C3090996261}"/>
+          </ac:spMkLst>
+        </pc:spChg>
+        <pc:spChg chg="mod">
+          <ac:chgData name="Morgan Miller" userId="4e7f1809-4b84-4880-97da-aa802892274f" providerId="ADAL" clId="{FD6F4FBD-F2FB-4552-BE64-5E94CA647F13}" dt="2024-01-04T16:16:40.419" v="365" actId="6549"/>
+          <ac:spMkLst>
+            <pc:docMk/>
+            <pc:sldMk cId="3264566659" sldId="647"/>
+            <ac:spMk id="5" creationId="{0E19797D-8A74-F7A2-B94C-8687111B4B42}"/>
+          </ac:spMkLst>
+        </pc:spChg>
+      </pc:sldChg>
+      <pc:sldChg chg="addSp delSp modSp mod">
+        <pc:chgData name="Morgan Miller" userId="4e7f1809-4b84-4880-97da-aa802892274f" providerId="ADAL" clId="{FD6F4FBD-F2FB-4552-BE64-5E94CA647F13}" dt="2024-01-04T16:07:37.401" v="364" actId="1035"/>
+        <pc:sldMkLst>
+          <pc:docMk/>
+          <pc:sldMk cId="3674452478" sldId="650"/>
+        </pc:sldMkLst>
+        <pc:spChg chg="mod">
+          <ac:chgData name="Morgan Miller" userId="4e7f1809-4b84-4880-97da-aa802892274f" providerId="ADAL" clId="{FD6F4FBD-F2FB-4552-BE64-5E94CA647F13}" dt="2024-01-04T16:03:28.849" v="126" actId="255"/>
+          <ac:spMkLst>
+            <pc:docMk/>
+            <pc:sldMk cId="3674452478" sldId="650"/>
+            <ac:spMk id="2" creationId="{0046426E-F6F6-4A7C-9181-8C3090996261}"/>
+          </ac:spMkLst>
+        </pc:spChg>
+        <pc:spChg chg="mod">
+          <ac:chgData name="Morgan Miller" userId="4e7f1809-4b84-4880-97da-aa802892274f" providerId="ADAL" clId="{FD6F4FBD-F2FB-4552-BE64-5E94CA647F13}" dt="2024-01-04T16:07:18.551" v="356" actId="20577"/>
+          <ac:spMkLst>
+            <pc:docMk/>
+            <pc:sldMk cId="3674452478" sldId="650"/>
+            <ac:spMk id="5" creationId="{0E19797D-8A74-F7A2-B94C-8687111B4B42}"/>
+          </ac:spMkLst>
+        </pc:spChg>
+        <pc:spChg chg="mod ord">
+          <ac:chgData name="Morgan Miller" userId="4e7f1809-4b84-4880-97da-aa802892274f" providerId="ADAL" clId="{FD6F4FBD-F2FB-4552-BE64-5E94CA647F13}" dt="2024-01-04T16:05:58.014" v="212" actId="166"/>
+          <ac:spMkLst>
+            <pc:docMk/>
+            <pc:sldMk cId="3674452478" sldId="650"/>
+            <ac:spMk id="15" creationId="{B0670337-5489-658C-CEE1-C7A0D08156CC}"/>
+          </ac:spMkLst>
+        </pc:spChg>
+        <pc:spChg chg="ord">
+          <ac:chgData name="Morgan Miller" userId="4e7f1809-4b84-4880-97da-aa802892274f" providerId="ADAL" clId="{FD6F4FBD-F2FB-4552-BE64-5E94CA647F13}" dt="2024-01-04T16:06:34.584" v="219" actId="166"/>
+          <ac:spMkLst>
+            <pc:docMk/>
+            <pc:sldMk cId="3674452478" sldId="650"/>
+            <ac:spMk id="18" creationId="{48A3387F-16C4-7CE7-2B0C-14B1E5D6A347}"/>
+          </ac:spMkLst>
+        </pc:spChg>
+        <pc:spChg chg="del">
+          <ac:chgData name="Morgan Miller" userId="4e7f1809-4b84-4880-97da-aa802892274f" providerId="ADAL" clId="{FD6F4FBD-F2FB-4552-BE64-5E94CA647F13}" dt="2024-01-04T16:07:21.072" v="357" actId="478"/>
+          <ac:spMkLst>
+            <pc:docMk/>
+            <pc:sldMk cId="3674452478" sldId="650"/>
+            <ac:spMk id="19" creationId="{AC25EEA2-3328-022F-9292-E6DCEC80C66E}"/>
+          </ac:spMkLst>
+        </pc:spChg>
+        <pc:picChg chg="add del">
+          <ac:chgData name="Morgan Miller" userId="4e7f1809-4b84-4880-97da-aa802892274f" providerId="ADAL" clId="{FD6F4FBD-F2FB-4552-BE64-5E94CA647F13}" dt="2024-01-04T16:05:19.283" v="167" actId="478"/>
+          <ac:picMkLst>
+            <pc:docMk/>
+            <pc:sldMk cId="3674452478" sldId="650"/>
+            <ac:picMk id="4" creationId="{771A2214-F4B7-7CF5-6FF1-A09A87015F29}"/>
+          </ac:picMkLst>
+        </pc:picChg>
+        <pc:picChg chg="del">
+          <ac:chgData name="Morgan Miller" userId="4e7f1809-4b84-4880-97da-aa802892274f" providerId="ADAL" clId="{FD6F4FBD-F2FB-4552-BE64-5E94CA647F13}" dt="2024-01-04T15:50:10.917" v="1" actId="478"/>
+          <ac:picMkLst>
+            <pc:docMk/>
+            <pc:sldMk cId="3674452478" sldId="650"/>
+            <ac:picMk id="7" creationId="{8C9AFDAF-9A31-4851-893E-EFD4979BECD7}"/>
+          </ac:picMkLst>
+        </pc:picChg>
+        <pc:picChg chg="add mod">
+          <ac:chgData name="Morgan Miller" userId="4e7f1809-4b84-4880-97da-aa802892274f" providerId="ADAL" clId="{FD6F4FBD-F2FB-4552-BE64-5E94CA647F13}" dt="2024-01-04T16:05:59.490" v="213" actId="1076"/>
+          <ac:picMkLst>
+            <pc:docMk/>
+            <pc:sldMk cId="3674452478" sldId="650"/>
+            <ac:picMk id="9" creationId="{6EF0F0A1-4D33-885D-BCF2-E6DCBDED58EA}"/>
+          </ac:picMkLst>
+        </pc:picChg>
+        <pc:picChg chg="add mod">
+          <ac:chgData name="Morgan Miller" userId="4e7f1809-4b84-4880-97da-aa802892274f" providerId="ADAL" clId="{FD6F4FBD-F2FB-4552-BE64-5E94CA647F13}" dt="2024-01-04T16:06:30.256" v="218" actId="1076"/>
+          <ac:picMkLst>
+            <pc:docMk/>
+            <pc:sldMk cId="3674452478" sldId="650"/>
+            <ac:picMk id="11" creationId="{7F1C5D2B-F6E5-5727-AB73-3C882F7CC23A}"/>
+          </ac:picMkLst>
+        </pc:picChg>
+        <pc:picChg chg="del">
+          <ac:chgData name="Morgan Miller" userId="4e7f1809-4b84-4880-97da-aa802892274f" providerId="ADAL" clId="{FD6F4FBD-F2FB-4552-BE64-5E94CA647F13}" dt="2024-01-04T15:50:11.392" v="2" actId="478"/>
+          <ac:picMkLst>
+            <pc:docMk/>
+            <pc:sldMk cId="3674452478" sldId="650"/>
+            <ac:picMk id="12" creationId="{EE157677-4625-4D89-848A-F258B2482B38}"/>
+          </ac:picMkLst>
+        </pc:picChg>
+        <pc:picChg chg="del">
+          <ac:chgData name="Morgan Miller" userId="4e7f1809-4b84-4880-97da-aa802892274f" providerId="ADAL" clId="{FD6F4FBD-F2FB-4552-BE64-5E94CA647F13}" dt="2024-01-04T15:50:12.607" v="4" actId="478"/>
+          <ac:picMkLst>
+            <pc:docMk/>
+            <pc:sldMk cId="3674452478" sldId="650"/>
+            <ac:picMk id="13" creationId="{8BB8562B-20E5-7F8C-5B4C-585A8ABAE0B3}"/>
+          </ac:picMkLst>
+        </pc:picChg>
+        <pc:picChg chg="del">
+          <ac:chgData name="Morgan Miller" userId="4e7f1809-4b84-4880-97da-aa802892274f" providerId="ADAL" clId="{FD6F4FBD-F2FB-4552-BE64-5E94CA647F13}" dt="2024-01-04T15:50:12.041" v="3" actId="478"/>
+          <ac:picMkLst>
+            <pc:docMk/>
+            <pc:sldMk cId="3674452478" sldId="650"/>
+            <ac:picMk id="16" creationId="{A8B5B50D-1BAA-4E04-92DE-D5B47F5D4C58}"/>
+          </ac:picMkLst>
+        </pc:picChg>
+        <pc:cxnChg chg="del">
+          <ac:chgData name="Morgan Miller" userId="4e7f1809-4b84-4880-97da-aa802892274f" providerId="ADAL" clId="{FD6F4FBD-F2FB-4552-BE64-5E94CA647F13}" dt="2024-01-04T15:50:13.647" v="5" actId="478"/>
+          <ac:cxnSpMkLst>
+            <pc:docMk/>
+            <pc:sldMk cId="3674452478" sldId="650"/>
+            <ac:cxnSpMk id="14" creationId="{121DD424-5744-4119-999A-9C2099F3AB08}"/>
+          </ac:cxnSpMkLst>
+        </pc:cxnChg>
+        <pc:cxnChg chg="del">
+          <ac:chgData name="Morgan Miller" userId="4e7f1809-4b84-4880-97da-aa802892274f" providerId="ADAL" clId="{FD6F4FBD-F2FB-4552-BE64-5E94CA647F13}" dt="2024-01-04T15:50:14.690" v="6" actId="478"/>
+          <ac:cxnSpMkLst>
+            <pc:docMk/>
+            <pc:sldMk cId="3674452478" sldId="650"/>
+            <ac:cxnSpMk id="17" creationId="{0AD74C9E-E096-4739-896C-DCFCEFFFAD65}"/>
+          </ac:cxnSpMkLst>
+        </pc:cxnChg>
+        <pc:cxnChg chg="add mod">
+          <ac:chgData name="Morgan Miller" userId="4e7f1809-4b84-4880-97da-aa802892274f" providerId="ADAL" clId="{FD6F4FBD-F2FB-4552-BE64-5E94CA647F13}" dt="2024-01-04T16:07:30.363" v="359" actId="1076"/>
+          <ac:cxnSpMkLst>
+            <pc:docMk/>
+            <pc:sldMk cId="3674452478" sldId="650"/>
+            <ac:cxnSpMk id="20" creationId="{768EA832-15A9-87B2-25EE-0CECF812123D}"/>
+          </ac:cxnSpMkLst>
+        </pc:cxnChg>
+        <pc:cxnChg chg="add mod">
+          <ac:chgData name="Morgan Miller" userId="4e7f1809-4b84-4880-97da-aa802892274f" providerId="ADAL" clId="{FD6F4FBD-F2FB-4552-BE64-5E94CA647F13}" dt="2024-01-04T16:07:37.401" v="364" actId="1035"/>
+          <ac:cxnSpMkLst>
+            <pc:docMk/>
+            <pc:sldMk cId="3674452478" sldId="650"/>
+            <ac:cxnSpMk id="21" creationId="{28336178-F018-4BDC-5E4B-709DB0C3270E}"/>
+          </ac:cxnSpMkLst>
+        </pc:cxnChg>
+      </pc:sldChg>
+      <pc:sldChg chg="modSp mod">
+        <pc:chgData name="Morgan Miller" userId="4e7f1809-4b84-4880-97da-aa802892274f" providerId="ADAL" clId="{FD6F4FBD-F2FB-4552-BE64-5E94CA647F13}" dt="2024-01-04T16:04:02.576" v="149" actId="255"/>
+        <pc:sldMkLst>
+          <pc:docMk/>
+          <pc:sldMk cId="1781803377" sldId="651"/>
+        </pc:sldMkLst>
+        <pc:spChg chg="mod">
+          <ac:chgData name="Morgan Miller" userId="4e7f1809-4b84-4880-97da-aa802892274f" providerId="ADAL" clId="{FD6F4FBD-F2FB-4552-BE64-5E94CA647F13}" dt="2024-01-04T16:04:02.576" v="149" actId="255"/>
+          <ac:spMkLst>
+            <pc:docMk/>
+            <pc:sldMk cId="1781803377" sldId="651"/>
+            <ac:spMk id="2" creationId="{0046426E-F6F6-4A7C-9181-8C3090996261}"/>
+          </ac:spMkLst>
+        </pc:spChg>
+      </pc:sldChg>
+      <pc:sldChg chg="modSp mod">
+        <pc:chgData name="Morgan Miller" userId="4e7f1809-4b84-4880-97da-aa802892274f" providerId="ADAL" clId="{FD6F4FBD-F2FB-4552-BE64-5E94CA647F13}" dt="2024-01-04T16:04:19.714" v="165" actId="255"/>
+        <pc:sldMkLst>
+          <pc:docMk/>
+          <pc:sldMk cId="3152476767" sldId="652"/>
+        </pc:sldMkLst>
+        <pc:spChg chg="mod">
+          <ac:chgData name="Morgan Miller" userId="4e7f1809-4b84-4880-97da-aa802892274f" providerId="ADAL" clId="{FD6F4FBD-F2FB-4552-BE64-5E94CA647F13}" dt="2024-01-04T16:04:19.714" v="165" actId="255"/>
+          <ac:spMkLst>
+            <pc:docMk/>
+            <pc:sldMk cId="3152476767" sldId="652"/>
+            <ac:spMk id="2" creationId="{0046426E-F6F6-4A7C-9181-8C3090996261}"/>
+          </ac:spMkLst>
+        </pc:spChg>
+      </pc:sldChg>
+      <pc:sldChg chg="modSp add mod">
+        <pc:chgData name="Morgan Miller" userId="4e7f1809-4b84-4880-97da-aa802892274f" providerId="ADAL" clId="{FD6F4FBD-F2FB-4552-BE64-5E94CA647F13}" dt="2024-01-04T16:03:38.247" v="129" actId="255"/>
+        <pc:sldMkLst>
+          <pc:docMk/>
+          <pc:sldMk cId="1372990651" sldId="653"/>
+        </pc:sldMkLst>
+        <pc:spChg chg="mod">
+          <ac:chgData name="Morgan Miller" userId="4e7f1809-4b84-4880-97da-aa802892274f" providerId="ADAL" clId="{FD6F4FBD-F2FB-4552-BE64-5E94CA647F13}" dt="2024-01-04T16:03:38.247" v="129" actId="255"/>
+          <ac:spMkLst>
+            <pc:docMk/>
+            <pc:sldMk cId="1372990651" sldId="653"/>
+            <ac:spMk id="2" creationId="{0046426E-F6F6-4A7C-9181-8C3090996261}"/>
+          </ac:spMkLst>
+        </pc:spChg>
+      </pc:sldChg>
+    </pc:docChg>
+  </pc:docChgLst>
 </pc:chgInfo>
 </file>
 
@@ -1070,7 +1283,7 @@
           <a:p>
             <a:fld id="{C17F2C1D-F243-42AB-ADF2-E7CB4E04900E}" type="datetimeFigureOut">
               <a:rPr lang="en-US" smtClean="0"/>
-              <a:t>12/18/2023</a:t>
+              <a:t>1/4/2024</a:t>
             </a:fld>
             <a:endParaRPr lang="en-US"/>
           </a:p>
@@ -1247,7 +1460,7 @@
           <a:p>
             <a:fld id="{020CE34E-5667-4A32-A6BA-10C7A552BC63}" type="datetimeFigureOut">
               <a:rPr lang="en-US" smtClean="0"/>
-              <a:t>12/18/2023</a:t>
+              <a:t>1/4/2024</a:t>
             </a:fld>
             <a:endParaRPr lang="en-US"/>
           </a:p>
@@ -7659,7 +7872,7 @@
           <a:p>
             <a:fld id="{6EC91B51-25EE-0147-9293-37E16A70024E}" type="datetime1">
               <a:rPr lang="en-US" smtClean="0"/>
-              <a:t>12/18/2023</a:t>
+              <a:t>1/4/2024</a:t>
             </a:fld>
             <a:endParaRPr lang="en-US"/>
           </a:p>
@@ -7905,7 +8118,7 @@
           <a:p>
             <a:fld id="{06DEFD86-78C4-084A-B0B5-04A7A3431B39}" type="datetime1">
               <a:rPr lang="en-US" smtClean="0"/>
-              <a:t>12/18/2023</a:t>
+              <a:t>1/4/2024</a:t>
             </a:fld>
             <a:endParaRPr lang="en-US"/>
           </a:p>
@@ -8202,7 +8415,7 @@
           <a:p>
             <a:fld id="{7D5DF95B-0B80-6A4D-A813-6F9D9F38EBA2}" type="datetime1">
               <a:rPr lang="en-US" smtClean="0"/>
-              <a:t>12/18/2023</a:t>
+              <a:t>1/4/2024</a:t>
             </a:fld>
             <a:endParaRPr lang="en-US"/>
           </a:p>
@@ -9450,7 +9663,7 @@
           <a:p>
             <a:fld id="{14E55AC9-5819-304B-AB8A-EC561A98EE59}" type="datetime1">
               <a:rPr lang="en-US" smtClean="0"/>
-              <a:t>12/18/2023</a:t>
+              <a:t>1/4/2024</a:t>
             </a:fld>
             <a:endParaRPr lang="en-US"/>
           </a:p>
@@ -9926,7 +10139,7 @@
           <a:p>
             <a:fld id="{9874F111-1245-FB4C-ACB7-129F68E66232}" type="datetime1">
               <a:rPr lang="en-US" smtClean="0"/>
-              <a:t>12/18/2023</a:t>
+              <a:t>1/4/2024</a:t>
             </a:fld>
             <a:endParaRPr lang="en-US"/>
           </a:p>
@@ -10101,7 +10314,7 @@
           <a:p>
             <a:fld id="{380C21C6-642C-6F4C-B53C-06F3F35CEF14}" type="datetime1">
               <a:rPr lang="en-US" smtClean="0"/>
-              <a:t>12/18/2023</a:t>
+              <a:t>1/4/2024</a:t>
             </a:fld>
             <a:endParaRPr lang="en-US"/>
           </a:p>
@@ -10280,7 +10493,7 @@
           <a:p>
             <a:fld id="{8A0E3BE2-FFFE-0B46-AE5A-CBB4C5FEC6FC}" type="datetime1">
               <a:rPr lang="en-US" smtClean="0"/>
-              <a:t>12/18/2023</a:t>
+              <a:t>1/4/2024</a:t>
             </a:fld>
             <a:endParaRPr lang="en-US"/>
           </a:p>
@@ -10433,7 +10646,7 @@
           <a:p>
             <a:fld id="{8861994C-B8B3-A740-949B-C8D716F26A7F}" type="datetime1">
               <a:rPr lang="en-US" smtClean="0"/>
-              <a:t>12/18/2023</a:t>
+              <a:t>1/4/2024</a:t>
             </a:fld>
             <a:endParaRPr lang="en-US"/>
           </a:p>
@@ -11170,7 +11383,7 @@
           <a:p>
             <a:fld id="{CF17F20F-8413-1548-BF61-558511100DB7}" type="datetime1">
               <a:rPr lang="en-US" smtClean="0"/>
-              <a:t>12/18/2023</a:t>
+              <a:t>1/4/2024</a:t>
             </a:fld>
             <a:endParaRPr lang="en-US"/>
           </a:p>
@@ -11854,7 +12067,7 @@
           <a:p>
             <a:fld id="{5D6FA6FB-FDD3-A446-B5AE-30BBE73852D8}" type="datetime1">
               <a:rPr lang="en-US" smtClean="0"/>
-              <a:t>12/18/2023</a:t>
+              <a:t>1/4/2024</a:t>
             </a:fld>
             <a:endParaRPr lang="en-US"/>
           </a:p>
@@ -12048,7 +12261,7 @@
           <a:p>
             <a:fld id="{063D0726-017F-9249-8B2E-2A4DDB444ED8}" type="datetime1">
               <a:rPr lang="en-US" smtClean="0"/>
-              <a:t>12/18/2023</a:t>
+              <a:t>1/4/2024</a:t>
             </a:fld>
             <a:endParaRPr lang="en-US"/>
           </a:p>
@@ -12305,7 +12518,7 @@
           <a:p>
             <a:fld id="{1D77C214-390A-F944-BF27-73F37F4360F9}" type="datetime1">
               <a:rPr lang="en-US" smtClean="0"/>
-              <a:t>12/18/2023</a:t>
+              <a:t>1/4/2024</a:t>
             </a:fld>
             <a:endParaRPr lang="en-US"/>
           </a:p>
@@ -12561,7 +12774,7 @@
           <a:p>
             <a:fld id="{76225C2B-15EC-3348-B6CD-75D75F51F610}" type="datetime1">
               <a:rPr lang="en-US" smtClean="0"/>
-              <a:t>12/18/2023</a:t>
+              <a:t>1/4/2024</a:t>
             </a:fld>
             <a:endParaRPr lang="en-US"/>
           </a:p>
@@ -14687,7 +14900,7 @@
           <a:p>
             <a:fld id="{6EC91B51-25EE-0147-9293-37E16A70024E}" type="datetime1">
               <a:rPr lang="en-US" smtClean="0"/>
-              <a:t>12/18/2023</a:t>
+              <a:t>1/4/2024</a:t>
             </a:fld>
             <a:endParaRPr lang="en-US"/>
           </a:p>
@@ -14933,7 +15146,7 @@
           <a:p>
             <a:fld id="{06DEFD86-78C4-084A-B0B5-04A7A3431B39}" type="datetime1">
               <a:rPr lang="en-US" smtClean="0"/>
-              <a:t>12/18/2023</a:t>
+              <a:t>1/4/2024</a:t>
             </a:fld>
             <a:endParaRPr lang="en-US"/>
           </a:p>
@@ -15230,7 +15443,7 @@
           <a:p>
             <a:fld id="{7D5DF95B-0B80-6A4D-A813-6F9D9F38EBA2}" type="datetime1">
               <a:rPr lang="en-US" smtClean="0"/>
-              <a:t>12/18/2023</a:t>
+              <a:t>1/4/2024</a:t>
             </a:fld>
             <a:endParaRPr lang="en-US"/>
           </a:p>
@@ -15559,7 +15772,7 @@
           <a:p>
             <a:fld id="{14E55AC9-5819-304B-AB8A-EC561A98EE59}" type="datetime1">
               <a:rPr lang="en-US" smtClean="0"/>
-              <a:t>12/18/2023</a:t>
+              <a:t>1/4/2024</a:t>
             </a:fld>
             <a:endParaRPr lang="en-US"/>
           </a:p>
@@ -16035,7 +16248,7 @@
           <a:p>
             <a:fld id="{9874F111-1245-FB4C-ACB7-129F68E66232}" type="datetime1">
               <a:rPr lang="en-US" smtClean="0"/>
-              <a:t>12/18/2023</a:t>
+              <a:t>1/4/2024</a:t>
             </a:fld>
             <a:endParaRPr lang="en-US"/>
           </a:p>
@@ -16210,7 +16423,7 @@
           <a:p>
             <a:fld id="{380C21C6-642C-6F4C-B53C-06F3F35CEF14}" type="datetime1">
               <a:rPr lang="en-US" smtClean="0"/>
-              <a:t>12/18/2023</a:t>
+              <a:t>1/4/2024</a:t>
             </a:fld>
             <a:endParaRPr lang="en-US"/>
           </a:p>
@@ -16389,7 +16602,7 @@
           <a:p>
             <a:fld id="{8A0E3BE2-FFFE-0B46-AE5A-CBB4C5FEC6FC}" type="datetime1">
               <a:rPr lang="en-US" smtClean="0"/>
-              <a:t>12/18/2023</a:t>
+              <a:t>1/4/2024</a:t>
             </a:fld>
             <a:endParaRPr lang="en-US"/>
           </a:p>
@@ -16542,7 +16755,7 @@
           <a:p>
             <a:fld id="{8861994C-B8B3-A740-949B-C8D716F26A7F}" type="datetime1">
               <a:rPr lang="en-US" smtClean="0"/>
-              <a:t>12/18/2023</a:t>
+              <a:t>1/4/2024</a:t>
             </a:fld>
             <a:endParaRPr lang="en-US"/>
           </a:p>
@@ -17279,7 +17492,7 @@
           <a:p>
             <a:fld id="{CF17F20F-8413-1548-BF61-558511100DB7}" type="datetime1">
               <a:rPr lang="en-US" smtClean="0"/>
-              <a:t>12/18/2023</a:t>
+              <a:t>1/4/2024</a:t>
             </a:fld>
             <a:endParaRPr lang="en-US"/>
           </a:p>
@@ -18337,7 +18550,7 @@
           <a:p>
             <a:fld id="{5D6FA6FB-FDD3-A446-B5AE-30BBE73852D8}" type="datetime1">
               <a:rPr lang="en-US" smtClean="0"/>
-              <a:t>12/18/2023</a:t>
+              <a:t>1/4/2024</a:t>
             </a:fld>
             <a:endParaRPr lang="en-US"/>
           </a:p>
@@ -18531,7 +18744,7 @@
           <a:p>
             <a:fld id="{063D0726-017F-9249-8B2E-2A4DDB444ED8}" type="datetime1">
               <a:rPr lang="en-US" smtClean="0"/>
-              <a:t>12/18/2023</a:t>
+              <a:t>1/4/2024</a:t>
             </a:fld>
             <a:endParaRPr lang="en-US"/>
           </a:p>
@@ -18788,7 +19001,7 @@
           <a:p>
             <a:fld id="{1D77C214-390A-F944-BF27-73F37F4360F9}" type="datetime1">
               <a:rPr lang="en-US" smtClean="0"/>
-              <a:t>12/18/2023</a:t>
+              <a:t>1/4/2024</a:t>
             </a:fld>
             <a:endParaRPr lang="en-US"/>
           </a:p>
@@ -19044,7 +19257,7 @@
           <a:p>
             <a:fld id="{76225C2B-15EC-3348-B6CD-75D75F51F610}" type="datetime1">
               <a:rPr lang="en-US" smtClean="0"/>
-              <a:t>12/18/2023</a:t>
+              <a:t>1/4/2024</a:t>
             </a:fld>
             <a:endParaRPr lang="en-US"/>
           </a:p>
@@ -25117,7 +25330,7 @@
           <a:p>
             <a:fld id="{9CE7E69C-4D79-BB49-9350-1FEE210EB4F7}" type="datetime1">
               <a:rPr lang="en-US" smtClean="0"/>
-              <a:t>12/18/2023</a:t>
+              <a:t>1/4/2024</a:t>
             </a:fld>
             <a:endParaRPr lang="en-US"/>
           </a:p>
@@ -25734,7 +25947,7 @@
           <a:p>
             <a:fld id="{9CE7E69C-4D79-BB49-9350-1FEE210EB4F7}" type="datetime1">
               <a:rPr lang="en-US" smtClean="0"/>
-              <a:t>12/18/2023</a:t>
+              <a:t>1/4/2024</a:t>
             </a:fld>
             <a:endParaRPr lang="en-US"/>
           </a:p>
@@ -26773,36 +26986,6 @@
           <a:chExt cx="0" cy="0"/>
         </a:xfrm>
       </p:grpSpPr>
-      <p:pic>
-        <p:nvPicPr>
-          <p:cNvPr id="7" name="Picture 6">
-            <a:extLst>
-              <a:ext uri="{FF2B5EF4-FFF2-40B4-BE49-F238E27FC236}">
-                <a16:creationId xmlns:a16="http://schemas.microsoft.com/office/drawing/2014/main" id="{8C9AFDAF-9A31-4851-893E-EFD4979BECD7}"/>
-              </a:ext>
-            </a:extLst>
-          </p:cNvPr>
-          <p:cNvPicPr>
-            <a:picLocks noChangeAspect="1"/>
-          </p:cNvPicPr>
-          <p:nvPr/>
-        </p:nvPicPr>
-        <p:blipFill>
-          <a:blip r:embed="rId2"/>
-          <a:stretch>
-            <a:fillRect/>
-          </a:stretch>
-        </p:blipFill>
-        <p:spPr>
-          <a:xfrm>
-            <a:off x="466948" y="4529812"/>
-            <a:ext cx="2738863" cy="1945921"/>
-          </a:xfrm>
-          <a:prstGeom prst="rect">
-            <a:avLst/>
-          </a:prstGeom>
-        </p:spPr>
-      </p:pic>
       <p:sp>
         <p:nvSpPr>
           <p:cNvPr id="2" name="Title 1">
@@ -26831,9 +27014,13 @@
           <a:p>
             <a:r>
               <a:rPr lang="en-US" sz="4400" dirty="0"/>
-              <a:t>Load Locations Prior to Fieldwork</a:t>
+              <a:t>Update Survey123 </a:t>
             </a:r>
-            <a:endParaRPr lang="en-US" sz="4400" dirty="0">
+            <a:r>
+              <a:rPr lang="en-US" sz="3200" dirty="0"/>
+              <a:t>(Prior to Fieldwork)</a:t>
+            </a:r>
+            <a:endParaRPr lang="en-US" sz="3200" dirty="0">
               <a:solidFill>
                 <a:schemeClr val="accent3">
                   <a:lumMod val="60000"/>
@@ -27116,7 +27303,7 @@
                 <a:ea typeface="+mn-lt"/>
                 <a:cs typeface="Arial" panose="020B0604020202020204" pitchFamily="34" charset="0"/>
               </a:rPr>
-              <a:t>While you still have internet connection in the office the fieldworker will be required to load the locations in Survey123</a:t>
+              <a:t>While you still have internet connection in the office the fieldworker will be required to update the Survey123 to the l</a:t>
             </a:r>
           </a:p>
           <a:p>
@@ -27150,7 +27337,7 @@
                 <a:ea typeface="+mn-lt"/>
                 <a:cs typeface="Arial" panose="020B0604020202020204" pitchFamily="34" charset="0"/>
               </a:rPr>
-              <a:t>Click on the ‘NW Florida Hydrologic Field Form’</a:t>
+              <a:t>Click on ‘Updates available’</a:t>
             </a:r>
           </a:p>
           <a:p>
@@ -27167,24 +27354,7 @@
                 <a:ea typeface="+mn-lt"/>
                 <a:cs typeface="Arial" panose="020B0604020202020204" pitchFamily="34" charset="0"/>
               </a:rPr>
-              <a:t>Click on ‘Inbox’</a:t>
-            </a:r>
-          </a:p>
-          <a:p>
-            <a:pPr marL="457200" indent="-457200">
-              <a:spcAft>
-                <a:spcPts val="600"/>
-              </a:spcAft>
-              <a:buFont typeface="Arial" panose="020B0604020202020204" pitchFamily="34" charset="0"/>
-              <a:buAutoNum type="arabicPeriod"/>
-            </a:pPr>
-            <a:r>
-              <a:rPr lang="en-US" sz="1800" dirty="0">
-                <a:latin typeface="Arial" panose="020B0604020202020204" pitchFamily="34" charset="0"/>
-                <a:ea typeface="+mn-lt"/>
-                <a:cs typeface="Arial" panose="020B0604020202020204" pitchFamily="34" charset="0"/>
-              </a:rPr>
-              <a:t>Select ‘Refresh’</a:t>
+              <a:t>Click on refresh button or ‘Download updates’ to get the latest version of the survey</a:t>
             </a:r>
           </a:p>
           <a:p>
@@ -27199,10 +27369,95 @@
       </p:sp>
       <p:pic>
         <p:nvPicPr>
-          <p:cNvPr id="12" name="Picture 11">
+          <p:cNvPr id="9" name="Picture 8">
             <a:extLst>
               <a:ext uri="{FF2B5EF4-FFF2-40B4-BE49-F238E27FC236}">
-                <a16:creationId xmlns:a16="http://schemas.microsoft.com/office/drawing/2014/main" id="{EE157677-4625-4D89-848A-F258B2482B38}"/>
+                <a16:creationId xmlns:a16="http://schemas.microsoft.com/office/drawing/2014/main" id="{6EF0F0A1-4D33-885D-BCF2-E6DCBDED58EA}"/>
+              </a:ext>
+            </a:extLst>
+          </p:cNvPr>
+          <p:cNvPicPr>
+            <a:picLocks noChangeAspect="1"/>
+          </p:cNvPicPr>
+          <p:nvPr/>
+        </p:nvPicPr>
+        <p:blipFill>
+          <a:blip r:embed="rId2"/>
+          <a:stretch>
+            <a:fillRect/>
+          </a:stretch>
+        </p:blipFill>
+        <p:spPr>
+          <a:xfrm>
+            <a:off x="810924" y="3814472"/>
+            <a:ext cx="2299669" cy="2714363"/>
+          </a:xfrm>
+          <a:prstGeom prst="rect">
+            <a:avLst/>
+          </a:prstGeom>
+        </p:spPr>
+      </p:pic>
+      <p:sp>
+        <p:nvSpPr>
+          <p:cNvPr id="15" name="Flowchart: Connector 14">
+            <a:extLst>
+              <a:ext uri="{FF2B5EF4-FFF2-40B4-BE49-F238E27FC236}">
+                <a16:creationId xmlns:a16="http://schemas.microsoft.com/office/drawing/2014/main" id="{B0670337-5489-658C-CEE1-C7A0D08156CC}"/>
+              </a:ext>
+            </a:extLst>
+          </p:cNvPr>
+          <p:cNvSpPr/>
+          <p:nvPr/>
+        </p:nvSpPr>
+        <p:spPr>
+          <a:xfrm>
+            <a:off x="634127" y="3637675"/>
+            <a:ext cx="353595" cy="353595"/>
+          </a:xfrm>
+          <a:prstGeom prst="flowChartConnector">
+            <a:avLst/>
+          </a:prstGeom>
+          <a:solidFill>
+            <a:srgbClr val="FF0000"/>
+          </a:solidFill>
+        </p:spPr>
+        <p:style>
+          <a:lnRef idx="2">
+            <a:schemeClr val="accent1">
+              <a:shade val="15000"/>
+            </a:schemeClr>
+          </a:lnRef>
+          <a:fillRef idx="1">
+            <a:schemeClr val="accent1"/>
+          </a:fillRef>
+          <a:effectRef idx="0">
+            <a:schemeClr val="accent1"/>
+          </a:effectRef>
+          <a:fontRef idx="minor">
+            <a:schemeClr val="lt1"/>
+          </a:fontRef>
+        </p:style>
+        <p:txBody>
+          <a:bodyPr rtlCol="0" anchor="ctr"/>
+          <a:lstStyle/>
+          <a:p>
+            <a:pPr algn="ctr"/>
+            <a:r>
+              <a:rPr lang="en-US" dirty="0">
+                <a:latin typeface="Arial" panose="020B0604020202020204" pitchFamily="34" charset="0"/>
+                <a:cs typeface="Arial" panose="020B0604020202020204" pitchFamily="34" charset="0"/>
+              </a:rPr>
+              <a:t>2</a:t>
+            </a:r>
+          </a:p>
+        </p:txBody>
+      </p:sp>
+      <p:pic>
+        <p:nvPicPr>
+          <p:cNvPr id="11" name="Picture 10">
+            <a:extLst>
+              <a:ext uri="{FF2B5EF4-FFF2-40B4-BE49-F238E27FC236}">
+                <a16:creationId xmlns:a16="http://schemas.microsoft.com/office/drawing/2014/main" id="{7F1C5D2B-F6E5-5727-AB73-3C882F7CC23A}"/>
               </a:ext>
             </a:extLst>
           </p:cNvPr>
@@ -27219,20 +27474,75 @@
         </p:blipFill>
         <p:spPr>
           <a:xfrm>
-            <a:off x="3713783" y="3926837"/>
-            <a:ext cx="2106769" cy="2650663"/>
+            <a:off x="3882058" y="3814471"/>
+            <a:ext cx="2140543" cy="2714364"/>
           </a:xfrm>
           <a:prstGeom prst="rect">
             <a:avLst/>
           </a:prstGeom>
         </p:spPr>
       </p:pic>
+      <p:sp>
+        <p:nvSpPr>
+          <p:cNvPr id="18" name="Flowchart: Connector 17">
+            <a:extLst>
+              <a:ext uri="{FF2B5EF4-FFF2-40B4-BE49-F238E27FC236}">
+                <a16:creationId xmlns:a16="http://schemas.microsoft.com/office/drawing/2014/main" id="{48A3387F-16C4-7CE7-2B0C-14B1E5D6A347}"/>
+              </a:ext>
+            </a:extLst>
+          </p:cNvPr>
+          <p:cNvSpPr/>
+          <p:nvPr/>
+        </p:nvSpPr>
+        <p:spPr>
+          <a:xfrm>
+            <a:off x="3536985" y="3750039"/>
+            <a:ext cx="353595" cy="353595"/>
+          </a:xfrm>
+          <a:prstGeom prst="flowChartConnector">
+            <a:avLst/>
+          </a:prstGeom>
+          <a:solidFill>
+            <a:srgbClr val="FF0000"/>
+          </a:solidFill>
+        </p:spPr>
+        <p:style>
+          <a:lnRef idx="2">
+            <a:schemeClr val="accent1">
+              <a:shade val="15000"/>
+            </a:schemeClr>
+          </a:lnRef>
+          <a:fillRef idx="1">
+            <a:schemeClr val="accent1"/>
+          </a:fillRef>
+          <a:effectRef idx="0">
+            <a:schemeClr val="accent1"/>
+          </a:effectRef>
+          <a:fontRef idx="minor">
+            <a:schemeClr val="lt1"/>
+          </a:fontRef>
+        </p:style>
+        <p:txBody>
+          <a:bodyPr rtlCol="0" anchor="ctr"/>
+          <a:lstStyle/>
+          <a:p>
+            <a:pPr algn="ctr"/>
+            <a:r>
+              <a:rPr lang="en-US" dirty="0">
+                <a:latin typeface="Arial" panose="020B0604020202020204" pitchFamily="34" charset="0"/>
+                <a:cs typeface="Arial" panose="020B0604020202020204" pitchFamily="34" charset="0"/>
+              </a:rPr>
+              <a:t>3</a:t>
+            </a:r>
+          </a:p>
+        </p:txBody>
+      </p:sp>
       <p:cxnSp>
         <p:nvCxnSpPr>
-          <p:cNvPr id="14" name="Straight Arrow Connector 13">
+          <p:cNvPr id="20" name="Straight Arrow Connector 19">
             <a:extLst>
               <a:ext uri="{FF2B5EF4-FFF2-40B4-BE49-F238E27FC236}">
-                <a16:creationId xmlns:a16="http://schemas.microsoft.com/office/drawing/2014/main" id="{121DD424-5744-4119-999A-9C2099F3AB08}"/>
+                <a16:creationId xmlns:a16="http://schemas.microsoft.com/office/drawing/2014/main" id="{768EA832-15A9-87B2-25EE-0CECF812123D}"/>
               </a:ext>
             </a:extLst>
           </p:cNvPr>
@@ -27243,7 +27553,7 @@
         </p:nvCxnSpPr>
         <p:spPr>
           <a:xfrm flipH="1">
-            <a:off x="5500817" y="6441844"/>
+            <a:off x="5892702" y="4930285"/>
             <a:ext cx="639469" cy="0"/>
           </a:xfrm>
           <a:prstGeom prst="straightConnector1">
@@ -27271,42 +27581,12 @@
           </a:fontRef>
         </p:style>
       </p:cxnSp>
-      <p:pic>
-        <p:nvPicPr>
-          <p:cNvPr id="16" name="Picture 15">
+      <p:cxnSp>
+        <p:nvCxnSpPr>
+          <p:cNvPr id="21" name="Straight Arrow Connector 20">
             <a:extLst>
               <a:ext uri="{FF2B5EF4-FFF2-40B4-BE49-F238E27FC236}">
-                <a16:creationId xmlns:a16="http://schemas.microsoft.com/office/drawing/2014/main" id="{A8B5B50D-1BAA-4E04-92DE-D5B47F5D4C58}"/>
-              </a:ext>
-            </a:extLst>
-          </p:cNvPr>
-          <p:cNvPicPr>
-            <a:picLocks noChangeAspect="1"/>
-          </p:cNvPicPr>
-          <p:nvPr/>
-        </p:nvPicPr>
-        <p:blipFill>
-          <a:blip r:embed="rId4"/>
-          <a:stretch>
-            <a:fillRect/>
-          </a:stretch>
-        </p:blipFill>
-        <p:spPr>
-          <a:xfrm>
-            <a:off x="6858570" y="4054348"/>
-            <a:ext cx="1901618" cy="2524510"/>
-          </a:xfrm>
-          <a:prstGeom prst="rect">
-            <a:avLst/>
-          </a:prstGeom>
-        </p:spPr>
-      </p:pic>
-      <p:cxnSp>
-        <p:nvCxnSpPr>
-          <p:cNvPr id="17" name="Straight Arrow Connector 16">
-            <a:extLst>
-              <a:ext uri="{FF2B5EF4-FFF2-40B4-BE49-F238E27FC236}">
-                <a16:creationId xmlns:a16="http://schemas.microsoft.com/office/drawing/2014/main" id="{0AD74C9E-E096-4739-896C-DCFCEFFFAD65}"/>
+                <a16:creationId xmlns:a16="http://schemas.microsoft.com/office/drawing/2014/main" id="{28336178-F018-4BDC-5E4B-709DB0C3270E}"/>
               </a:ext>
             </a:extLst>
           </p:cNvPr>
@@ -27317,8 +27597,8 @@
         </p:nvCxnSpPr>
         <p:spPr>
           <a:xfrm flipH="1">
-            <a:off x="8613393" y="6462461"/>
-            <a:ext cx="474623" cy="0"/>
+            <a:off x="5561886" y="6385859"/>
+            <a:ext cx="639469" cy="0"/>
           </a:xfrm>
           <a:prstGeom prst="straightConnector1">
             <a:avLst/>
@@ -27345,201 +27625,6 @@
           </a:fontRef>
         </p:style>
       </p:cxnSp>
-      <p:pic>
-        <p:nvPicPr>
-          <p:cNvPr id="13" name="Picture 12">
-            <a:extLst>
-              <a:ext uri="{FF2B5EF4-FFF2-40B4-BE49-F238E27FC236}">
-                <a16:creationId xmlns:a16="http://schemas.microsoft.com/office/drawing/2014/main" id="{8BB8562B-20E5-7F8C-5B4C-585A8ABAE0B3}"/>
-              </a:ext>
-            </a:extLst>
-          </p:cNvPr>
-          <p:cNvPicPr>
-            <a:picLocks noChangeAspect="1"/>
-          </p:cNvPicPr>
-          <p:nvPr/>
-        </p:nvPicPr>
-        <p:blipFill>
-          <a:blip r:embed="rId5"/>
-          <a:stretch>
-            <a:fillRect/>
-          </a:stretch>
-        </p:blipFill>
-        <p:spPr>
-          <a:xfrm>
-            <a:off x="9812487" y="3991271"/>
-            <a:ext cx="1841720" cy="2650663"/>
-          </a:xfrm>
-          <a:prstGeom prst="rect">
-            <a:avLst/>
-          </a:prstGeom>
-        </p:spPr>
-      </p:pic>
-      <p:sp>
-        <p:nvSpPr>
-          <p:cNvPr id="15" name="Flowchart: Connector 14">
-            <a:extLst>
-              <a:ext uri="{FF2B5EF4-FFF2-40B4-BE49-F238E27FC236}">
-                <a16:creationId xmlns:a16="http://schemas.microsoft.com/office/drawing/2014/main" id="{B0670337-5489-658C-CEE1-C7A0D08156CC}"/>
-              </a:ext>
-            </a:extLst>
-          </p:cNvPr>
-          <p:cNvSpPr/>
-          <p:nvPr/>
-        </p:nvSpPr>
-        <p:spPr>
-          <a:xfrm>
-            <a:off x="353813" y="4353014"/>
-            <a:ext cx="353595" cy="353595"/>
-          </a:xfrm>
-          <a:prstGeom prst="flowChartConnector">
-            <a:avLst/>
-          </a:prstGeom>
-          <a:solidFill>
-            <a:srgbClr val="FF0000"/>
-          </a:solidFill>
-        </p:spPr>
-        <p:style>
-          <a:lnRef idx="2">
-            <a:schemeClr val="accent1">
-              <a:shade val="15000"/>
-            </a:schemeClr>
-          </a:lnRef>
-          <a:fillRef idx="1">
-            <a:schemeClr val="accent1"/>
-          </a:fillRef>
-          <a:effectRef idx="0">
-            <a:schemeClr val="accent1"/>
-          </a:effectRef>
-          <a:fontRef idx="minor">
-            <a:schemeClr val="lt1"/>
-          </a:fontRef>
-        </p:style>
-        <p:txBody>
-          <a:bodyPr rtlCol="0" anchor="ctr"/>
-          <a:lstStyle/>
-          <a:p>
-            <a:pPr algn="ctr"/>
-            <a:r>
-              <a:rPr lang="en-US" dirty="0">
-                <a:latin typeface="Arial" panose="020B0604020202020204" pitchFamily="34" charset="0"/>
-                <a:cs typeface="Arial" panose="020B0604020202020204" pitchFamily="34" charset="0"/>
-              </a:rPr>
-              <a:t>2</a:t>
-            </a:r>
-          </a:p>
-        </p:txBody>
-      </p:sp>
-      <p:sp>
-        <p:nvSpPr>
-          <p:cNvPr id="18" name="Flowchart: Connector 17">
-            <a:extLst>
-              <a:ext uri="{FF2B5EF4-FFF2-40B4-BE49-F238E27FC236}">
-                <a16:creationId xmlns:a16="http://schemas.microsoft.com/office/drawing/2014/main" id="{48A3387F-16C4-7CE7-2B0C-14B1E5D6A347}"/>
-              </a:ext>
-            </a:extLst>
-          </p:cNvPr>
-          <p:cNvSpPr/>
-          <p:nvPr/>
-        </p:nvSpPr>
-        <p:spPr>
-          <a:xfrm>
-            <a:off x="3536985" y="3750039"/>
-            <a:ext cx="353595" cy="353595"/>
-          </a:xfrm>
-          <a:prstGeom prst="flowChartConnector">
-            <a:avLst/>
-          </a:prstGeom>
-          <a:solidFill>
-            <a:srgbClr val="FF0000"/>
-          </a:solidFill>
-        </p:spPr>
-        <p:style>
-          <a:lnRef idx="2">
-            <a:schemeClr val="accent1">
-              <a:shade val="15000"/>
-            </a:schemeClr>
-          </a:lnRef>
-          <a:fillRef idx="1">
-            <a:schemeClr val="accent1"/>
-          </a:fillRef>
-          <a:effectRef idx="0">
-            <a:schemeClr val="accent1"/>
-          </a:effectRef>
-          <a:fontRef idx="minor">
-            <a:schemeClr val="lt1"/>
-          </a:fontRef>
-        </p:style>
-        <p:txBody>
-          <a:bodyPr rtlCol="0" anchor="ctr"/>
-          <a:lstStyle/>
-          <a:p>
-            <a:pPr algn="ctr"/>
-            <a:r>
-              <a:rPr lang="en-US" dirty="0">
-                <a:latin typeface="Arial" panose="020B0604020202020204" pitchFamily="34" charset="0"/>
-                <a:cs typeface="Arial" panose="020B0604020202020204" pitchFamily="34" charset="0"/>
-              </a:rPr>
-              <a:t>3</a:t>
-            </a:r>
-          </a:p>
-        </p:txBody>
-      </p:sp>
-      <p:sp>
-        <p:nvSpPr>
-          <p:cNvPr id="19" name="Flowchart: Connector 18">
-            <a:extLst>
-              <a:ext uri="{FF2B5EF4-FFF2-40B4-BE49-F238E27FC236}">
-                <a16:creationId xmlns:a16="http://schemas.microsoft.com/office/drawing/2014/main" id="{AC25EEA2-3328-022F-9292-E6DCEC80C66E}"/>
-              </a:ext>
-            </a:extLst>
-          </p:cNvPr>
-          <p:cNvSpPr/>
-          <p:nvPr/>
-        </p:nvSpPr>
-        <p:spPr>
-          <a:xfrm>
-            <a:off x="6681543" y="3814473"/>
-            <a:ext cx="353595" cy="353595"/>
-          </a:xfrm>
-          <a:prstGeom prst="flowChartConnector">
-            <a:avLst/>
-          </a:prstGeom>
-          <a:solidFill>
-            <a:srgbClr val="FF0000"/>
-          </a:solidFill>
-        </p:spPr>
-        <p:style>
-          <a:lnRef idx="2">
-            <a:schemeClr val="accent1">
-              <a:shade val="15000"/>
-            </a:schemeClr>
-          </a:lnRef>
-          <a:fillRef idx="1">
-            <a:schemeClr val="accent1"/>
-          </a:fillRef>
-          <a:effectRef idx="0">
-            <a:schemeClr val="accent1"/>
-          </a:effectRef>
-          <a:fontRef idx="minor">
-            <a:schemeClr val="lt1"/>
-          </a:fontRef>
-        </p:style>
-        <p:txBody>
-          <a:bodyPr rtlCol="0" anchor="ctr"/>
-          <a:lstStyle/>
-          <a:p>
-            <a:pPr algn="ctr"/>
-            <a:r>
-              <a:rPr lang="en-US" dirty="0">
-                <a:latin typeface="Arial" panose="020B0604020202020204" pitchFamily="34" charset="0"/>
-                <a:cs typeface="Arial" panose="020B0604020202020204" pitchFamily="34" charset="0"/>
-              </a:rPr>
-              <a:t>4</a:t>
-            </a:r>
-          </a:p>
-        </p:txBody>
-      </p:sp>
     </p:spTree>
     <p:extLst>
       <p:ext uri="{BB962C8B-B14F-4D97-AF65-F5344CB8AC3E}">
@@ -27570,6 +27655,36 @@
           <a:chExt cx="0" cy="0"/>
         </a:xfrm>
       </p:grpSpPr>
+      <p:pic>
+        <p:nvPicPr>
+          <p:cNvPr id="7" name="Picture 6">
+            <a:extLst>
+              <a:ext uri="{FF2B5EF4-FFF2-40B4-BE49-F238E27FC236}">
+                <a16:creationId xmlns:a16="http://schemas.microsoft.com/office/drawing/2014/main" id="{8C9AFDAF-9A31-4851-893E-EFD4979BECD7}"/>
+              </a:ext>
+            </a:extLst>
+          </p:cNvPr>
+          <p:cNvPicPr>
+            <a:picLocks noChangeAspect="1"/>
+          </p:cNvPicPr>
+          <p:nvPr/>
+        </p:nvPicPr>
+        <p:blipFill>
+          <a:blip r:embed="rId2"/>
+          <a:stretch>
+            <a:fillRect/>
+          </a:stretch>
+        </p:blipFill>
+        <p:spPr>
+          <a:xfrm>
+            <a:off x="466948" y="4529812"/>
+            <a:ext cx="2738863" cy="1945921"/>
+          </a:xfrm>
+          <a:prstGeom prst="rect">
+            <a:avLst/>
+          </a:prstGeom>
+        </p:spPr>
+      </p:pic>
       <p:sp>
         <p:nvSpPr>
           <p:cNvPr id="2" name="Title 1">
@@ -27588,8 +27703,8 @@
         </p:nvSpPr>
         <p:spPr>
           <a:xfrm>
-            <a:off x="561358" y="552762"/>
-            <a:ext cx="10961947" cy="802250"/>
+            <a:off x="426312" y="279142"/>
+            <a:ext cx="11068028" cy="972066"/>
           </a:xfrm>
         </p:spPr>
         <p:txBody>
@@ -27598,14 +27713,66 @@
           <a:p>
             <a:r>
               <a:rPr lang="en-US" sz="4400" dirty="0"/>
-              <a:t>How to Use Field Maps</a:t>
+              <a:t>Load Locations </a:t>
             </a:r>
-            <a:endParaRPr lang="en-US" sz="4400" dirty="0">
+            <a:r>
+              <a:rPr lang="en-US" sz="3200" dirty="0"/>
+              <a:t>(Prior to Fieldwork)</a:t>
+            </a:r>
+            <a:endParaRPr lang="en-US" sz="3200" dirty="0">
               <a:solidFill>
                 <a:schemeClr val="accent3">
                   <a:lumMod val="60000"/>
                   <a:lumOff val="40000"/>
                 </a:schemeClr>
+              </a:solidFill>
+            </a:endParaRPr>
+          </a:p>
+        </p:txBody>
+      </p:sp>
+      <p:sp>
+        <p:nvSpPr>
+          <p:cNvPr id="6" name="Content Placeholder 5">
+            <a:extLst>
+              <a:ext uri="{FF2B5EF4-FFF2-40B4-BE49-F238E27FC236}">
+                <a16:creationId xmlns:a16="http://schemas.microsoft.com/office/drawing/2014/main" id="{7FCEDA55-9CB7-4D68-2CA7-43461C22C607}"/>
+              </a:ext>
+            </a:extLst>
+          </p:cNvPr>
+          <p:cNvSpPr>
+            <a:spLocks noGrp="1"/>
+          </p:cNvSpPr>
+          <p:nvPr>
+            <p:ph idx="1"/>
+          </p:nvPr>
+        </p:nvSpPr>
+        <p:spPr>
+          <a:xfrm>
+            <a:off x="550863" y="2815813"/>
+            <a:ext cx="10943477" cy="3277012"/>
+          </a:xfrm>
+        </p:spPr>
+        <p:txBody>
+          <a:bodyPr/>
+          <a:lstStyle/>
+          <a:p>
+            <a:pPr marL="457200" indent="-457200">
+              <a:buAutoNum type="arabicPeriod"/>
+            </a:pPr>
+            <a:endParaRPr lang="en-US" dirty="0">
+              <a:solidFill>
+                <a:srgbClr val="FFFFFF">
+                  <a:alpha val="60000"/>
+                </a:srgbClr>
+              </a:solidFill>
+            </a:endParaRPr>
+          </a:p>
+          <a:p>
+            <a:endParaRPr lang="en-US" dirty="0">
+              <a:solidFill>
+                <a:srgbClr val="FFFFFF">
+                  <a:alpha val="60000"/>
+                </a:srgbClr>
               </a:solidFill>
             </a:endParaRPr>
           </a:p>
@@ -27627,8 +27794,8 @@
         </p:nvSpPr>
         <p:spPr>
           <a:xfrm>
-            <a:off x="561358" y="1460740"/>
-            <a:ext cx="10961947" cy="4204413"/>
+            <a:off x="697660" y="1298359"/>
+            <a:ext cx="9482038" cy="4204413"/>
           </a:xfrm>
           <a:prstGeom prst="rect">
             <a:avLst/>
@@ -27828,29 +27995,20 @@
             </a:lvl9pPr>
           </a:lstStyle>
           <a:p>
-            <a:pPr marL="0" indent="0">
-              <a:spcAft>
-                <a:spcPts val="0"/>
-              </a:spcAft>
-            </a:pPr>
+            <a:pPr marL="0" indent="0"/>
             <a:r>
               <a:rPr lang="en-US" sz="1800" i="1" dirty="0">
                 <a:latin typeface="Arial" panose="020B0604020202020204" pitchFamily="34" charset="0"/>
                 <a:ea typeface="+mn-lt"/>
                 <a:cs typeface="Arial" panose="020B0604020202020204" pitchFamily="34" charset="0"/>
               </a:rPr>
-              <a:t>This workflow will be completed while the fieldworker is in the field</a:t>
+              <a:t>While you still have internet connection in the office the fieldworker will be required to load the locations in Survey123</a:t>
             </a:r>
-            <a:endParaRPr lang="en-US" sz="1800" dirty="0">
-              <a:latin typeface="Arial" panose="020B0604020202020204" pitchFamily="34" charset="0"/>
-              <a:ea typeface="+mn-lt"/>
-              <a:cs typeface="Arial" panose="020B0604020202020204" pitchFamily="34" charset="0"/>
-            </a:endParaRPr>
           </a:p>
           <a:p>
             <a:pPr marL="457200" indent="-457200">
               <a:spcAft>
-                <a:spcPts val="0"/>
+                <a:spcPts val="600"/>
               </a:spcAft>
               <a:buFont typeface="Arial" panose="020B0604020202020204" pitchFamily="34" charset="0"/>
               <a:buAutoNum type="arabicPeriod"/>
@@ -27861,13 +28019,13 @@
                 <a:ea typeface="+mn-lt"/>
                 <a:cs typeface="Arial" panose="020B0604020202020204" pitchFamily="34" charset="0"/>
               </a:rPr>
-              <a:t>Open the Field Maps application via your task bar or search bar</a:t>
+              <a:t>Open Survey123 application via your task bar or search bar</a:t>
             </a:r>
           </a:p>
           <a:p>
             <a:pPr marL="457200" indent="-457200">
               <a:spcAft>
-                <a:spcPts val="0"/>
+                <a:spcPts val="600"/>
               </a:spcAft>
               <a:buFont typeface="Arial" panose="020B0604020202020204" pitchFamily="34" charset="0"/>
               <a:buAutoNum type="arabicPeriod"/>
@@ -27878,13 +28036,13 @@
                 <a:ea typeface="+mn-lt"/>
                 <a:cs typeface="Arial" panose="020B0604020202020204" pitchFamily="34" charset="0"/>
               </a:rPr>
-              <a:t>Open the map called ‘Hydrologic Monitoring Field Collection (Field Maps)’</a:t>
+              <a:t>Click on the ‘NW Florida Hydrologic Field Form’</a:t>
             </a:r>
           </a:p>
           <a:p>
             <a:pPr marL="457200" indent="-457200">
               <a:spcAft>
-                <a:spcPts val="0"/>
+                <a:spcPts val="600"/>
               </a:spcAft>
               <a:buFont typeface="Arial" panose="020B0604020202020204" pitchFamily="34" charset="0"/>
               <a:buAutoNum type="arabicPeriod"/>
@@ -27895,29 +28053,13 @@
                 <a:ea typeface="+mn-lt"/>
                 <a:cs typeface="Arial" panose="020B0604020202020204" pitchFamily="34" charset="0"/>
               </a:rPr>
-              <a:t>Select the offline </a:t>
-            </a:r>
-            <a:r>
-              <a:rPr lang="en-US" sz="1800" dirty="0" err="1">
-                <a:latin typeface="Arial" panose="020B0604020202020204" pitchFamily="34" charset="0"/>
-                <a:ea typeface="+mn-lt"/>
-                <a:cs typeface="Arial" panose="020B0604020202020204" pitchFamily="34" charset="0"/>
-              </a:rPr>
-              <a:t>basemap</a:t>
-            </a:r>
-            <a:r>
-              <a:rPr lang="en-US" sz="1800" dirty="0">
-                <a:latin typeface="Arial" panose="020B0604020202020204" pitchFamily="34" charset="0"/>
-                <a:ea typeface="+mn-lt"/>
-                <a:cs typeface="Arial" panose="020B0604020202020204" pitchFamily="34" charset="0"/>
-              </a:rPr>
-              <a:t> (maybe called  ‘Area 1’)</a:t>
+              <a:t>Click on ‘Inbox’</a:t>
             </a:r>
           </a:p>
           <a:p>
             <a:pPr marL="457200" indent="-457200">
               <a:spcAft>
-                <a:spcPts val="0"/>
+                <a:spcPts val="600"/>
               </a:spcAft>
               <a:buFont typeface="Arial" panose="020B0604020202020204" pitchFamily="34" charset="0"/>
               <a:buAutoNum type="arabicPeriod"/>
@@ -27928,51 +28070,25 @@
                 <a:ea typeface="+mn-lt"/>
                 <a:cs typeface="Arial" panose="020B0604020202020204" pitchFamily="34" charset="0"/>
               </a:rPr>
-              <a:t>Once the map opens, zoom into the location of interest on the map and select the point</a:t>
+              <a:t>Select ‘Refresh’</a:t>
             </a:r>
           </a:p>
           <a:p>
-            <a:pPr marL="457200" indent="-457200">
-              <a:spcAft>
-                <a:spcPts val="0"/>
-              </a:spcAft>
-              <a:buFont typeface="Arial" panose="020B0604020202020204" pitchFamily="34" charset="0"/>
-              <a:buAutoNum type="arabicPeriod"/>
-            </a:pPr>
-            <a:r>
-              <a:rPr lang="en-US" sz="1800" dirty="0">
-                <a:latin typeface="Arial" panose="020B0604020202020204" pitchFamily="34" charset="0"/>
-                <a:ea typeface="+mn-lt"/>
-                <a:cs typeface="Arial" panose="020B0604020202020204" pitchFamily="34" charset="0"/>
-              </a:rPr>
-              <a:t>View any historical field visits, Measuring Point photos etc.</a:t>
-            </a:r>
-          </a:p>
-          <a:p>
-            <a:pPr marL="457200" indent="-457200">
-              <a:spcAft>
-                <a:spcPts val="0"/>
-              </a:spcAft>
-              <a:buFont typeface="Arial" panose="020B0604020202020204" pitchFamily="34" charset="0"/>
-              <a:buAutoNum type="arabicPeriod"/>
-            </a:pPr>
-            <a:r>
-              <a:rPr lang="en-US" sz="1800" dirty="0">
-                <a:latin typeface="Arial" panose="020B0604020202020204" pitchFamily="34" charset="0"/>
-                <a:ea typeface="+mn-lt"/>
-                <a:cs typeface="Arial" panose="020B0604020202020204" pitchFamily="34" charset="0"/>
-              </a:rPr>
-              <a:t>Select ‘Submit New Field  Visit’ (Survey123 will launch)</a:t>
-            </a:r>
+            <a:pPr marL="0" indent="0"/>
+            <a:endParaRPr lang="en-US" sz="1800" dirty="0">
+              <a:latin typeface="Arial" panose="020B0604020202020204" pitchFamily="34" charset="0"/>
+              <a:ea typeface="+mn-lt"/>
+              <a:cs typeface="Arial" panose="020B0604020202020204" pitchFamily="34" charset="0"/>
+            </a:endParaRPr>
           </a:p>
         </p:txBody>
       </p:sp>
       <p:pic>
         <p:nvPicPr>
-          <p:cNvPr id="18" name="Picture 17">
+          <p:cNvPr id="12" name="Picture 11">
             <a:extLst>
               <a:ext uri="{FF2B5EF4-FFF2-40B4-BE49-F238E27FC236}">
-                <a16:creationId xmlns:a16="http://schemas.microsoft.com/office/drawing/2014/main" id="{A621DB38-1A74-102B-92BF-5D641F73B0BB}"/>
+                <a16:creationId xmlns:a16="http://schemas.microsoft.com/office/drawing/2014/main" id="{EE157677-4625-4D89-848A-F258B2482B38}"/>
               </a:ext>
             </a:extLst>
           </p:cNvPr>
@@ -27982,15 +28098,15 @@
           <p:nvPr/>
         </p:nvPicPr>
         <p:blipFill>
-          <a:blip r:embed="rId2"/>
+          <a:blip r:embed="rId3"/>
           <a:stretch>
             <a:fillRect/>
           </a:stretch>
         </p:blipFill>
         <p:spPr>
           <a:xfrm>
-            <a:off x="7734127" y="3876997"/>
-            <a:ext cx="4039009" cy="2701415"/>
+            <a:off x="3713783" y="3926837"/>
+            <a:ext cx="2106769" cy="2650663"/>
           </a:xfrm>
           <a:prstGeom prst="rect">
             <a:avLst/>
@@ -27999,10 +28115,10 @@
       </p:pic>
       <p:cxnSp>
         <p:nvCxnSpPr>
-          <p:cNvPr id="20" name="Straight Arrow Connector 19">
+          <p:cNvPr id="14" name="Straight Arrow Connector 13">
             <a:extLst>
               <a:ext uri="{FF2B5EF4-FFF2-40B4-BE49-F238E27FC236}">
-                <a16:creationId xmlns:a16="http://schemas.microsoft.com/office/drawing/2014/main" id="{2D4E0721-D009-2C83-9ED4-C65558DFD962}"/>
+                <a16:creationId xmlns:a16="http://schemas.microsoft.com/office/drawing/2014/main" id="{121DD424-5744-4119-999A-9C2099F3AB08}"/>
               </a:ext>
             </a:extLst>
           </p:cNvPr>
@@ -28012,9 +28128,9 @@
           <p:nvPr/>
         </p:nvCxnSpPr>
         <p:spPr>
-          <a:xfrm>
-            <a:off x="10515600" y="5591866"/>
-            <a:ext cx="467813" cy="0"/>
+          <a:xfrm flipH="1">
+            <a:off x="5500817" y="6441844"/>
+            <a:ext cx="639469" cy="0"/>
           </a:xfrm>
           <a:prstGeom prst="straightConnector1">
             <a:avLst/>
@@ -28043,39 +28159,10 @@
       </p:cxnSp>
       <p:pic>
         <p:nvPicPr>
-          <p:cNvPr id="24" name="Picture 23">
+          <p:cNvPr id="16" name="Picture 15">
             <a:extLst>
               <a:ext uri="{FF2B5EF4-FFF2-40B4-BE49-F238E27FC236}">
-                <a16:creationId xmlns:a16="http://schemas.microsoft.com/office/drawing/2014/main" id="{D0B74C66-6222-6671-2BDE-CC138601A2B6}"/>
-              </a:ext>
-            </a:extLst>
-          </p:cNvPr>
-          <p:cNvPicPr>
-            <a:picLocks noChangeAspect="1"/>
-          </p:cNvPicPr>
-          <p:nvPr/>
-        </p:nvPicPr>
-        <p:blipFill rotWithShape="1">
-          <a:blip r:embed="rId3"/>
-          <a:srcRect t="13148" r="22617"/>
-          <a:stretch/>
-        </p:blipFill>
-        <p:spPr>
-          <a:xfrm>
-            <a:off x="418864" y="4971936"/>
-            <a:ext cx="3006517" cy="1386433"/>
-          </a:xfrm>
-          <a:prstGeom prst="rect">
-            <a:avLst/>
-          </a:prstGeom>
-        </p:spPr>
-      </p:pic>
-      <p:pic>
-        <p:nvPicPr>
-          <p:cNvPr id="27" name="Picture 26">
-            <a:extLst>
-              <a:ext uri="{FF2B5EF4-FFF2-40B4-BE49-F238E27FC236}">
-                <a16:creationId xmlns:a16="http://schemas.microsoft.com/office/drawing/2014/main" id="{0F061048-7FB9-3DDA-4F2D-E8D072887AAF}"/>
+                <a16:creationId xmlns:a16="http://schemas.microsoft.com/office/drawing/2014/main" id="{A8B5B50D-1BAA-4E04-92DE-D5B47F5D4C58}"/>
               </a:ext>
             </a:extLst>
           </p:cNvPr>
@@ -28092,20 +28179,94 @@
         </p:blipFill>
         <p:spPr>
           <a:xfrm>
-            <a:off x="3908335" y="4971936"/>
-            <a:ext cx="3143689" cy="1409897"/>
+            <a:off x="6858570" y="4054348"/>
+            <a:ext cx="1901618" cy="2524510"/>
           </a:xfrm>
           <a:prstGeom prst="rect">
             <a:avLst/>
           </a:prstGeom>
         </p:spPr>
       </p:pic>
-      <p:sp>
-        <p:nvSpPr>
-          <p:cNvPr id="29" name="Flowchart: Connector 28">
+      <p:cxnSp>
+        <p:nvCxnSpPr>
+          <p:cNvPr id="17" name="Straight Arrow Connector 16">
             <a:extLst>
               <a:ext uri="{FF2B5EF4-FFF2-40B4-BE49-F238E27FC236}">
-                <a16:creationId xmlns:a16="http://schemas.microsoft.com/office/drawing/2014/main" id="{3393BEA2-4704-4A86-B97D-18BC2A158787}"/>
+                <a16:creationId xmlns:a16="http://schemas.microsoft.com/office/drawing/2014/main" id="{0AD74C9E-E096-4739-896C-DCFCEFFFAD65}"/>
+              </a:ext>
+            </a:extLst>
+          </p:cNvPr>
+          <p:cNvCxnSpPr>
+            <a:cxnSpLocks/>
+          </p:cNvCxnSpPr>
+          <p:nvPr/>
+        </p:nvCxnSpPr>
+        <p:spPr>
+          <a:xfrm flipH="1">
+            <a:off x="8613393" y="6462461"/>
+            <a:ext cx="474623" cy="0"/>
+          </a:xfrm>
+          <a:prstGeom prst="straightConnector1">
+            <a:avLst/>
+          </a:prstGeom>
+          <a:ln w="57150">
+            <a:solidFill>
+              <a:srgbClr val="FF0000"/>
+            </a:solidFill>
+            <a:tailEnd type="triangle"/>
+          </a:ln>
+        </p:spPr>
+        <p:style>
+          <a:lnRef idx="1">
+            <a:schemeClr val="accent1"/>
+          </a:lnRef>
+          <a:fillRef idx="0">
+            <a:schemeClr val="accent1"/>
+          </a:fillRef>
+          <a:effectRef idx="0">
+            <a:schemeClr val="accent1"/>
+          </a:effectRef>
+          <a:fontRef idx="minor">
+            <a:schemeClr val="tx1"/>
+          </a:fontRef>
+        </p:style>
+      </p:cxnSp>
+      <p:pic>
+        <p:nvPicPr>
+          <p:cNvPr id="13" name="Picture 12">
+            <a:extLst>
+              <a:ext uri="{FF2B5EF4-FFF2-40B4-BE49-F238E27FC236}">
+                <a16:creationId xmlns:a16="http://schemas.microsoft.com/office/drawing/2014/main" id="{8BB8562B-20E5-7F8C-5B4C-585A8ABAE0B3}"/>
+              </a:ext>
+            </a:extLst>
+          </p:cNvPr>
+          <p:cNvPicPr>
+            <a:picLocks noChangeAspect="1"/>
+          </p:cNvPicPr>
+          <p:nvPr/>
+        </p:nvPicPr>
+        <p:blipFill>
+          <a:blip r:embed="rId5"/>
+          <a:stretch>
+            <a:fillRect/>
+          </a:stretch>
+        </p:blipFill>
+        <p:spPr>
+          <a:xfrm>
+            <a:off x="9812487" y="3991271"/>
+            <a:ext cx="1841720" cy="2650663"/>
+          </a:xfrm>
+          <a:prstGeom prst="rect">
+            <a:avLst/>
+          </a:prstGeom>
+        </p:spPr>
+      </p:pic>
+      <p:sp>
+        <p:nvSpPr>
+          <p:cNvPr id="15" name="Flowchart: Connector 14">
+            <a:extLst>
+              <a:ext uri="{FF2B5EF4-FFF2-40B4-BE49-F238E27FC236}">
+                <a16:creationId xmlns:a16="http://schemas.microsoft.com/office/drawing/2014/main" id="{B0670337-5489-658C-CEE1-C7A0D08156CC}"/>
               </a:ext>
             </a:extLst>
           </p:cNvPr>
@@ -28114,7 +28275,7 @@
         </p:nvSpPr>
         <p:spPr>
           <a:xfrm>
-            <a:off x="207763" y="4689410"/>
+            <a:off x="353813" y="4353014"/>
             <a:ext cx="353595" cy="353595"/>
           </a:xfrm>
           <a:prstGeom prst="flowChartConnector">
@@ -28157,10 +28318,10 @@
       </p:sp>
       <p:sp>
         <p:nvSpPr>
-          <p:cNvPr id="30" name="Flowchart: Connector 29">
+          <p:cNvPr id="18" name="Flowchart: Connector 17">
             <a:extLst>
               <a:ext uri="{FF2B5EF4-FFF2-40B4-BE49-F238E27FC236}">
-                <a16:creationId xmlns:a16="http://schemas.microsoft.com/office/drawing/2014/main" id="{4B64C761-AB9B-5C55-053D-2B2D06DCC207}"/>
+                <a16:creationId xmlns:a16="http://schemas.microsoft.com/office/drawing/2014/main" id="{48A3387F-16C4-7CE7-2B0C-14B1E5D6A347}"/>
               </a:ext>
             </a:extLst>
           </p:cNvPr>
@@ -28169,7 +28330,7 @@
         </p:nvSpPr>
         <p:spPr>
           <a:xfrm>
-            <a:off x="3674056" y="4689410"/>
+            <a:off x="3536985" y="3750039"/>
             <a:ext cx="353595" cy="353595"/>
           </a:xfrm>
           <a:prstGeom prst="flowChartConnector">
@@ -28212,10 +28373,10 @@
       </p:sp>
       <p:sp>
         <p:nvSpPr>
-          <p:cNvPr id="31" name="Flowchart: Connector 30">
+          <p:cNvPr id="19" name="Flowchart: Connector 18">
             <a:extLst>
               <a:ext uri="{FF2B5EF4-FFF2-40B4-BE49-F238E27FC236}">
-                <a16:creationId xmlns:a16="http://schemas.microsoft.com/office/drawing/2014/main" id="{5EE87811-007E-0045-5957-5B5B0F799F50}"/>
+                <a16:creationId xmlns:a16="http://schemas.microsoft.com/office/drawing/2014/main" id="{AC25EEA2-3328-022F-9292-E6DCEC80C66E}"/>
               </a:ext>
             </a:extLst>
           </p:cNvPr>
@@ -28224,7 +28385,7 @@
         </p:nvSpPr>
         <p:spPr>
           <a:xfrm>
-            <a:off x="7607122" y="3700199"/>
+            <a:off x="6681543" y="3814473"/>
             <a:ext cx="353595" cy="353595"/>
           </a:xfrm>
           <a:prstGeom prst="flowChartConnector">
@@ -28265,65 +28426,10 @@
           </a:p>
         </p:txBody>
       </p:sp>
-      <p:sp>
-        <p:nvSpPr>
-          <p:cNvPr id="32" name="Flowchart: Connector 31">
-            <a:extLst>
-              <a:ext uri="{FF2B5EF4-FFF2-40B4-BE49-F238E27FC236}">
-                <a16:creationId xmlns:a16="http://schemas.microsoft.com/office/drawing/2014/main" id="{F3FE75FB-A550-7B77-8141-7E80B6A7E34A}"/>
-              </a:ext>
-            </a:extLst>
-          </p:cNvPr>
-          <p:cNvSpPr/>
-          <p:nvPr/>
-        </p:nvSpPr>
-        <p:spPr>
-          <a:xfrm>
-            <a:off x="7844718" y="6181571"/>
-            <a:ext cx="353595" cy="353595"/>
-          </a:xfrm>
-          <a:prstGeom prst="flowChartConnector">
-            <a:avLst/>
-          </a:prstGeom>
-          <a:solidFill>
-            <a:srgbClr val="FF0000"/>
-          </a:solidFill>
-        </p:spPr>
-        <p:style>
-          <a:lnRef idx="2">
-            <a:schemeClr val="accent1">
-              <a:shade val="15000"/>
-            </a:schemeClr>
-          </a:lnRef>
-          <a:fillRef idx="1">
-            <a:schemeClr val="accent1"/>
-          </a:fillRef>
-          <a:effectRef idx="0">
-            <a:schemeClr val="accent1"/>
-          </a:effectRef>
-          <a:fontRef idx="minor">
-            <a:schemeClr val="lt1"/>
-          </a:fontRef>
-        </p:style>
-        <p:txBody>
-          <a:bodyPr rtlCol="0" anchor="ctr"/>
-          <a:lstStyle/>
-          <a:p>
-            <a:pPr algn="ctr"/>
-            <a:r>
-              <a:rPr lang="en-US" dirty="0">
-                <a:latin typeface="Arial" panose="020B0604020202020204" pitchFamily="34" charset="0"/>
-                <a:cs typeface="Arial" panose="020B0604020202020204" pitchFamily="34" charset="0"/>
-              </a:rPr>
-              <a:t>6</a:t>
-            </a:r>
-          </a:p>
-        </p:txBody>
-      </p:sp>
     </p:spTree>
     <p:extLst>
       <p:ext uri="{BB962C8B-B14F-4D97-AF65-F5344CB8AC3E}">
-        <p14:creationId xmlns:p14="http://schemas.microsoft.com/office/powerpoint/2010/main" val="3264566659"/>
+        <p14:creationId xmlns:p14="http://schemas.microsoft.com/office/powerpoint/2010/main" val="1372990651"/>
       </p:ext>
     </p:extLst>
   </p:cSld>
@@ -28378,9 +28484,13 @@
           <a:p>
             <a:r>
               <a:rPr lang="en-US" sz="4400" dirty="0"/>
-              <a:t>How to Use Survey123</a:t>
+              <a:t>How to Use Field Maps </a:t>
             </a:r>
-            <a:endParaRPr lang="en-US" sz="4400" dirty="0">
+            <a:r>
+              <a:rPr lang="en-US" sz="3200" dirty="0"/>
+              <a:t>(In the Field)</a:t>
+            </a:r>
+            <a:endParaRPr lang="en-US" sz="3200" dirty="0">
               <a:solidFill>
                 <a:schemeClr val="accent3">
                   <a:lumMod val="60000"/>
@@ -28408,7 +28518,7 @@
         <p:spPr>
           <a:xfrm>
             <a:off x="561358" y="1460740"/>
-            <a:ext cx="8738381" cy="4204413"/>
+            <a:ext cx="10961947" cy="4204413"/>
           </a:xfrm>
           <a:prstGeom prst="rect">
             <a:avLst/>
@@ -28641,6 +28751,790 @@
                 <a:ea typeface="+mn-lt"/>
                 <a:cs typeface="Arial" panose="020B0604020202020204" pitchFamily="34" charset="0"/>
               </a:rPr>
+              <a:t>Open the Field Maps application via your task bar</a:t>
+            </a:r>
+          </a:p>
+          <a:p>
+            <a:pPr marL="457200" indent="-457200">
+              <a:spcAft>
+                <a:spcPts val="0"/>
+              </a:spcAft>
+              <a:buFont typeface="Arial" panose="020B0604020202020204" pitchFamily="34" charset="0"/>
+              <a:buAutoNum type="arabicPeriod"/>
+            </a:pPr>
+            <a:r>
+              <a:rPr lang="en-US" sz="1800" dirty="0">
+                <a:latin typeface="Arial" panose="020B0604020202020204" pitchFamily="34" charset="0"/>
+                <a:ea typeface="+mn-lt"/>
+                <a:cs typeface="Arial" panose="020B0604020202020204" pitchFamily="34" charset="0"/>
+              </a:rPr>
+              <a:t>Open the map called ‘Hydrologic Monitoring Field Collection (Field Maps)’</a:t>
+            </a:r>
+          </a:p>
+          <a:p>
+            <a:pPr marL="457200" indent="-457200">
+              <a:spcAft>
+                <a:spcPts val="0"/>
+              </a:spcAft>
+              <a:buFont typeface="Arial" panose="020B0604020202020204" pitchFamily="34" charset="0"/>
+              <a:buAutoNum type="arabicPeriod"/>
+            </a:pPr>
+            <a:r>
+              <a:rPr lang="en-US" sz="1800" dirty="0">
+                <a:latin typeface="Arial" panose="020B0604020202020204" pitchFamily="34" charset="0"/>
+                <a:ea typeface="+mn-lt"/>
+                <a:cs typeface="Arial" panose="020B0604020202020204" pitchFamily="34" charset="0"/>
+              </a:rPr>
+              <a:t>Select the offline </a:t>
+            </a:r>
+            <a:r>
+              <a:rPr lang="en-US" sz="1800" dirty="0" err="1">
+                <a:latin typeface="Arial" panose="020B0604020202020204" pitchFamily="34" charset="0"/>
+                <a:ea typeface="+mn-lt"/>
+                <a:cs typeface="Arial" panose="020B0604020202020204" pitchFamily="34" charset="0"/>
+              </a:rPr>
+              <a:t>basemap</a:t>
+            </a:r>
+            <a:r>
+              <a:rPr lang="en-US" sz="1800" dirty="0">
+                <a:latin typeface="Arial" panose="020B0604020202020204" pitchFamily="34" charset="0"/>
+                <a:ea typeface="+mn-lt"/>
+                <a:cs typeface="Arial" panose="020B0604020202020204" pitchFamily="34" charset="0"/>
+              </a:rPr>
+              <a:t> (called  ‘Offline Area’)</a:t>
+            </a:r>
+          </a:p>
+          <a:p>
+            <a:pPr marL="457200" indent="-457200">
+              <a:spcAft>
+                <a:spcPts val="0"/>
+              </a:spcAft>
+              <a:buFont typeface="Arial" panose="020B0604020202020204" pitchFamily="34" charset="0"/>
+              <a:buAutoNum type="arabicPeriod"/>
+            </a:pPr>
+            <a:r>
+              <a:rPr lang="en-US" sz="1800" dirty="0">
+                <a:latin typeface="Arial" panose="020B0604020202020204" pitchFamily="34" charset="0"/>
+                <a:ea typeface="+mn-lt"/>
+                <a:cs typeface="Arial" panose="020B0604020202020204" pitchFamily="34" charset="0"/>
+              </a:rPr>
+              <a:t>Once the map opens, zoom into the location of interest on the map and select the point</a:t>
+            </a:r>
+          </a:p>
+          <a:p>
+            <a:pPr marL="457200" indent="-457200">
+              <a:spcAft>
+                <a:spcPts val="0"/>
+              </a:spcAft>
+              <a:buFont typeface="Arial" panose="020B0604020202020204" pitchFamily="34" charset="0"/>
+              <a:buAutoNum type="arabicPeriod"/>
+            </a:pPr>
+            <a:r>
+              <a:rPr lang="en-US" sz="1800" dirty="0">
+                <a:latin typeface="Arial" panose="020B0604020202020204" pitchFamily="34" charset="0"/>
+                <a:ea typeface="+mn-lt"/>
+                <a:cs typeface="Arial" panose="020B0604020202020204" pitchFamily="34" charset="0"/>
+              </a:rPr>
+              <a:t>View any historical field visits, Measuring Point photos etc.</a:t>
+            </a:r>
+          </a:p>
+          <a:p>
+            <a:pPr marL="457200" indent="-457200">
+              <a:spcAft>
+                <a:spcPts val="0"/>
+              </a:spcAft>
+              <a:buFont typeface="Arial" panose="020B0604020202020204" pitchFamily="34" charset="0"/>
+              <a:buAutoNum type="arabicPeriod"/>
+            </a:pPr>
+            <a:r>
+              <a:rPr lang="en-US" sz="1800" dirty="0">
+                <a:latin typeface="Arial" panose="020B0604020202020204" pitchFamily="34" charset="0"/>
+                <a:ea typeface="+mn-lt"/>
+                <a:cs typeface="Arial" panose="020B0604020202020204" pitchFamily="34" charset="0"/>
+              </a:rPr>
+              <a:t>Select ‘Submit New Field  Visit’ (Survey123 will launch)</a:t>
+            </a:r>
+          </a:p>
+        </p:txBody>
+      </p:sp>
+      <p:pic>
+        <p:nvPicPr>
+          <p:cNvPr id="18" name="Picture 17">
+            <a:extLst>
+              <a:ext uri="{FF2B5EF4-FFF2-40B4-BE49-F238E27FC236}">
+                <a16:creationId xmlns:a16="http://schemas.microsoft.com/office/drawing/2014/main" id="{A621DB38-1A74-102B-92BF-5D641F73B0BB}"/>
+              </a:ext>
+            </a:extLst>
+          </p:cNvPr>
+          <p:cNvPicPr>
+            <a:picLocks noChangeAspect="1"/>
+          </p:cNvPicPr>
+          <p:nvPr/>
+        </p:nvPicPr>
+        <p:blipFill>
+          <a:blip r:embed="rId2"/>
+          <a:stretch>
+            <a:fillRect/>
+          </a:stretch>
+        </p:blipFill>
+        <p:spPr>
+          <a:xfrm>
+            <a:off x="7734127" y="3876997"/>
+            <a:ext cx="4039009" cy="2701415"/>
+          </a:xfrm>
+          <a:prstGeom prst="rect">
+            <a:avLst/>
+          </a:prstGeom>
+        </p:spPr>
+      </p:pic>
+      <p:cxnSp>
+        <p:nvCxnSpPr>
+          <p:cNvPr id="20" name="Straight Arrow Connector 19">
+            <a:extLst>
+              <a:ext uri="{FF2B5EF4-FFF2-40B4-BE49-F238E27FC236}">
+                <a16:creationId xmlns:a16="http://schemas.microsoft.com/office/drawing/2014/main" id="{2D4E0721-D009-2C83-9ED4-C65558DFD962}"/>
+              </a:ext>
+            </a:extLst>
+          </p:cNvPr>
+          <p:cNvCxnSpPr>
+            <a:cxnSpLocks/>
+          </p:cNvCxnSpPr>
+          <p:nvPr/>
+        </p:nvCxnSpPr>
+        <p:spPr>
+          <a:xfrm>
+            <a:off x="10515600" y="5591866"/>
+            <a:ext cx="467813" cy="0"/>
+          </a:xfrm>
+          <a:prstGeom prst="straightConnector1">
+            <a:avLst/>
+          </a:prstGeom>
+          <a:ln w="57150">
+            <a:solidFill>
+              <a:srgbClr val="FF0000"/>
+            </a:solidFill>
+            <a:tailEnd type="triangle"/>
+          </a:ln>
+        </p:spPr>
+        <p:style>
+          <a:lnRef idx="1">
+            <a:schemeClr val="accent1"/>
+          </a:lnRef>
+          <a:fillRef idx="0">
+            <a:schemeClr val="accent1"/>
+          </a:fillRef>
+          <a:effectRef idx="0">
+            <a:schemeClr val="accent1"/>
+          </a:effectRef>
+          <a:fontRef idx="minor">
+            <a:schemeClr val="tx1"/>
+          </a:fontRef>
+        </p:style>
+      </p:cxnSp>
+      <p:pic>
+        <p:nvPicPr>
+          <p:cNvPr id="24" name="Picture 23">
+            <a:extLst>
+              <a:ext uri="{FF2B5EF4-FFF2-40B4-BE49-F238E27FC236}">
+                <a16:creationId xmlns:a16="http://schemas.microsoft.com/office/drawing/2014/main" id="{D0B74C66-6222-6671-2BDE-CC138601A2B6}"/>
+              </a:ext>
+            </a:extLst>
+          </p:cNvPr>
+          <p:cNvPicPr>
+            <a:picLocks noChangeAspect="1"/>
+          </p:cNvPicPr>
+          <p:nvPr/>
+        </p:nvPicPr>
+        <p:blipFill rotWithShape="1">
+          <a:blip r:embed="rId3"/>
+          <a:srcRect t="13148" r="22617"/>
+          <a:stretch/>
+        </p:blipFill>
+        <p:spPr>
+          <a:xfrm>
+            <a:off x="418864" y="4971936"/>
+            <a:ext cx="3006517" cy="1386433"/>
+          </a:xfrm>
+          <a:prstGeom prst="rect">
+            <a:avLst/>
+          </a:prstGeom>
+        </p:spPr>
+      </p:pic>
+      <p:pic>
+        <p:nvPicPr>
+          <p:cNvPr id="27" name="Picture 26">
+            <a:extLst>
+              <a:ext uri="{FF2B5EF4-FFF2-40B4-BE49-F238E27FC236}">
+                <a16:creationId xmlns:a16="http://schemas.microsoft.com/office/drawing/2014/main" id="{0F061048-7FB9-3DDA-4F2D-E8D072887AAF}"/>
+              </a:ext>
+            </a:extLst>
+          </p:cNvPr>
+          <p:cNvPicPr>
+            <a:picLocks noChangeAspect="1"/>
+          </p:cNvPicPr>
+          <p:nvPr/>
+        </p:nvPicPr>
+        <p:blipFill>
+          <a:blip r:embed="rId4"/>
+          <a:stretch>
+            <a:fillRect/>
+          </a:stretch>
+        </p:blipFill>
+        <p:spPr>
+          <a:xfrm>
+            <a:off x="3908335" y="4971936"/>
+            <a:ext cx="3143689" cy="1409897"/>
+          </a:xfrm>
+          <a:prstGeom prst="rect">
+            <a:avLst/>
+          </a:prstGeom>
+        </p:spPr>
+      </p:pic>
+      <p:sp>
+        <p:nvSpPr>
+          <p:cNvPr id="29" name="Flowchart: Connector 28">
+            <a:extLst>
+              <a:ext uri="{FF2B5EF4-FFF2-40B4-BE49-F238E27FC236}">
+                <a16:creationId xmlns:a16="http://schemas.microsoft.com/office/drawing/2014/main" id="{3393BEA2-4704-4A86-B97D-18BC2A158787}"/>
+              </a:ext>
+            </a:extLst>
+          </p:cNvPr>
+          <p:cNvSpPr/>
+          <p:nvPr/>
+        </p:nvSpPr>
+        <p:spPr>
+          <a:xfrm>
+            <a:off x="207763" y="4689410"/>
+            <a:ext cx="353595" cy="353595"/>
+          </a:xfrm>
+          <a:prstGeom prst="flowChartConnector">
+            <a:avLst/>
+          </a:prstGeom>
+          <a:solidFill>
+            <a:srgbClr val="FF0000"/>
+          </a:solidFill>
+        </p:spPr>
+        <p:style>
+          <a:lnRef idx="2">
+            <a:schemeClr val="accent1">
+              <a:shade val="15000"/>
+            </a:schemeClr>
+          </a:lnRef>
+          <a:fillRef idx="1">
+            <a:schemeClr val="accent1"/>
+          </a:fillRef>
+          <a:effectRef idx="0">
+            <a:schemeClr val="accent1"/>
+          </a:effectRef>
+          <a:fontRef idx="minor">
+            <a:schemeClr val="lt1"/>
+          </a:fontRef>
+        </p:style>
+        <p:txBody>
+          <a:bodyPr rtlCol="0" anchor="ctr"/>
+          <a:lstStyle/>
+          <a:p>
+            <a:pPr algn="ctr"/>
+            <a:r>
+              <a:rPr lang="en-US" dirty="0">
+                <a:latin typeface="Arial" panose="020B0604020202020204" pitchFamily="34" charset="0"/>
+                <a:cs typeface="Arial" panose="020B0604020202020204" pitchFamily="34" charset="0"/>
+              </a:rPr>
+              <a:t>2</a:t>
+            </a:r>
+          </a:p>
+        </p:txBody>
+      </p:sp>
+      <p:sp>
+        <p:nvSpPr>
+          <p:cNvPr id="30" name="Flowchart: Connector 29">
+            <a:extLst>
+              <a:ext uri="{FF2B5EF4-FFF2-40B4-BE49-F238E27FC236}">
+                <a16:creationId xmlns:a16="http://schemas.microsoft.com/office/drawing/2014/main" id="{4B64C761-AB9B-5C55-053D-2B2D06DCC207}"/>
+              </a:ext>
+            </a:extLst>
+          </p:cNvPr>
+          <p:cNvSpPr/>
+          <p:nvPr/>
+        </p:nvSpPr>
+        <p:spPr>
+          <a:xfrm>
+            <a:off x="3674056" y="4689410"/>
+            <a:ext cx="353595" cy="353595"/>
+          </a:xfrm>
+          <a:prstGeom prst="flowChartConnector">
+            <a:avLst/>
+          </a:prstGeom>
+          <a:solidFill>
+            <a:srgbClr val="FF0000"/>
+          </a:solidFill>
+        </p:spPr>
+        <p:style>
+          <a:lnRef idx="2">
+            <a:schemeClr val="accent1">
+              <a:shade val="15000"/>
+            </a:schemeClr>
+          </a:lnRef>
+          <a:fillRef idx="1">
+            <a:schemeClr val="accent1"/>
+          </a:fillRef>
+          <a:effectRef idx="0">
+            <a:schemeClr val="accent1"/>
+          </a:effectRef>
+          <a:fontRef idx="minor">
+            <a:schemeClr val="lt1"/>
+          </a:fontRef>
+        </p:style>
+        <p:txBody>
+          <a:bodyPr rtlCol="0" anchor="ctr"/>
+          <a:lstStyle/>
+          <a:p>
+            <a:pPr algn="ctr"/>
+            <a:r>
+              <a:rPr lang="en-US" dirty="0">
+                <a:latin typeface="Arial" panose="020B0604020202020204" pitchFamily="34" charset="0"/>
+                <a:cs typeface="Arial" panose="020B0604020202020204" pitchFamily="34" charset="0"/>
+              </a:rPr>
+              <a:t>3</a:t>
+            </a:r>
+          </a:p>
+        </p:txBody>
+      </p:sp>
+      <p:sp>
+        <p:nvSpPr>
+          <p:cNvPr id="31" name="Flowchart: Connector 30">
+            <a:extLst>
+              <a:ext uri="{FF2B5EF4-FFF2-40B4-BE49-F238E27FC236}">
+                <a16:creationId xmlns:a16="http://schemas.microsoft.com/office/drawing/2014/main" id="{5EE87811-007E-0045-5957-5B5B0F799F50}"/>
+              </a:ext>
+            </a:extLst>
+          </p:cNvPr>
+          <p:cNvSpPr/>
+          <p:nvPr/>
+        </p:nvSpPr>
+        <p:spPr>
+          <a:xfrm>
+            <a:off x="7607122" y="3700199"/>
+            <a:ext cx="353595" cy="353595"/>
+          </a:xfrm>
+          <a:prstGeom prst="flowChartConnector">
+            <a:avLst/>
+          </a:prstGeom>
+          <a:solidFill>
+            <a:srgbClr val="FF0000"/>
+          </a:solidFill>
+        </p:spPr>
+        <p:style>
+          <a:lnRef idx="2">
+            <a:schemeClr val="accent1">
+              <a:shade val="15000"/>
+            </a:schemeClr>
+          </a:lnRef>
+          <a:fillRef idx="1">
+            <a:schemeClr val="accent1"/>
+          </a:fillRef>
+          <a:effectRef idx="0">
+            <a:schemeClr val="accent1"/>
+          </a:effectRef>
+          <a:fontRef idx="minor">
+            <a:schemeClr val="lt1"/>
+          </a:fontRef>
+        </p:style>
+        <p:txBody>
+          <a:bodyPr rtlCol="0" anchor="ctr"/>
+          <a:lstStyle/>
+          <a:p>
+            <a:pPr algn="ctr"/>
+            <a:r>
+              <a:rPr lang="en-US" dirty="0">
+                <a:latin typeface="Arial" panose="020B0604020202020204" pitchFamily="34" charset="0"/>
+                <a:cs typeface="Arial" panose="020B0604020202020204" pitchFamily="34" charset="0"/>
+              </a:rPr>
+              <a:t>4</a:t>
+            </a:r>
+          </a:p>
+        </p:txBody>
+      </p:sp>
+      <p:sp>
+        <p:nvSpPr>
+          <p:cNvPr id="32" name="Flowchart: Connector 31">
+            <a:extLst>
+              <a:ext uri="{FF2B5EF4-FFF2-40B4-BE49-F238E27FC236}">
+                <a16:creationId xmlns:a16="http://schemas.microsoft.com/office/drawing/2014/main" id="{F3FE75FB-A550-7B77-8141-7E80B6A7E34A}"/>
+              </a:ext>
+            </a:extLst>
+          </p:cNvPr>
+          <p:cNvSpPr/>
+          <p:nvPr/>
+        </p:nvSpPr>
+        <p:spPr>
+          <a:xfrm>
+            <a:off x="7844718" y="6181571"/>
+            <a:ext cx="353595" cy="353595"/>
+          </a:xfrm>
+          <a:prstGeom prst="flowChartConnector">
+            <a:avLst/>
+          </a:prstGeom>
+          <a:solidFill>
+            <a:srgbClr val="FF0000"/>
+          </a:solidFill>
+        </p:spPr>
+        <p:style>
+          <a:lnRef idx="2">
+            <a:schemeClr val="accent1">
+              <a:shade val="15000"/>
+            </a:schemeClr>
+          </a:lnRef>
+          <a:fillRef idx="1">
+            <a:schemeClr val="accent1"/>
+          </a:fillRef>
+          <a:effectRef idx="0">
+            <a:schemeClr val="accent1"/>
+          </a:effectRef>
+          <a:fontRef idx="minor">
+            <a:schemeClr val="lt1"/>
+          </a:fontRef>
+        </p:style>
+        <p:txBody>
+          <a:bodyPr rtlCol="0" anchor="ctr"/>
+          <a:lstStyle/>
+          <a:p>
+            <a:pPr algn="ctr"/>
+            <a:r>
+              <a:rPr lang="en-US" dirty="0">
+                <a:latin typeface="Arial" panose="020B0604020202020204" pitchFamily="34" charset="0"/>
+                <a:cs typeface="Arial" panose="020B0604020202020204" pitchFamily="34" charset="0"/>
+              </a:rPr>
+              <a:t>6</a:t>
+            </a:r>
+          </a:p>
+        </p:txBody>
+      </p:sp>
+    </p:spTree>
+    <p:extLst>
+      <p:ext uri="{BB962C8B-B14F-4D97-AF65-F5344CB8AC3E}">
+        <p14:creationId xmlns:p14="http://schemas.microsoft.com/office/powerpoint/2010/main" val="3264566659"/>
+      </p:ext>
+    </p:extLst>
+  </p:cSld>
+  <p:clrMapOvr>
+    <a:masterClrMapping/>
+  </p:clrMapOvr>
+</p:sld>
+</file>
+
+<file path=ppt/slides/slide6.xml><?xml version="1.0" encoding="utf-8"?>
+<p:sld xmlns:a="http://schemas.openxmlformats.org/drawingml/2006/main" xmlns:r="http://schemas.openxmlformats.org/officeDocument/2006/relationships" xmlns:p="http://schemas.openxmlformats.org/presentationml/2006/main">
+  <p:cSld>
+    <p:spTree>
+      <p:nvGrpSpPr>
+        <p:cNvPr id="1" name=""/>
+        <p:cNvGrpSpPr/>
+        <p:nvPr/>
+      </p:nvGrpSpPr>
+      <p:grpSpPr>
+        <a:xfrm>
+          <a:off x="0" y="0"/>
+          <a:ext cx="0" cy="0"/>
+          <a:chOff x="0" y="0"/>
+          <a:chExt cx="0" cy="0"/>
+        </a:xfrm>
+      </p:grpSpPr>
+      <p:sp>
+        <p:nvSpPr>
+          <p:cNvPr id="2" name="Title 1">
+            <a:extLst>
+              <a:ext uri="{FF2B5EF4-FFF2-40B4-BE49-F238E27FC236}">
+                <a16:creationId xmlns:a16="http://schemas.microsoft.com/office/drawing/2014/main" id="{0046426E-F6F6-4A7C-9181-8C3090996261}"/>
+              </a:ext>
+            </a:extLst>
+          </p:cNvPr>
+          <p:cNvSpPr>
+            <a:spLocks noGrp="1"/>
+          </p:cNvSpPr>
+          <p:nvPr>
+            <p:ph type="title"/>
+          </p:nvPr>
+        </p:nvSpPr>
+        <p:spPr>
+          <a:xfrm>
+            <a:off x="561358" y="552762"/>
+            <a:ext cx="10961947" cy="802250"/>
+          </a:xfrm>
+        </p:spPr>
+        <p:txBody>
+          <a:bodyPr/>
+          <a:lstStyle/>
+          <a:p>
+            <a:r>
+              <a:rPr lang="en-US" sz="4400" dirty="0"/>
+              <a:t>How to Use Survey123 </a:t>
+            </a:r>
+            <a:r>
+              <a:rPr lang="en-US" sz="3200" dirty="0"/>
+              <a:t>(In the Field)</a:t>
+            </a:r>
+            <a:endParaRPr lang="en-US" sz="3200" dirty="0">
+              <a:solidFill>
+                <a:schemeClr val="accent3">
+                  <a:lumMod val="60000"/>
+                  <a:lumOff val="40000"/>
+                </a:schemeClr>
+              </a:solidFill>
+            </a:endParaRPr>
+          </a:p>
+        </p:txBody>
+      </p:sp>
+      <p:sp>
+        <p:nvSpPr>
+          <p:cNvPr id="5" name="Content Placeholder 5">
+            <a:extLst>
+              <a:ext uri="{FF2B5EF4-FFF2-40B4-BE49-F238E27FC236}">
+                <a16:creationId xmlns:a16="http://schemas.microsoft.com/office/drawing/2014/main" id="{0E19797D-8A74-F7A2-B94C-8687111B4B42}"/>
+              </a:ext>
+            </a:extLst>
+          </p:cNvPr>
+          <p:cNvSpPr txBox="1">
+            <a:spLocks/>
+          </p:cNvSpPr>
+          <p:nvPr/>
+        </p:nvSpPr>
+        <p:spPr>
+          <a:xfrm>
+            <a:off x="561358" y="1460740"/>
+            <a:ext cx="8738381" cy="4204413"/>
+          </a:xfrm>
+          <a:prstGeom prst="rect">
+            <a:avLst/>
+          </a:prstGeom>
+        </p:spPr>
+        <p:txBody>
+          <a:bodyPr vert="horz" wrap="square" lIns="0" tIns="0" rIns="0" bIns="0" rtlCol="0" anchor="t" anchorCtr="0">
+            <a:noAutofit/>
+          </a:bodyPr>
+          <a:lstStyle>
+            <a:lvl1pPr marL="228600" indent="-228600" algn="l" defTabSz="914400" rtl="0" eaLnBrk="1" latinLnBrk="0" hangingPunct="1">
+              <a:lnSpc>
+                <a:spcPct val="110000"/>
+              </a:lnSpc>
+              <a:spcBef>
+                <a:spcPts val="1000"/>
+              </a:spcBef>
+              <a:spcAft>
+                <a:spcPts val="800"/>
+              </a:spcAft>
+              <a:buFont typeface="Arial" panose="020B0604020202020204" pitchFamily="34" charset="0"/>
+              <a:buNone/>
+              <a:defRPr sz="2000" kern="1200">
+                <a:solidFill>
+                  <a:schemeClr val="tx1">
+                    <a:alpha val="60000"/>
+                  </a:schemeClr>
+                </a:solidFill>
+                <a:latin typeface="+mn-lt"/>
+                <a:ea typeface="+mn-ea"/>
+                <a:cs typeface="+mn-cs"/>
+              </a:defRPr>
+            </a:lvl1pPr>
+            <a:lvl2pPr marL="685800" indent="-228600" algn="l" defTabSz="914400" rtl="0" eaLnBrk="1" latinLnBrk="0" hangingPunct="1">
+              <a:lnSpc>
+                <a:spcPct val="110000"/>
+              </a:lnSpc>
+              <a:spcBef>
+                <a:spcPts val="500"/>
+              </a:spcBef>
+              <a:spcAft>
+                <a:spcPts val="800"/>
+              </a:spcAft>
+              <a:buFont typeface="Arial" panose="020B0604020202020204" pitchFamily="34" charset="0"/>
+              <a:buChar char="•"/>
+              <a:defRPr sz="1400" kern="1200">
+                <a:solidFill>
+                  <a:schemeClr val="tx1">
+                    <a:alpha val="60000"/>
+                  </a:schemeClr>
+                </a:solidFill>
+                <a:latin typeface="+mn-lt"/>
+                <a:ea typeface="+mn-ea"/>
+                <a:cs typeface="+mn-cs"/>
+              </a:defRPr>
+            </a:lvl2pPr>
+            <a:lvl3pPr marL="1143000" indent="-228600" algn="l" defTabSz="914400" rtl="0" eaLnBrk="1" latinLnBrk="0" hangingPunct="1">
+              <a:lnSpc>
+                <a:spcPct val="110000"/>
+              </a:lnSpc>
+              <a:spcBef>
+                <a:spcPts val="500"/>
+              </a:spcBef>
+              <a:spcAft>
+                <a:spcPts val="800"/>
+              </a:spcAft>
+              <a:buFont typeface="Arial" panose="020B0604020202020204" pitchFamily="34" charset="0"/>
+              <a:buChar char="•"/>
+              <a:defRPr sz="1400" kern="1200">
+                <a:solidFill>
+                  <a:schemeClr val="tx1">
+                    <a:alpha val="60000"/>
+                  </a:schemeClr>
+                </a:solidFill>
+                <a:latin typeface="+mn-lt"/>
+                <a:ea typeface="+mn-ea"/>
+                <a:cs typeface="+mn-cs"/>
+              </a:defRPr>
+            </a:lvl3pPr>
+            <a:lvl4pPr marL="1600200" indent="-228600" algn="l" defTabSz="914400" rtl="0" eaLnBrk="1" latinLnBrk="0" hangingPunct="1">
+              <a:lnSpc>
+                <a:spcPct val="110000"/>
+              </a:lnSpc>
+              <a:spcBef>
+                <a:spcPts val="500"/>
+              </a:spcBef>
+              <a:spcAft>
+                <a:spcPts val="800"/>
+              </a:spcAft>
+              <a:buFont typeface="Arial" panose="020B0604020202020204" pitchFamily="34" charset="0"/>
+              <a:buChar char="•"/>
+              <a:defRPr sz="1400" kern="1200">
+                <a:solidFill>
+                  <a:schemeClr val="tx1">
+                    <a:alpha val="60000"/>
+                  </a:schemeClr>
+                </a:solidFill>
+                <a:latin typeface="+mn-lt"/>
+                <a:ea typeface="+mn-ea"/>
+                <a:cs typeface="+mn-cs"/>
+              </a:defRPr>
+            </a:lvl4pPr>
+            <a:lvl5pPr marL="2057400" indent="-228600" algn="l" defTabSz="914400" rtl="0" eaLnBrk="1" latinLnBrk="0" hangingPunct="1">
+              <a:lnSpc>
+                <a:spcPct val="110000"/>
+              </a:lnSpc>
+              <a:spcBef>
+                <a:spcPts val="500"/>
+              </a:spcBef>
+              <a:spcAft>
+                <a:spcPts val="800"/>
+              </a:spcAft>
+              <a:buFont typeface="Arial" panose="020B0604020202020204" pitchFamily="34" charset="0"/>
+              <a:buChar char="•"/>
+              <a:defRPr sz="1400" kern="1200">
+                <a:solidFill>
+                  <a:schemeClr val="tx1">
+                    <a:alpha val="60000"/>
+                  </a:schemeClr>
+                </a:solidFill>
+                <a:latin typeface="+mn-lt"/>
+                <a:ea typeface="+mn-ea"/>
+                <a:cs typeface="+mn-cs"/>
+              </a:defRPr>
+            </a:lvl5pPr>
+            <a:lvl6pPr marL="2514600" indent="-228600" algn="l" defTabSz="914400" rtl="0" eaLnBrk="1" latinLnBrk="0" hangingPunct="1">
+              <a:lnSpc>
+                <a:spcPct val="90000"/>
+              </a:lnSpc>
+              <a:spcBef>
+                <a:spcPts val="500"/>
+              </a:spcBef>
+              <a:buFont typeface="Arial" panose="020B0604020202020204" pitchFamily="34" charset="0"/>
+              <a:buChar char="•"/>
+              <a:defRPr sz="1800" kern="1200">
+                <a:solidFill>
+                  <a:schemeClr val="tx1"/>
+                </a:solidFill>
+                <a:latin typeface="+mn-lt"/>
+                <a:ea typeface="+mn-ea"/>
+                <a:cs typeface="+mn-cs"/>
+              </a:defRPr>
+            </a:lvl6pPr>
+            <a:lvl7pPr marL="2971800" indent="-228600" algn="l" defTabSz="914400" rtl="0" eaLnBrk="1" latinLnBrk="0" hangingPunct="1">
+              <a:lnSpc>
+                <a:spcPct val="90000"/>
+              </a:lnSpc>
+              <a:spcBef>
+                <a:spcPts val="500"/>
+              </a:spcBef>
+              <a:buFont typeface="Arial" panose="020B0604020202020204" pitchFamily="34" charset="0"/>
+              <a:buChar char="•"/>
+              <a:defRPr sz="1800" kern="1200">
+                <a:solidFill>
+                  <a:schemeClr val="tx1"/>
+                </a:solidFill>
+                <a:latin typeface="+mn-lt"/>
+                <a:ea typeface="+mn-ea"/>
+                <a:cs typeface="+mn-cs"/>
+              </a:defRPr>
+            </a:lvl7pPr>
+            <a:lvl8pPr marL="3429000" indent="-228600" algn="l" defTabSz="914400" rtl="0" eaLnBrk="1" latinLnBrk="0" hangingPunct="1">
+              <a:lnSpc>
+                <a:spcPct val="90000"/>
+              </a:lnSpc>
+              <a:spcBef>
+                <a:spcPts val="500"/>
+              </a:spcBef>
+              <a:buFont typeface="Arial" panose="020B0604020202020204" pitchFamily="34" charset="0"/>
+              <a:buChar char="•"/>
+              <a:defRPr sz="1800" kern="1200">
+                <a:solidFill>
+                  <a:schemeClr val="tx1"/>
+                </a:solidFill>
+                <a:latin typeface="+mn-lt"/>
+                <a:ea typeface="+mn-ea"/>
+                <a:cs typeface="+mn-cs"/>
+              </a:defRPr>
+            </a:lvl8pPr>
+            <a:lvl9pPr marL="3886200" indent="-228600" algn="l" defTabSz="914400" rtl="0" eaLnBrk="1" latinLnBrk="0" hangingPunct="1">
+              <a:lnSpc>
+                <a:spcPct val="90000"/>
+              </a:lnSpc>
+              <a:spcBef>
+                <a:spcPts val="500"/>
+              </a:spcBef>
+              <a:buFont typeface="Arial" panose="020B0604020202020204" pitchFamily="34" charset="0"/>
+              <a:buChar char="•"/>
+              <a:defRPr sz="1800" kern="1200">
+                <a:solidFill>
+                  <a:schemeClr val="tx1"/>
+                </a:solidFill>
+                <a:latin typeface="+mn-lt"/>
+                <a:ea typeface="+mn-ea"/>
+                <a:cs typeface="+mn-cs"/>
+              </a:defRPr>
+            </a:lvl9pPr>
+          </a:lstStyle>
+          <a:p>
+            <a:pPr marL="0" indent="0">
+              <a:spcAft>
+                <a:spcPts val="0"/>
+              </a:spcAft>
+            </a:pPr>
+            <a:r>
+              <a:rPr lang="en-US" sz="1800" i="1" dirty="0">
+                <a:latin typeface="Arial" panose="020B0604020202020204" pitchFamily="34" charset="0"/>
+                <a:ea typeface="+mn-lt"/>
+                <a:cs typeface="Arial" panose="020B0604020202020204" pitchFamily="34" charset="0"/>
+              </a:rPr>
+              <a:t>This workflow will be completed while the fieldworker is in the field</a:t>
+            </a:r>
+            <a:endParaRPr lang="en-US" sz="1800" dirty="0">
+              <a:latin typeface="Arial" panose="020B0604020202020204" pitchFamily="34" charset="0"/>
+              <a:ea typeface="+mn-lt"/>
+              <a:cs typeface="Arial" panose="020B0604020202020204" pitchFamily="34" charset="0"/>
+            </a:endParaRPr>
+          </a:p>
+          <a:p>
+            <a:pPr marL="457200" indent="-457200">
+              <a:spcAft>
+                <a:spcPts val="0"/>
+              </a:spcAft>
+              <a:buFont typeface="Arial" panose="020B0604020202020204" pitchFamily="34" charset="0"/>
+              <a:buAutoNum type="arabicPeriod"/>
+            </a:pPr>
+            <a:r>
+              <a:rPr lang="en-US" sz="1800" dirty="0">
+                <a:latin typeface="Arial" panose="020B0604020202020204" pitchFamily="34" charset="0"/>
+                <a:ea typeface="+mn-lt"/>
+                <a:cs typeface="Arial" panose="020B0604020202020204" pitchFamily="34" charset="0"/>
+              </a:rPr>
               <a:t>From Step 6 on previous slide, Survey for location will automatically open</a:t>
             </a:r>
           </a:p>
@@ -28904,7 +29798,7 @@
 </p:sld>
 </file>
 
-<file path=ppt/slides/slide6.xml><?xml version="1.0" encoding="utf-8"?>
+<file path=ppt/slides/slide7.xml><?xml version="1.0" encoding="utf-8"?>
 <p:sld xmlns:a="http://schemas.openxmlformats.org/drawingml/2006/main" xmlns:r="http://schemas.openxmlformats.org/officeDocument/2006/relationships" xmlns:p="http://schemas.openxmlformats.org/presentationml/2006/main">
   <p:cSld>
     <p:spTree>
@@ -28949,9 +29843,13 @@
           <a:p>
             <a:r>
               <a:rPr lang="en-US" sz="4400" dirty="0"/>
-              <a:t>Options for Saving Survey123</a:t>
+              <a:t>Options for Saving Survey123 </a:t>
             </a:r>
-            <a:endParaRPr lang="en-US" sz="4400" dirty="0">
+            <a:r>
+              <a:rPr lang="en-US" sz="3200" dirty="0"/>
+              <a:t>(In the Field)</a:t>
+            </a:r>
+            <a:endParaRPr lang="en-US" sz="3200" dirty="0">
               <a:solidFill>
                 <a:schemeClr val="accent3">
                   <a:lumMod val="60000"/>
@@ -31059,45 +31957,6 @@
 </file>
 
 <file path=customXml/item2.xml><?xml version="1.0" encoding="utf-8"?>
-<p:properties xmlns:p="http://schemas.microsoft.com/office/2006/metadata/properties" xmlns:xsi="http://www.w3.org/2001/XMLSchema-instance" xmlns:pc="http://schemas.microsoft.com/office/infopath/2007/PartnerControls">
-  <documentManagement>
-    <MediaServiceKeyPoints xmlns="a37483bb-355d-4cde-a7e8-a7b4efd217ae" xsi:nil="true"/>
-    <SharedWithUsers xmlns="dcdee733-fb76-4ecc-9fd9-c176319f5bd5">
-      <UserInfo>
-        <DisplayName>Derek Hoshijo</DisplayName>
-        <AccountId>26</AccountId>
-        <AccountType/>
-      </UserInfo>
-      <UserInfo>
-        <DisplayName>Luci Coleman</DisplayName>
-        <AccountId>30</AccountId>
-        <AccountType/>
-      </UserInfo>
-      <UserInfo>
-        <DisplayName>Michael Green</DisplayName>
-        <AccountId>23</AccountId>
-        <AccountType/>
-      </UserInfo>
-      <UserInfo>
-        <DisplayName>Morgan Ripp</DisplayName>
-        <AccountId>33</AccountId>
-        <AccountType/>
-      </UserInfo>
-      <UserInfo>
-        <DisplayName>Shianne Hancock</DisplayName>
-        <AccountId>9</AccountId>
-        <AccountType/>
-      </UserInfo>
-    </SharedWithUsers>
-    <lcf76f155ced4ddcb4097134ff3c332f xmlns="a37483bb-355d-4cde-a7e8-a7b4efd217ae">
-      <Terms xmlns="http://schemas.microsoft.com/office/infopath/2007/PartnerControls"/>
-    </lcf76f155ced4ddcb4097134ff3c332f>
-    <TaxCatchAll xmlns="dcdee733-fb76-4ecc-9fd9-c176319f5bd5" xsi:nil="true"/>
-  </documentManagement>
-</p:properties>
-</file>
-
-<file path=customXml/item3.xml><?xml version="1.0" encoding="utf-8"?>
 <ct:contentTypeSchema xmlns:ct="http://schemas.microsoft.com/office/2006/metadata/contentType" xmlns:ma="http://schemas.microsoft.com/office/2006/metadata/properties/metaAttributes" ct:_="" ma:_="" ma:contentTypeName="Document" ma:contentTypeID="0x010100BE0EA4252DA4C44392747A616AA88B25" ma:contentTypeVersion="15" ma:contentTypeDescription="Create a new document." ma:contentTypeScope="" ma:versionID="fe6ef71d6c346ae31fda0586df2badae">
   <xsd:schema xmlns:xsd="http://www.w3.org/2001/XMLSchema" xmlns:xs="http://www.w3.org/2001/XMLSchema" xmlns:p="http://schemas.microsoft.com/office/2006/metadata/properties" xmlns:ns2="a37483bb-355d-4cde-a7e8-a7b4efd217ae" xmlns:ns3="dcdee733-fb76-4ecc-9fd9-c176319f5bd5" targetNamespace="http://schemas.microsoft.com/office/2006/metadata/properties" ma:root="true" ma:fieldsID="1b930b4465c725f12df9bf3c6bc1a927" ns2:_="" ns3:_="">
     <xsd:import namespace="a37483bb-355d-4cde-a7e8-a7b4efd217ae"/>
@@ -31334,6 +32193,45 @@
 </ct:contentTypeSchema>
 </file>
 
+<file path=customXml/item3.xml><?xml version="1.0" encoding="utf-8"?>
+<p:properties xmlns:p="http://schemas.microsoft.com/office/2006/metadata/properties" xmlns:xsi="http://www.w3.org/2001/XMLSchema-instance" xmlns:pc="http://schemas.microsoft.com/office/infopath/2007/PartnerControls">
+  <documentManagement>
+    <MediaServiceKeyPoints xmlns="a37483bb-355d-4cde-a7e8-a7b4efd217ae" xsi:nil="true"/>
+    <SharedWithUsers xmlns="dcdee733-fb76-4ecc-9fd9-c176319f5bd5">
+      <UserInfo>
+        <DisplayName>Derek Hoshijo</DisplayName>
+        <AccountId>26</AccountId>
+        <AccountType/>
+      </UserInfo>
+      <UserInfo>
+        <DisplayName>Luci Coleman</DisplayName>
+        <AccountId>30</AccountId>
+        <AccountType/>
+      </UserInfo>
+      <UserInfo>
+        <DisplayName>Michael Green</DisplayName>
+        <AccountId>23</AccountId>
+        <AccountType/>
+      </UserInfo>
+      <UserInfo>
+        <DisplayName>Morgan Ripp</DisplayName>
+        <AccountId>33</AccountId>
+        <AccountType/>
+      </UserInfo>
+      <UserInfo>
+        <DisplayName>Shianne Hancock</DisplayName>
+        <AccountId>9</AccountId>
+        <AccountType/>
+      </UserInfo>
+    </SharedWithUsers>
+    <lcf76f155ced4ddcb4097134ff3c332f xmlns="a37483bb-355d-4cde-a7e8-a7b4efd217ae">
+      <Terms xmlns="http://schemas.microsoft.com/office/infopath/2007/PartnerControls"/>
+    </lcf76f155ced4ddcb4097134ff3c332f>
+    <TaxCatchAll xmlns="dcdee733-fb76-4ecc-9fd9-c176319f5bd5" xsi:nil="true"/>
+  </documentManagement>
+</p:properties>
+</file>
+
 <file path=customXml/itemProps1.xml><?xml version="1.0" encoding="utf-8"?>
 <ds:datastoreItem xmlns:ds="http://schemas.openxmlformats.org/officeDocument/2006/customXml" ds:itemID="{904751AB-E840-446F-8D49-E697067EC887}">
   <ds:schemaRefs>
@@ -31343,23 +32241,6 @@
 </file>
 
 <file path=customXml/itemProps2.xml><?xml version="1.0" encoding="utf-8"?>
-<ds:datastoreItem xmlns:ds="http://schemas.openxmlformats.org/officeDocument/2006/customXml" ds:itemID="{50811A92-D464-4AC4-A396-BA73B10CEEAC}">
-  <ds:schemaRefs>
-    <ds:schemaRef ds:uri="a37483bb-355d-4cde-a7e8-a7b4efd217ae"/>
-    <ds:schemaRef ds:uri="dcdee733-fb76-4ecc-9fd9-c176319f5bd5"/>
-    <ds:schemaRef ds:uri="http://purl.org/dc/dcmitype/"/>
-    <ds:schemaRef ds:uri="http://purl.org/dc/elements/1.1/"/>
-    <ds:schemaRef ds:uri="http://purl.org/dc/terms/"/>
-    <ds:schemaRef ds:uri="http://schemas.microsoft.com/office/2006/documentManagement/types"/>
-    <ds:schemaRef ds:uri="http://schemas.microsoft.com/office/2006/metadata/properties"/>
-    <ds:schemaRef ds:uri="http://schemas.microsoft.com/office/infopath/2007/PartnerControls"/>
-    <ds:schemaRef ds:uri="http://schemas.openxmlformats.org/package/2006/metadata/core-properties"/>
-    <ds:schemaRef ds:uri="http://www.w3.org/XML/1998/namespace"/>
-  </ds:schemaRefs>
-</ds:datastoreItem>
-</file>
-
-<file path=customXml/itemProps3.xml><?xml version="1.0" encoding="utf-8"?>
 <ds:datastoreItem xmlns:ds="http://schemas.openxmlformats.org/officeDocument/2006/customXml" ds:itemID="{94560A0A-620D-4757-BDEF-5770E4172447}">
   <ds:schemaRefs>
     <ds:schemaRef ds:uri="a37483bb-355d-4cde-a7e8-a7b4efd217ae"/>
@@ -31378,6 +32259,23 @@
 </ds:datastoreItem>
 </file>
 
+<file path=customXml/itemProps3.xml><?xml version="1.0" encoding="utf-8"?>
+<ds:datastoreItem xmlns:ds="http://schemas.openxmlformats.org/officeDocument/2006/customXml" ds:itemID="{50811A92-D464-4AC4-A396-BA73B10CEEAC}">
+  <ds:schemaRefs>
+    <ds:schemaRef ds:uri="a37483bb-355d-4cde-a7e8-a7b4efd217ae"/>
+    <ds:schemaRef ds:uri="dcdee733-fb76-4ecc-9fd9-c176319f5bd5"/>
+    <ds:schemaRef ds:uri="http://purl.org/dc/dcmitype/"/>
+    <ds:schemaRef ds:uri="http://purl.org/dc/elements/1.1/"/>
+    <ds:schemaRef ds:uri="http://purl.org/dc/terms/"/>
+    <ds:schemaRef ds:uri="http://schemas.microsoft.com/office/2006/documentManagement/types"/>
+    <ds:schemaRef ds:uri="http://schemas.microsoft.com/office/2006/metadata/properties"/>
+    <ds:schemaRef ds:uri="http://schemas.microsoft.com/office/infopath/2007/PartnerControls"/>
+    <ds:schemaRef ds:uri="http://schemas.openxmlformats.org/package/2006/metadata/core-properties"/>
+    <ds:schemaRef ds:uri="http://www.w3.org/XML/1998/namespace"/>
+  </ds:schemaRefs>
+</ds:datastoreItem>
+</file>
+
 <file path=docMetadata/LabelInfo.xml><?xml version="1.0" encoding="utf-8"?>
 <clbl:labelList xmlns:clbl="http://schemas.microsoft.com/office/2020/mipLabelMetadata">
   <clbl:label id="{aee6e3c9-711e-4c7c-bd27-04f2307db20d}" enabled="0" method="" siteId="{aee6e3c9-711e-4c7c-bd27-04f2307db20d}" removed="1"/>

</xml_diff>

<commit_message>
Removed the Field Maps section
</commit_message>
<xml_diff>
--- a/documents/user_guides/Hydrologic-Monitoring-Project-Fieldwork-Instructions.pptx
+++ b/documents/user_guides/Hydrologic-Monitoring-Project-Fieldwork-Instructions.pptx
@@ -7,10 +7,10 @@
     <p:sldMasterId id="2147483751" r:id="rId6"/>
   </p:sldMasterIdLst>
   <p:notesMasterIdLst>
-    <p:notesMasterId r:id="rId21"/>
+    <p:notesMasterId r:id="rId17"/>
   </p:notesMasterIdLst>
   <p:handoutMasterIdLst>
-    <p:handoutMasterId r:id="rId22"/>
+    <p:handoutMasterId r:id="rId18"/>
   </p:handoutMasterIdLst>
   <p:sldIdLst>
     <p:sldId id="646" r:id="rId7"/>
@@ -23,10 +23,6 @@
     <p:sldId id="652" r:id="rId14"/>
     <p:sldId id="658" r:id="rId15"/>
     <p:sldId id="659" r:id="rId16"/>
-    <p:sldId id="655" r:id="rId17"/>
-    <p:sldId id="657" r:id="rId18"/>
-    <p:sldId id="651" r:id="rId19"/>
-    <p:sldId id="647" r:id="rId20"/>
   </p:sldIdLst>
   <p:sldSz cx="12192000" cy="6858000"/>
   <p:notesSz cx="7010400" cy="9296400"/>
@@ -253,7 +249,7 @@
           <a:p>
             <a:fld id="{C17F2C1D-F243-42AB-ADF2-E7CB4E04900E}" type="datetimeFigureOut">
               <a:rPr lang="en-US" smtClean="0"/>
-              <a:t>03/17/2025</a:t>
+              <a:t>3/20/2025</a:t>
             </a:fld>
             <a:endParaRPr lang="en-US"/>
           </a:p>
@@ -430,7 +426,7 @@
           <a:p>
             <a:fld id="{020CE34E-5667-4A32-A6BA-10C7A552BC63}" type="datetimeFigureOut">
               <a:rPr lang="en-US" smtClean="0"/>
-              <a:t>03/17/2025</a:t>
+              <a:t>3/20/2025</a:t>
             </a:fld>
             <a:endParaRPr lang="en-US"/>
           </a:p>
@@ -6842,7 +6838,7 @@
           <a:p>
             <a:fld id="{6EC91B51-25EE-0147-9293-37E16A70024E}" type="datetime1">
               <a:rPr lang="en-US" smtClean="0"/>
-              <a:t>03/17/2025</a:t>
+              <a:t>3/20/2025</a:t>
             </a:fld>
             <a:endParaRPr lang="en-US"/>
           </a:p>
@@ -7088,7 +7084,7 @@
           <a:p>
             <a:fld id="{06DEFD86-78C4-084A-B0B5-04A7A3431B39}" type="datetime1">
               <a:rPr lang="en-US" smtClean="0"/>
-              <a:t>03/17/2025</a:t>
+              <a:t>3/20/2025</a:t>
             </a:fld>
             <a:endParaRPr lang="en-US"/>
           </a:p>
@@ -7385,7 +7381,7 @@
           <a:p>
             <a:fld id="{7D5DF95B-0B80-6A4D-A813-6F9D9F38EBA2}" type="datetime1">
               <a:rPr lang="en-US" smtClean="0"/>
-              <a:t>03/17/2025</a:t>
+              <a:t>3/20/2025</a:t>
             </a:fld>
             <a:endParaRPr lang="en-US"/>
           </a:p>
@@ -8633,7 +8629,7 @@
           <a:p>
             <a:fld id="{14E55AC9-5819-304B-AB8A-EC561A98EE59}" type="datetime1">
               <a:rPr lang="en-US" smtClean="0"/>
-              <a:t>03/17/2025</a:t>
+              <a:t>3/20/2025</a:t>
             </a:fld>
             <a:endParaRPr lang="en-US"/>
           </a:p>
@@ -9109,7 +9105,7 @@
           <a:p>
             <a:fld id="{9874F111-1245-FB4C-ACB7-129F68E66232}" type="datetime1">
               <a:rPr lang="en-US" smtClean="0"/>
-              <a:t>03/17/2025</a:t>
+              <a:t>3/20/2025</a:t>
             </a:fld>
             <a:endParaRPr lang="en-US"/>
           </a:p>
@@ -9284,7 +9280,7 @@
           <a:p>
             <a:fld id="{380C21C6-642C-6F4C-B53C-06F3F35CEF14}" type="datetime1">
               <a:rPr lang="en-US" smtClean="0"/>
-              <a:t>03/17/2025</a:t>
+              <a:t>3/20/2025</a:t>
             </a:fld>
             <a:endParaRPr lang="en-US"/>
           </a:p>
@@ -9463,7 +9459,7 @@
           <a:p>
             <a:fld id="{8A0E3BE2-FFFE-0B46-AE5A-CBB4C5FEC6FC}" type="datetime1">
               <a:rPr lang="en-US" smtClean="0"/>
-              <a:t>03/17/2025</a:t>
+              <a:t>3/20/2025</a:t>
             </a:fld>
             <a:endParaRPr lang="en-US"/>
           </a:p>
@@ -9616,7 +9612,7 @@
           <a:p>
             <a:fld id="{8861994C-B8B3-A740-949B-C8D716F26A7F}" type="datetime1">
               <a:rPr lang="en-US" smtClean="0"/>
-              <a:t>03/17/2025</a:t>
+              <a:t>3/20/2025</a:t>
             </a:fld>
             <a:endParaRPr lang="en-US"/>
           </a:p>
@@ -10353,7 +10349,7 @@
           <a:p>
             <a:fld id="{CF17F20F-8413-1548-BF61-558511100DB7}" type="datetime1">
               <a:rPr lang="en-US" smtClean="0"/>
-              <a:t>03/17/2025</a:t>
+              <a:t>3/20/2025</a:t>
             </a:fld>
             <a:endParaRPr lang="en-US"/>
           </a:p>
@@ -11037,7 +11033,7 @@
           <a:p>
             <a:fld id="{5D6FA6FB-FDD3-A446-B5AE-30BBE73852D8}" type="datetime1">
               <a:rPr lang="en-US" smtClean="0"/>
-              <a:t>03/17/2025</a:t>
+              <a:t>3/20/2025</a:t>
             </a:fld>
             <a:endParaRPr lang="en-US"/>
           </a:p>
@@ -11231,7 +11227,7 @@
           <a:p>
             <a:fld id="{063D0726-017F-9249-8B2E-2A4DDB444ED8}" type="datetime1">
               <a:rPr lang="en-US" smtClean="0"/>
-              <a:t>03/17/2025</a:t>
+              <a:t>3/20/2025</a:t>
             </a:fld>
             <a:endParaRPr lang="en-US"/>
           </a:p>
@@ -11488,7 +11484,7 @@
           <a:p>
             <a:fld id="{1D77C214-390A-F944-BF27-73F37F4360F9}" type="datetime1">
               <a:rPr lang="en-US" smtClean="0"/>
-              <a:t>03/17/2025</a:t>
+              <a:t>3/20/2025</a:t>
             </a:fld>
             <a:endParaRPr lang="en-US"/>
           </a:p>
@@ -11744,7 +11740,7 @@
           <a:p>
             <a:fld id="{76225C2B-15EC-3348-B6CD-75D75F51F610}" type="datetime1">
               <a:rPr lang="en-US" smtClean="0"/>
-              <a:t>03/17/2025</a:t>
+              <a:t>3/20/2025</a:t>
             </a:fld>
             <a:endParaRPr lang="en-US"/>
           </a:p>
@@ -13870,7 +13866,7 @@
           <a:p>
             <a:fld id="{6EC91B51-25EE-0147-9293-37E16A70024E}" type="datetime1">
               <a:rPr lang="en-US" smtClean="0"/>
-              <a:t>03/17/2025</a:t>
+              <a:t>3/20/2025</a:t>
             </a:fld>
             <a:endParaRPr lang="en-US"/>
           </a:p>
@@ -14116,7 +14112,7 @@
           <a:p>
             <a:fld id="{06DEFD86-78C4-084A-B0B5-04A7A3431B39}" type="datetime1">
               <a:rPr lang="en-US" smtClean="0"/>
-              <a:t>03/17/2025</a:t>
+              <a:t>3/20/2025</a:t>
             </a:fld>
             <a:endParaRPr lang="en-US"/>
           </a:p>
@@ -14413,7 +14409,7 @@
           <a:p>
             <a:fld id="{7D5DF95B-0B80-6A4D-A813-6F9D9F38EBA2}" type="datetime1">
               <a:rPr lang="en-US" smtClean="0"/>
-              <a:t>03/17/2025</a:t>
+              <a:t>3/20/2025</a:t>
             </a:fld>
             <a:endParaRPr lang="en-US"/>
           </a:p>
@@ -14742,7 +14738,7 @@
           <a:p>
             <a:fld id="{14E55AC9-5819-304B-AB8A-EC561A98EE59}" type="datetime1">
               <a:rPr lang="en-US" smtClean="0"/>
-              <a:t>03/17/2025</a:t>
+              <a:t>3/20/2025</a:t>
             </a:fld>
             <a:endParaRPr lang="en-US"/>
           </a:p>
@@ -15218,7 +15214,7 @@
           <a:p>
             <a:fld id="{9874F111-1245-FB4C-ACB7-129F68E66232}" type="datetime1">
               <a:rPr lang="en-US" smtClean="0"/>
-              <a:t>03/17/2025</a:t>
+              <a:t>3/20/2025</a:t>
             </a:fld>
             <a:endParaRPr lang="en-US"/>
           </a:p>
@@ -15393,7 +15389,7 @@
           <a:p>
             <a:fld id="{380C21C6-642C-6F4C-B53C-06F3F35CEF14}" type="datetime1">
               <a:rPr lang="en-US" smtClean="0"/>
-              <a:t>03/17/2025</a:t>
+              <a:t>3/20/2025</a:t>
             </a:fld>
             <a:endParaRPr lang="en-US"/>
           </a:p>
@@ -15572,7 +15568,7 @@
           <a:p>
             <a:fld id="{8A0E3BE2-FFFE-0B46-AE5A-CBB4C5FEC6FC}" type="datetime1">
               <a:rPr lang="en-US" smtClean="0"/>
-              <a:t>03/17/2025</a:t>
+              <a:t>3/20/2025</a:t>
             </a:fld>
             <a:endParaRPr lang="en-US"/>
           </a:p>
@@ -15725,7 +15721,7 @@
           <a:p>
             <a:fld id="{8861994C-B8B3-A740-949B-C8D716F26A7F}" type="datetime1">
               <a:rPr lang="en-US" smtClean="0"/>
-              <a:t>03/17/2025</a:t>
+              <a:t>3/20/2025</a:t>
             </a:fld>
             <a:endParaRPr lang="en-US"/>
           </a:p>
@@ -16462,7 +16458,7 @@
           <a:p>
             <a:fld id="{CF17F20F-8413-1548-BF61-558511100DB7}" type="datetime1">
               <a:rPr lang="en-US" smtClean="0"/>
-              <a:t>03/17/2025</a:t>
+              <a:t>3/20/2025</a:t>
             </a:fld>
             <a:endParaRPr lang="en-US"/>
           </a:p>
@@ -17520,7 +17516,7 @@
           <a:p>
             <a:fld id="{5D6FA6FB-FDD3-A446-B5AE-30BBE73852D8}" type="datetime1">
               <a:rPr lang="en-US" smtClean="0"/>
-              <a:t>03/17/2025</a:t>
+              <a:t>3/20/2025</a:t>
             </a:fld>
             <a:endParaRPr lang="en-US"/>
           </a:p>
@@ -17714,7 +17710,7 @@
           <a:p>
             <a:fld id="{063D0726-017F-9249-8B2E-2A4DDB444ED8}" type="datetime1">
               <a:rPr lang="en-US" smtClean="0"/>
-              <a:t>03/17/2025</a:t>
+              <a:t>3/20/2025</a:t>
             </a:fld>
             <a:endParaRPr lang="en-US"/>
           </a:p>
@@ -17971,7 +17967,7 @@
           <a:p>
             <a:fld id="{1D77C214-390A-F944-BF27-73F37F4360F9}" type="datetime1">
               <a:rPr lang="en-US" smtClean="0"/>
-              <a:t>03/17/2025</a:t>
+              <a:t>3/20/2025</a:t>
             </a:fld>
             <a:endParaRPr lang="en-US"/>
           </a:p>
@@ -18227,7 +18223,7 @@
           <a:p>
             <a:fld id="{76225C2B-15EC-3348-B6CD-75D75F51F610}" type="datetime1">
               <a:rPr lang="en-US" smtClean="0"/>
-              <a:t>03/17/2025</a:t>
+              <a:t>3/20/2025</a:t>
             </a:fld>
             <a:endParaRPr lang="en-US"/>
           </a:p>
@@ -24300,7 +24296,7 @@
           <a:p>
             <a:fld id="{9CE7E69C-4D79-BB49-9350-1FEE210EB4F7}" type="datetime1">
               <a:rPr lang="en-US" smtClean="0"/>
-              <a:t>03/17/2025</a:t>
+              <a:t>3/20/2025</a:t>
             </a:fld>
             <a:endParaRPr lang="en-US"/>
           </a:p>
@@ -24917,7 +24913,7 @@
           <a:p>
             <a:fld id="{9CE7E69C-4D79-BB49-9350-1FEE210EB4F7}" type="datetime1">
               <a:rPr lang="en-US" smtClean="0"/>
-              <a:t>03/17/2025</a:t>
+              <a:t>3/20/2025</a:t>
             </a:fld>
             <a:endParaRPr lang="en-US"/>
           </a:p>
@@ -26256,2939 +26252,6 @@
     <p:extLst>
       <p:ext uri="{BB962C8B-B14F-4D97-AF65-F5344CB8AC3E}">
         <p14:creationId xmlns:p14="http://schemas.microsoft.com/office/powerpoint/2010/main" val="3438806446"/>
-      </p:ext>
-    </p:extLst>
-  </p:cSld>
-  <p:clrMapOvr>
-    <a:masterClrMapping/>
-  </p:clrMapOvr>
-</p:sld>
-</file>
-
-<file path=ppt/slides/slide11.xml><?xml version="1.0" encoding="utf-8"?>
-<p:sld xmlns:a="http://schemas.openxmlformats.org/drawingml/2006/main" xmlns:r="http://schemas.openxmlformats.org/officeDocument/2006/relationships" xmlns:p="http://schemas.openxmlformats.org/presentationml/2006/main">
-  <p:cSld>
-    <p:spTree>
-      <p:nvGrpSpPr>
-        <p:cNvPr id="1" name=""/>
-        <p:cNvGrpSpPr/>
-        <p:nvPr/>
-      </p:nvGrpSpPr>
-      <p:grpSpPr>
-        <a:xfrm>
-          <a:off x="0" y="0"/>
-          <a:ext cx="0" cy="0"/>
-          <a:chOff x="0" y="0"/>
-          <a:chExt cx="0" cy="0"/>
-        </a:xfrm>
-      </p:grpSpPr>
-      <p:sp>
-        <p:nvSpPr>
-          <p:cNvPr id="2" name="Title 1">
-            <a:extLst>
-              <a:ext uri="{FF2B5EF4-FFF2-40B4-BE49-F238E27FC236}">
-                <a16:creationId xmlns:a16="http://schemas.microsoft.com/office/drawing/2014/main" id="{0046426E-F6F6-4A7C-9181-8C3090996261}"/>
-              </a:ext>
-            </a:extLst>
-          </p:cNvPr>
-          <p:cNvSpPr>
-            <a:spLocks noGrp="1"/>
-          </p:cNvSpPr>
-          <p:nvPr>
-            <p:ph type="title"/>
-          </p:nvPr>
-        </p:nvSpPr>
-        <p:spPr>
-          <a:xfrm>
-            <a:off x="550863" y="1086162"/>
-            <a:ext cx="5870484" cy="972066"/>
-          </a:xfrm>
-        </p:spPr>
-        <p:txBody>
-          <a:bodyPr/>
-          <a:lstStyle/>
-          <a:p>
-            <a:r>
-              <a:rPr lang="en-US" sz="4400" dirty="0"/>
-              <a:t>Field Maps</a:t>
-            </a:r>
-            <a:endParaRPr lang="en-US" sz="4400" dirty="0">
-              <a:solidFill>
-                <a:schemeClr val="accent3">
-                  <a:lumMod val="60000"/>
-                  <a:lumOff val="40000"/>
-                </a:schemeClr>
-              </a:solidFill>
-            </a:endParaRPr>
-          </a:p>
-        </p:txBody>
-      </p:sp>
-      <p:sp>
-        <p:nvSpPr>
-          <p:cNvPr id="5" name="Content Placeholder 5">
-            <a:extLst>
-              <a:ext uri="{FF2B5EF4-FFF2-40B4-BE49-F238E27FC236}">
-                <a16:creationId xmlns:a16="http://schemas.microsoft.com/office/drawing/2014/main" id="{0E19797D-8A74-F7A2-B94C-8687111B4B42}"/>
-              </a:ext>
-            </a:extLst>
-          </p:cNvPr>
-          <p:cNvSpPr txBox="1">
-            <a:spLocks/>
-          </p:cNvSpPr>
-          <p:nvPr/>
-        </p:nvSpPr>
-        <p:spPr>
-          <a:xfrm>
-            <a:off x="1912562" y="2511095"/>
-            <a:ext cx="9163667" cy="1588957"/>
-          </a:xfrm>
-          <a:prstGeom prst="rect">
-            <a:avLst/>
-          </a:prstGeom>
-        </p:spPr>
-        <p:txBody>
-          <a:bodyPr vert="horz" wrap="square" lIns="0" tIns="0" rIns="0" bIns="0" rtlCol="0" anchor="t" anchorCtr="0">
-            <a:noAutofit/>
-          </a:bodyPr>
-          <a:lstStyle>
-            <a:lvl1pPr marL="228600" indent="-228600" algn="l" defTabSz="914400" rtl="0" eaLnBrk="1" latinLnBrk="0" hangingPunct="1">
-              <a:lnSpc>
-                <a:spcPct val="110000"/>
-              </a:lnSpc>
-              <a:spcBef>
-                <a:spcPts val="1000"/>
-              </a:spcBef>
-              <a:spcAft>
-                <a:spcPts val="800"/>
-              </a:spcAft>
-              <a:buFont typeface="Arial" panose="020B0604020202020204" pitchFamily="34" charset="0"/>
-              <a:buNone/>
-              <a:defRPr sz="2000" kern="1200">
-                <a:solidFill>
-                  <a:schemeClr val="tx1">
-                    <a:alpha val="60000"/>
-                  </a:schemeClr>
-                </a:solidFill>
-                <a:latin typeface="+mn-lt"/>
-                <a:ea typeface="+mn-ea"/>
-                <a:cs typeface="+mn-cs"/>
-              </a:defRPr>
-            </a:lvl1pPr>
-            <a:lvl2pPr marL="685800" indent="-228600" algn="l" defTabSz="914400" rtl="0" eaLnBrk="1" latinLnBrk="0" hangingPunct="1">
-              <a:lnSpc>
-                <a:spcPct val="110000"/>
-              </a:lnSpc>
-              <a:spcBef>
-                <a:spcPts val="500"/>
-              </a:spcBef>
-              <a:spcAft>
-                <a:spcPts val="800"/>
-              </a:spcAft>
-              <a:buFont typeface="Arial" panose="020B0604020202020204" pitchFamily="34" charset="0"/>
-              <a:buChar char="•"/>
-              <a:defRPr sz="1400" kern="1200">
-                <a:solidFill>
-                  <a:schemeClr val="tx1">
-                    <a:alpha val="60000"/>
-                  </a:schemeClr>
-                </a:solidFill>
-                <a:latin typeface="+mn-lt"/>
-                <a:ea typeface="+mn-ea"/>
-                <a:cs typeface="+mn-cs"/>
-              </a:defRPr>
-            </a:lvl2pPr>
-            <a:lvl3pPr marL="1143000" indent="-228600" algn="l" defTabSz="914400" rtl="0" eaLnBrk="1" latinLnBrk="0" hangingPunct="1">
-              <a:lnSpc>
-                <a:spcPct val="110000"/>
-              </a:lnSpc>
-              <a:spcBef>
-                <a:spcPts val="500"/>
-              </a:spcBef>
-              <a:spcAft>
-                <a:spcPts val="800"/>
-              </a:spcAft>
-              <a:buFont typeface="Arial" panose="020B0604020202020204" pitchFamily="34" charset="0"/>
-              <a:buChar char="•"/>
-              <a:defRPr sz="1400" kern="1200">
-                <a:solidFill>
-                  <a:schemeClr val="tx1">
-                    <a:alpha val="60000"/>
-                  </a:schemeClr>
-                </a:solidFill>
-                <a:latin typeface="+mn-lt"/>
-                <a:ea typeface="+mn-ea"/>
-                <a:cs typeface="+mn-cs"/>
-              </a:defRPr>
-            </a:lvl3pPr>
-            <a:lvl4pPr marL="1600200" indent="-228600" algn="l" defTabSz="914400" rtl="0" eaLnBrk="1" latinLnBrk="0" hangingPunct="1">
-              <a:lnSpc>
-                <a:spcPct val="110000"/>
-              </a:lnSpc>
-              <a:spcBef>
-                <a:spcPts val="500"/>
-              </a:spcBef>
-              <a:spcAft>
-                <a:spcPts val="800"/>
-              </a:spcAft>
-              <a:buFont typeface="Arial" panose="020B0604020202020204" pitchFamily="34" charset="0"/>
-              <a:buChar char="•"/>
-              <a:defRPr sz="1400" kern="1200">
-                <a:solidFill>
-                  <a:schemeClr val="tx1">
-                    <a:alpha val="60000"/>
-                  </a:schemeClr>
-                </a:solidFill>
-                <a:latin typeface="+mn-lt"/>
-                <a:ea typeface="+mn-ea"/>
-                <a:cs typeface="+mn-cs"/>
-              </a:defRPr>
-            </a:lvl4pPr>
-            <a:lvl5pPr marL="2057400" indent="-228600" algn="l" defTabSz="914400" rtl="0" eaLnBrk="1" latinLnBrk="0" hangingPunct="1">
-              <a:lnSpc>
-                <a:spcPct val="110000"/>
-              </a:lnSpc>
-              <a:spcBef>
-                <a:spcPts val="500"/>
-              </a:spcBef>
-              <a:spcAft>
-                <a:spcPts val="800"/>
-              </a:spcAft>
-              <a:buFont typeface="Arial" panose="020B0604020202020204" pitchFamily="34" charset="0"/>
-              <a:buChar char="•"/>
-              <a:defRPr sz="1400" kern="1200">
-                <a:solidFill>
-                  <a:schemeClr val="tx1">
-                    <a:alpha val="60000"/>
-                  </a:schemeClr>
-                </a:solidFill>
-                <a:latin typeface="+mn-lt"/>
-                <a:ea typeface="+mn-ea"/>
-                <a:cs typeface="+mn-cs"/>
-              </a:defRPr>
-            </a:lvl5pPr>
-            <a:lvl6pPr marL="2514600" indent="-228600" algn="l" defTabSz="914400" rtl="0" eaLnBrk="1" latinLnBrk="0" hangingPunct="1">
-              <a:lnSpc>
-                <a:spcPct val="90000"/>
-              </a:lnSpc>
-              <a:spcBef>
-                <a:spcPts val="500"/>
-              </a:spcBef>
-              <a:buFont typeface="Arial" panose="020B0604020202020204" pitchFamily="34" charset="0"/>
-              <a:buChar char="•"/>
-              <a:defRPr sz="1800" kern="1200">
-                <a:solidFill>
-                  <a:schemeClr val="tx1"/>
-                </a:solidFill>
-                <a:latin typeface="+mn-lt"/>
-                <a:ea typeface="+mn-ea"/>
-                <a:cs typeface="+mn-cs"/>
-              </a:defRPr>
-            </a:lvl6pPr>
-            <a:lvl7pPr marL="2971800" indent="-228600" algn="l" defTabSz="914400" rtl="0" eaLnBrk="1" latinLnBrk="0" hangingPunct="1">
-              <a:lnSpc>
-                <a:spcPct val="90000"/>
-              </a:lnSpc>
-              <a:spcBef>
-                <a:spcPts val="500"/>
-              </a:spcBef>
-              <a:buFont typeface="Arial" panose="020B0604020202020204" pitchFamily="34" charset="0"/>
-              <a:buChar char="•"/>
-              <a:defRPr sz="1800" kern="1200">
-                <a:solidFill>
-                  <a:schemeClr val="tx1"/>
-                </a:solidFill>
-                <a:latin typeface="+mn-lt"/>
-                <a:ea typeface="+mn-ea"/>
-                <a:cs typeface="+mn-cs"/>
-              </a:defRPr>
-            </a:lvl7pPr>
-            <a:lvl8pPr marL="3429000" indent="-228600" algn="l" defTabSz="914400" rtl="0" eaLnBrk="1" latinLnBrk="0" hangingPunct="1">
-              <a:lnSpc>
-                <a:spcPct val="90000"/>
-              </a:lnSpc>
-              <a:spcBef>
-                <a:spcPts val="500"/>
-              </a:spcBef>
-              <a:buFont typeface="Arial" panose="020B0604020202020204" pitchFamily="34" charset="0"/>
-              <a:buChar char="•"/>
-              <a:defRPr sz="1800" kern="1200">
-                <a:solidFill>
-                  <a:schemeClr val="tx1"/>
-                </a:solidFill>
-                <a:latin typeface="+mn-lt"/>
-                <a:ea typeface="+mn-ea"/>
-                <a:cs typeface="+mn-cs"/>
-              </a:defRPr>
-            </a:lvl8pPr>
-            <a:lvl9pPr marL="3886200" indent="-228600" algn="l" defTabSz="914400" rtl="0" eaLnBrk="1" latinLnBrk="0" hangingPunct="1">
-              <a:lnSpc>
-                <a:spcPct val="90000"/>
-              </a:lnSpc>
-              <a:spcBef>
-                <a:spcPts val="500"/>
-              </a:spcBef>
-              <a:buFont typeface="Arial" panose="020B0604020202020204" pitchFamily="34" charset="0"/>
-              <a:buChar char="•"/>
-              <a:defRPr sz="1800" kern="1200">
-                <a:solidFill>
-                  <a:schemeClr val="tx1"/>
-                </a:solidFill>
-                <a:latin typeface="+mn-lt"/>
-                <a:ea typeface="+mn-ea"/>
-                <a:cs typeface="+mn-cs"/>
-              </a:defRPr>
-            </a:lvl9pPr>
-          </a:lstStyle>
-          <a:p>
-            <a:pPr marL="0" indent="0">
-              <a:spcBef>
-                <a:spcPts val="0"/>
-              </a:spcBef>
-              <a:spcAft>
-                <a:spcPts val="0"/>
-              </a:spcAft>
-            </a:pPr>
-            <a:r>
-              <a:rPr lang="en-US" dirty="0">
-                <a:ea typeface="+mn-lt"/>
-                <a:cs typeface="+mn-lt"/>
-              </a:rPr>
-              <a:t>Field Maps Application</a:t>
-            </a:r>
-          </a:p>
-          <a:p>
-            <a:pPr lvl="1">
-              <a:spcBef>
-                <a:spcPts val="0"/>
-              </a:spcBef>
-              <a:spcAft>
-                <a:spcPts val="0"/>
-              </a:spcAft>
-            </a:pPr>
-            <a:r>
-              <a:rPr lang="en-US" sz="1800" dirty="0">
-                <a:ea typeface="+mn-lt"/>
-                <a:cs typeface="+mn-lt"/>
-              </a:rPr>
-              <a:t>Map based</a:t>
-            </a:r>
-          </a:p>
-          <a:p>
-            <a:pPr lvl="1">
-              <a:spcBef>
-                <a:spcPts val="0"/>
-              </a:spcBef>
-              <a:spcAft>
-                <a:spcPts val="0"/>
-              </a:spcAft>
-            </a:pPr>
-            <a:r>
-              <a:rPr lang="en-US" sz="1800" dirty="0">
-                <a:ea typeface="+mn-lt"/>
-                <a:cs typeface="+mn-lt"/>
-              </a:rPr>
-              <a:t>Available on mobile device</a:t>
-            </a:r>
-          </a:p>
-          <a:p>
-            <a:pPr lvl="1">
-              <a:spcBef>
-                <a:spcPts val="0"/>
-              </a:spcBef>
-              <a:spcAft>
-                <a:spcPts val="0"/>
-              </a:spcAft>
-            </a:pPr>
-            <a:r>
-              <a:rPr lang="en-US" sz="1800" dirty="0">
-                <a:ea typeface="+mn-lt"/>
-                <a:cs typeface="+mn-lt"/>
-              </a:rPr>
-              <a:t>Used to locate well, ability to view historical information, ability to view photos</a:t>
-            </a:r>
-          </a:p>
-          <a:p>
-            <a:pPr lvl="1">
-              <a:spcBef>
-                <a:spcPts val="0"/>
-              </a:spcBef>
-              <a:spcAft>
-                <a:spcPts val="0"/>
-              </a:spcAft>
-            </a:pPr>
-            <a:r>
-              <a:rPr lang="en-US" sz="1800" dirty="0">
-                <a:ea typeface="+mn-lt"/>
-                <a:cs typeface="+mn-lt"/>
-              </a:rPr>
-              <a:t>Optional </a:t>
-            </a:r>
-          </a:p>
-          <a:p>
-            <a:pPr marL="0" indent="0"/>
-            <a:endParaRPr lang="en-US" dirty="0">
-              <a:ea typeface="+mn-lt"/>
-              <a:cs typeface="+mn-lt"/>
-            </a:endParaRPr>
-          </a:p>
-        </p:txBody>
-      </p:sp>
-      <p:pic>
-        <p:nvPicPr>
-          <p:cNvPr id="1028" name="Picture 4" descr="Field Data Collection App for Mobile Workers | ArcGIS Field Maps">
-            <a:extLst>
-              <a:ext uri="{FF2B5EF4-FFF2-40B4-BE49-F238E27FC236}">
-                <a16:creationId xmlns:a16="http://schemas.microsoft.com/office/drawing/2014/main" id="{EC5374A0-2D17-A2ED-EEDA-FFA0FA1A5512}"/>
-              </a:ext>
-            </a:extLst>
-          </p:cNvPr>
-          <p:cNvPicPr>
-            <a:picLocks noChangeAspect="1" noChangeArrowheads="1"/>
-          </p:cNvPicPr>
-          <p:nvPr/>
-        </p:nvPicPr>
-        <p:blipFill>
-          <a:blip r:embed="rId2">
-            <a:extLst>
-              <a:ext uri="{28A0092B-C50C-407E-A947-70E740481C1C}">
-                <a14:useLocalDpi xmlns:a14="http://schemas.microsoft.com/office/drawing/2010/main" val="0"/>
-              </a:ext>
-            </a:extLst>
-          </a:blip>
-          <a:srcRect/>
-          <a:stretch>
-            <a:fillRect/>
-          </a:stretch>
-        </p:blipFill>
-        <p:spPr bwMode="auto">
-          <a:xfrm>
-            <a:off x="662352" y="2194066"/>
-            <a:ext cx="906841" cy="906841"/>
-          </a:xfrm>
-          <a:prstGeom prst="rect">
-            <a:avLst/>
-          </a:prstGeom>
-          <a:noFill/>
-          <a:extLst>
-            <a:ext uri="{909E8E84-426E-40DD-AFC4-6F175D3DCCD1}">
-              <a14:hiddenFill xmlns:a14="http://schemas.microsoft.com/office/drawing/2010/main">
-                <a:solidFill>
-                  <a:srgbClr val="FFFFFF"/>
-                </a:solidFill>
-              </a14:hiddenFill>
-            </a:ext>
-          </a:extLst>
-        </p:spPr>
-      </p:pic>
-      <p:pic>
-        <p:nvPicPr>
-          <p:cNvPr id="3" name="Graphic 2">
-            <a:extLst>
-              <a:ext uri="{FF2B5EF4-FFF2-40B4-BE49-F238E27FC236}">
-                <a16:creationId xmlns:a16="http://schemas.microsoft.com/office/drawing/2014/main" id="{EDC09B3E-B322-0DB9-C421-98B94A46FB47}"/>
-              </a:ext>
-            </a:extLst>
-          </p:cNvPr>
-          <p:cNvPicPr>
-            <a:picLocks noChangeAspect="1"/>
-          </p:cNvPicPr>
-          <p:nvPr/>
-        </p:nvPicPr>
-        <p:blipFill>
-          <a:blip r:embed="rId3">
-            <a:extLst>
-              <a:ext uri="{96DAC541-7B7A-43D3-8B79-37D633B846F1}">
-                <asvg:svgBlip xmlns:asvg="http://schemas.microsoft.com/office/drawing/2016/SVG/main" r:embed="rId4"/>
-              </a:ext>
-            </a:extLst>
-          </a:blip>
-          <a:stretch>
-            <a:fillRect/>
-          </a:stretch>
-        </p:blipFill>
-        <p:spPr>
-          <a:xfrm>
-            <a:off x="1115771" y="2737566"/>
-            <a:ext cx="698500" cy="698500"/>
-          </a:xfrm>
-          <a:prstGeom prst="rect">
-            <a:avLst/>
-          </a:prstGeom>
-        </p:spPr>
-      </p:pic>
-    </p:spTree>
-    <p:extLst>
-      <p:ext uri="{BB962C8B-B14F-4D97-AF65-F5344CB8AC3E}">
-        <p14:creationId xmlns:p14="http://schemas.microsoft.com/office/powerpoint/2010/main" val="804901460"/>
-      </p:ext>
-    </p:extLst>
-  </p:cSld>
-  <p:clrMapOvr>
-    <a:masterClrMapping/>
-  </p:clrMapOvr>
-</p:sld>
-</file>
-
-<file path=ppt/slides/slide12.xml><?xml version="1.0" encoding="utf-8"?>
-<p:sld xmlns:a="http://schemas.openxmlformats.org/drawingml/2006/main" xmlns:r="http://schemas.openxmlformats.org/officeDocument/2006/relationships" xmlns:p="http://schemas.openxmlformats.org/presentationml/2006/main">
-  <p:cSld>
-    <p:spTree>
-      <p:nvGrpSpPr>
-        <p:cNvPr id="1" name=""/>
-        <p:cNvGrpSpPr/>
-        <p:nvPr/>
-      </p:nvGrpSpPr>
-      <p:grpSpPr>
-        <a:xfrm>
-          <a:off x="0" y="0"/>
-          <a:ext cx="0" cy="0"/>
-          <a:chOff x="0" y="0"/>
-          <a:chExt cx="0" cy="0"/>
-        </a:xfrm>
-      </p:grpSpPr>
-      <p:pic>
-        <p:nvPicPr>
-          <p:cNvPr id="2052" name="Picture 4">
-            <a:extLst>
-              <a:ext uri="{FF2B5EF4-FFF2-40B4-BE49-F238E27FC236}">
-                <a16:creationId xmlns:a16="http://schemas.microsoft.com/office/drawing/2014/main" id="{B6AC301A-425F-FC63-1CB7-47A19BD70A12}"/>
-              </a:ext>
-            </a:extLst>
-          </p:cNvPr>
-          <p:cNvPicPr>
-            <a:picLocks noChangeAspect="1" noChangeArrowheads="1"/>
-          </p:cNvPicPr>
-          <p:nvPr/>
-        </p:nvPicPr>
-        <p:blipFill rotWithShape="1">
-          <a:blip r:embed="rId2">
-            <a:extLst>
-              <a:ext uri="{28A0092B-C50C-407E-A947-70E740481C1C}">
-                <a14:useLocalDpi xmlns:a14="http://schemas.microsoft.com/office/drawing/2010/main" val="0"/>
-              </a:ext>
-            </a:extLst>
-          </a:blip>
-          <a:srcRect t="53393" b="10423"/>
-          <a:stretch/>
-        </p:blipFill>
-        <p:spPr bwMode="auto">
-          <a:xfrm>
-            <a:off x="8259382" y="4277031"/>
-            <a:ext cx="2643431" cy="978622"/>
-          </a:xfrm>
-          <a:prstGeom prst="rect">
-            <a:avLst/>
-          </a:prstGeom>
-          <a:noFill/>
-          <a:ln>
-            <a:noFill/>
-          </a:ln>
-          <a:extLst>
-            <a:ext uri="{909E8E84-426E-40DD-AFC4-6F175D3DCCD1}">
-              <a14:hiddenFill xmlns:a14="http://schemas.microsoft.com/office/drawing/2010/main">
-                <a:solidFill>
-                  <a:srgbClr val="FFFFFF"/>
-                </a:solidFill>
-              </a14:hiddenFill>
-            </a:ext>
-            <a:ext uri="{91240B29-F687-4F45-9708-019B960494DF}">
-              <a14:hiddenLine xmlns:a14="http://schemas.microsoft.com/office/drawing/2010/main" w="9525">
-                <a:solidFill>
-                  <a:srgbClr val="000000"/>
-                </a:solidFill>
-                <a:miter lim="800000"/>
-                <a:headEnd/>
-                <a:tailEnd/>
-              </a14:hiddenLine>
-            </a:ext>
-          </a:extLst>
-        </p:spPr>
-      </p:pic>
-      <p:pic>
-        <p:nvPicPr>
-          <p:cNvPr id="2050" name="Picture 2">
-            <a:extLst>
-              <a:ext uri="{FF2B5EF4-FFF2-40B4-BE49-F238E27FC236}">
-                <a16:creationId xmlns:a16="http://schemas.microsoft.com/office/drawing/2014/main" id="{18A46135-1B57-60A8-5191-1E5F28F39E5E}"/>
-              </a:ext>
-            </a:extLst>
-          </p:cNvPr>
-          <p:cNvPicPr>
-            <a:picLocks noChangeAspect="1" noChangeArrowheads="1"/>
-          </p:cNvPicPr>
-          <p:nvPr/>
-        </p:nvPicPr>
-        <p:blipFill rotWithShape="1">
-          <a:blip r:embed="rId3">
-            <a:extLst>
-              <a:ext uri="{28A0092B-C50C-407E-A947-70E740481C1C}">
-                <a14:useLocalDpi xmlns:a14="http://schemas.microsoft.com/office/drawing/2010/main" val="0"/>
-              </a:ext>
-            </a:extLst>
-          </a:blip>
-          <a:srcRect t="38326"/>
-          <a:stretch/>
-        </p:blipFill>
-        <p:spPr bwMode="auto">
-          <a:xfrm>
-            <a:off x="4519776" y="4277031"/>
-            <a:ext cx="2367471" cy="2076585"/>
-          </a:xfrm>
-          <a:prstGeom prst="rect">
-            <a:avLst/>
-          </a:prstGeom>
-          <a:noFill/>
-          <a:ln>
-            <a:noFill/>
-          </a:ln>
-          <a:extLst>
-            <a:ext uri="{909E8E84-426E-40DD-AFC4-6F175D3DCCD1}">
-              <a14:hiddenFill xmlns:a14="http://schemas.microsoft.com/office/drawing/2010/main">
-                <a:solidFill>
-                  <a:srgbClr val="FFFFFF"/>
-                </a:solidFill>
-              </a14:hiddenFill>
-            </a:ext>
-            <a:ext uri="{91240B29-F687-4F45-9708-019B960494DF}">
-              <a14:hiddenLine xmlns:a14="http://schemas.microsoft.com/office/drawing/2010/main" w="9525">
-                <a:solidFill>
-                  <a:srgbClr val="000000"/>
-                </a:solidFill>
-                <a:miter lim="800000"/>
-                <a:headEnd/>
-                <a:tailEnd/>
-              </a14:hiddenLine>
-            </a:ext>
-          </a:extLst>
-        </p:spPr>
-      </p:pic>
-      <p:sp>
-        <p:nvSpPr>
-          <p:cNvPr id="2" name="Title 1">
-            <a:extLst>
-              <a:ext uri="{FF2B5EF4-FFF2-40B4-BE49-F238E27FC236}">
-                <a16:creationId xmlns:a16="http://schemas.microsoft.com/office/drawing/2014/main" id="{0046426E-F6F6-4A7C-9181-8C3090996261}"/>
-              </a:ext>
-            </a:extLst>
-          </p:cNvPr>
-          <p:cNvSpPr>
-            <a:spLocks noGrp="1"/>
-          </p:cNvSpPr>
-          <p:nvPr>
-            <p:ph type="title"/>
-          </p:nvPr>
-        </p:nvSpPr>
-        <p:spPr>
-          <a:xfrm>
-            <a:off x="561358" y="552762"/>
-            <a:ext cx="10961947" cy="802250"/>
-          </a:xfrm>
-        </p:spPr>
-        <p:txBody>
-          <a:bodyPr/>
-          <a:lstStyle/>
-          <a:p>
-            <a:r>
-              <a:rPr lang="en-US" sz="4400" dirty="0"/>
-              <a:t>Check for Updates </a:t>
-            </a:r>
-            <a:r>
-              <a:rPr lang="en-US" sz="3200" dirty="0"/>
-              <a:t>(Prior to Fieldwork)</a:t>
-            </a:r>
-            <a:endParaRPr lang="en-US" sz="3200" dirty="0">
-              <a:solidFill>
-                <a:schemeClr val="accent3">
-                  <a:lumMod val="60000"/>
-                  <a:lumOff val="40000"/>
-                </a:schemeClr>
-              </a:solidFill>
-            </a:endParaRPr>
-          </a:p>
-        </p:txBody>
-      </p:sp>
-      <p:sp>
-        <p:nvSpPr>
-          <p:cNvPr id="5" name="Content Placeholder 5">
-            <a:extLst>
-              <a:ext uri="{FF2B5EF4-FFF2-40B4-BE49-F238E27FC236}">
-                <a16:creationId xmlns:a16="http://schemas.microsoft.com/office/drawing/2014/main" id="{0E19797D-8A74-F7A2-B94C-8687111B4B42}"/>
-              </a:ext>
-            </a:extLst>
-          </p:cNvPr>
-          <p:cNvSpPr txBox="1">
-            <a:spLocks/>
-          </p:cNvSpPr>
-          <p:nvPr/>
-        </p:nvSpPr>
-        <p:spPr>
-          <a:xfrm>
-            <a:off x="561358" y="1460740"/>
-            <a:ext cx="10917772" cy="4204413"/>
-          </a:xfrm>
-          <a:prstGeom prst="rect">
-            <a:avLst/>
-          </a:prstGeom>
-        </p:spPr>
-        <p:txBody>
-          <a:bodyPr vert="horz" wrap="square" lIns="0" tIns="0" rIns="0" bIns="0" rtlCol="0" anchor="t" anchorCtr="0">
-            <a:noAutofit/>
-          </a:bodyPr>
-          <a:lstStyle>
-            <a:lvl1pPr marL="228600" indent="-228600" algn="l" defTabSz="914400" rtl="0" eaLnBrk="1" latinLnBrk="0" hangingPunct="1">
-              <a:lnSpc>
-                <a:spcPct val="110000"/>
-              </a:lnSpc>
-              <a:spcBef>
-                <a:spcPts val="1000"/>
-              </a:spcBef>
-              <a:spcAft>
-                <a:spcPts val="800"/>
-              </a:spcAft>
-              <a:buFont typeface="Arial" panose="020B0604020202020204" pitchFamily="34" charset="0"/>
-              <a:buNone/>
-              <a:defRPr sz="2000" kern="1200">
-                <a:solidFill>
-                  <a:schemeClr val="tx1">
-                    <a:alpha val="60000"/>
-                  </a:schemeClr>
-                </a:solidFill>
-                <a:latin typeface="+mn-lt"/>
-                <a:ea typeface="+mn-ea"/>
-                <a:cs typeface="+mn-cs"/>
-              </a:defRPr>
-            </a:lvl1pPr>
-            <a:lvl2pPr marL="685800" indent="-228600" algn="l" defTabSz="914400" rtl="0" eaLnBrk="1" latinLnBrk="0" hangingPunct="1">
-              <a:lnSpc>
-                <a:spcPct val="110000"/>
-              </a:lnSpc>
-              <a:spcBef>
-                <a:spcPts val="500"/>
-              </a:spcBef>
-              <a:spcAft>
-                <a:spcPts val="800"/>
-              </a:spcAft>
-              <a:buFont typeface="Arial" panose="020B0604020202020204" pitchFamily="34" charset="0"/>
-              <a:buChar char="•"/>
-              <a:defRPr sz="1400" kern="1200">
-                <a:solidFill>
-                  <a:schemeClr val="tx1">
-                    <a:alpha val="60000"/>
-                  </a:schemeClr>
-                </a:solidFill>
-                <a:latin typeface="+mn-lt"/>
-                <a:ea typeface="+mn-ea"/>
-                <a:cs typeface="+mn-cs"/>
-              </a:defRPr>
-            </a:lvl2pPr>
-            <a:lvl3pPr marL="1143000" indent="-228600" algn="l" defTabSz="914400" rtl="0" eaLnBrk="1" latinLnBrk="0" hangingPunct="1">
-              <a:lnSpc>
-                <a:spcPct val="110000"/>
-              </a:lnSpc>
-              <a:spcBef>
-                <a:spcPts val="500"/>
-              </a:spcBef>
-              <a:spcAft>
-                <a:spcPts val="800"/>
-              </a:spcAft>
-              <a:buFont typeface="Arial" panose="020B0604020202020204" pitchFamily="34" charset="0"/>
-              <a:buChar char="•"/>
-              <a:defRPr sz="1400" kern="1200">
-                <a:solidFill>
-                  <a:schemeClr val="tx1">
-                    <a:alpha val="60000"/>
-                  </a:schemeClr>
-                </a:solidFill>
-                <a:latin typeface="+mn-lt"/>
-                <a:ea typeface="+mn-ea"/>
-                <a:cs typeface="+mn-cs"/>
-              </a:defRPr>
-            </a:lvl3pPr>
-            <a:lvl4pPr marL="1600200" indent="-228600" algn="l" defTabSz="914400" rtl="0" eaLnBrk="1" latinLnBrk="0" hangingPunct="1">
-              <a:lnSpc>
-                <a:spcPct val="110000"/>
-              </a:lnSpc>
-              <a:spcBef>
-                <a:spcPts val="500"/>
-              </a:spcBef>
-              <a:spcAft>
-                <a:spcPts val="800"/>
-              </a:spcAft>
-              <a:buFont typeface="Arial" panose="020B0604020202020204" pitchFamily="34" charset="0"/>
-              <a:buChar char="•"/>
-              <a:defRPr sz="1400" kern="1200">
-                <a:solidFill>
-                  <a:schemeClr val="tx1">
-                    <a:alpha val="60000"/>
-                  </a:schemeClr>
-                </a:solidFill>
-                <a:latin typeface="+mn-lt"/>
-                <a:ea typeface="+mn-ea"/>
-                <a:cs typeface="+mn-cs"/>
-              </a:defRPr>
-            </a:lvl4pPr>
-            <a:lvl5pPr marL="2057400" indent="-228600" algn="l" defTabSz="914400" rtl="0" eaLnBrk="1" latinLnBrk="0" hangingPunct="1">
-              <a:lnSpc>
-                <a:spcPct val="110000"/>
-              </a:lnSpc>
-              <a:spcBef>
-                <a:spcPts val="500"/>
-              </a:spcBef>
-              <a:spcAft>
-                <a:spcPts val="800"/>
-              </a:spcAft>
-              <a:buFont typeface="Arial" panose="020B0604020202020204" pitchFamily="34" charset="0"/>
-              <a:buChar char="•"/>
-              <a:defRPr sz="1400" kern="1200">
-                <a:solidFill>
-                  <a:schemeClr val="tx1">
-                    <a:alpha val="60000"/>
-                  </a:schemeClr>
-                </a:solidFill>
-                <a:latin typeface="+mn-lt"/>
-                <a:ea typeface="+mn-ea"/>
-                <a:cs typeface="+mn-cs"/>
-              </a:defRPr>
-            </a:lvl5pPr>
-            <a:lvl6pPr marL="2514600" indent="-228600" algn="l" defTabSz="914400" rtl="0" eaLnBrk="1" latinLnBrk="0" hangingPunct="1">
-              <a:lnSpc>
-                <a:spcPct val="90000"/>
-              </a:lnSpc>
-              <a:spcBef>
-                <a:spcPts val="500"/>
-              </a:spcBef>
-              <a:buFont typeface="Arial" panose="020B0604020202020204" pitchFamily="34" charset="0"/>
-              <a:buChar char="•"/>
-              <a:defRPr sz="1800" kern="1200">
-                <a:solidFill>
-                  <a:schemeClr val="tx1"/>
-                </a:solidFill>
-                <a:latin typeface="+mn-lt"/>
-                <a:ea typeface="+mn-ea"/>
-                <a:cs typeface="+mn-cs"/>
-              </a:defRPr>
-            </a:lvl6pPr>
-            <a:lvl7pPr marL="2971800" indent="-228600" algn="l" defTabSz="914400" rtl="0" eaLnBrk="1" latinLnBrk="0" hangingPunct="1">
-              <a:lnSpc>
-                <a:spcPct val="90000"/>
-              </a:lnSpc>
-              <a:spcBef>
-                <a:spcPts val="500"/>
-              </a:spcBef>
-              <a:buFont typeface="Arial" panose="020B0604020202020204" pitchFamily="34" charset="0"/>
-              <a:buChar char="•"/>
-              <a:defRPr sz="1800" kern="1200">
-                <a:solidFill>
-                  <a:schemeClr val="tx1"/>
-                </a:solidFill>
-                <a:latin typeface="+mn-lt"/>
-                <a:ea typeface="+mn-ea"/>
-                <a:cs typeface="+mn-cs"/>
-              </a:defRPr>
-            </a:lvl7pPr>
-            <a:lvl8pPr marL="3429000" indent="-228600" algn="l" defTabSz="914400" rtl="0" eaLnBrk="1" latinLnBrk="0" hangingPunct="1">
-              <a:lnSpc>
-                <a:spcPct val="90000"/>
-              </a:lnSpc>
-              <a:spcBef>
-                <a:spcPts val="500"/>
-              </a:spcBef>
-              <a:buFont typeface="Arial" panose="020B0604020202020204" pitchFamily="34" charset="0"/>
-              <a:buChar char="•"/>
-              <a:defRPr sz="1800" kern="1200">
-                <a:solidFill>
-                  <a:schemeClr val="tx1"/>
-                </a:solidFill>
-                <a:latin typeface="+mn-lt"/>
-                <a:ea typeface="+mn-ea"/>
-                <a:cs typeface="+mn-cs"/>
-              </a:defRPr>
-            </a:lvl8pPr>
-            <a:lvl9pPr marL="3886200" indent="-228600" algn="l" defTabSz="914400" rtl="0" eaLnBrk="1" latinLnBrk="0" hangingPunct="1">
-              <a:lnSpc>
-                <a:spcPct val="90000"/>
-              </a:lnSpc>
-              <a:spcBef>
-                <a:spcPts val="500"/>
-              </a:spcBef>
-              <a:buFont typeface="Arial" panose="020B0604020202020204" pitchFamily="34" charset="0"/>
-              <a:buChar char="•"/>
-              <a:defRPr sz="1800" kern="1200">
-                <a:solidFill>
-                  <a:schemeClr val="tx1"/>
-                </a:solidFill>
-                <a:latin typeface="+mn-lt"/>
-                <a:ea typeface="+mn-ea"/>
-                <a:cs typeface="+mn-cs"/>
-              </a:defRPr>
-            </a:lvl9pPr>
-          </a:lstStyle>
-          <a:p>
-            <a:pPr marL="0" indent="0">
-              <a:spcAft>
-                <a:spcPts val="0"/>
-              </a:spcAft>
-            </a:pPr>
-            <a:r>
-              <a:rPr lang="en-US" sz="1800" i="1" dirty="0">
-                <a:latin typeface="Arial" panose="020B0604020202020204" pitchFamily="34" charset="0"/>
-                <a:ea typeface="+mn-lt"/>
-                <a:cs typeface="Arial" panose="020B0604020202020204" pitchFamily="34" charset="0"/>
-              </a:rPr>
-              <a:t>While you still have internet connection in the office the fieldworker will be required to update the offline map area to incorporate any recent changes.</a:t>
-            </a:r>
-          </a:p>
-          <a:p>
-            <a:pPr marL="457200" indent="-457200">
-              <a:spcAft>
-                <a:spcPts val="0"/>
-              </a:spcAft>
-              <a:buFont typeface="Arial" panose="020B0604020202020204" pitchFamily="34" charset="0"/>
-              <a:buAutoNum type="arabicPeriod"/>
-            </a:pPr>
-            <a:r>
-              <a:rPr lang="en-US" sz="1800" dirty="0">
-                <a:latin typeface="Arial" panose="020B0604020202020204" pitchFamily="34" charset="0"/>
-                <a:ea typeface="+mn-lt"/>
-                <a:cs typeface="Arial" panose="020B0604020202020204" pitchFamily="34" charset="0"/>
-              </a:rPr>
-              <a:t>Open the Field Maps application on your mobile device</a:t>
-            </a:r>
-          </a:p>
-          <a:p>
-            <a:pPr marL="457200" indent="-457200">
-              <a:spcAft>
-                <a:spcPts val="0"/>
-              </a:spcAft>
-              <a:buFont typeface="Arial" panose="020B0604020202020204" pitchFamily="34" charset="0"/>
-              <a:buAutoNum type="arabicPeriod"/>
-            </a:pPr>
-            <a:r>
-              <a:rPr lang="en-US" sz="1800" dirty="0">
-                <a:latin typeface="Arial" panose="020B0604020202020204" pitchFamily="34" charset="0"/>
-                <a:ea typeface="+mn-lt"/>
-                <a:cs typeface="Arial" panose="020B0604020202020204" pitchFamily="34" charset="0"/>
-              </a:rPr>
-              <a:t>Open the map called ‘Hydrologic Monitoring Field Collection (Field Maps)’</a:t>
-            </a:r>
-          </a:p>
-          <a:p>
-            <a:pPr marL="457200" indent="-457200">
-              <a:spcAft>
-                <a:spcPts val="0"/>
-              </a:spcAft>
-              <a:buFont typeface="Arial" panose="020B0604020202020204" pitchFamily="34" charset="0"/>
-              <a:buAutoNum type="arabicPeriod"/>
-            </a:pPr>
-            <a:r>
-              <a:rPr lang="en-US" sz="1800" dirty="0">
-                <a:latin typeface="Arial" panose="020B0604020202020204" pitchFamily="34" charset="0"/>
-                <a:ea typeface="+mn-lt"/>
-                <a:cs typeface="Arial" panose="020B0604020202020204" pitchFamily="34" charset="0"/>
-              </a:rPr>
-              <a:t>Select the three dots next to the offline map area called ‘Use this when Offline’ and select ‘Check for Update’</a:t>
-            </a:r>
-          </a:p>
-          <a:p>
-            <a:pPr marL="457200" indent="-457200">
-              <a:spcAft>
-                <a:spcPts val="0"/>
-              </a:spcAft>
-              <a:buFont typeface="Arial" panose="020B0604020202020204" pitchFamily="34" charset="0"/>
-              <a:buAutoNum type="arabicPeriod"/>
-            </a:pPr>
-            <a:r>
-              <a:rPr lang="en-US" sz="1800" dirty="0">
-                <a:latin typeface="Arial" panose="020B0604020202020204" pitchFamily="34" charset="0"/>
-                <a:ea typeface="+mn-lt"/>
-                <a:cs typeface="Arial" panose="020B0604020202020204" pitchFamily="34" charset="0"/>
-              </a:rPr>
-              <a:t>Offline area will be updated to show all Location Visits available</a:t>
-            </a:r>
-          </a:p>
-          <a:p>
-            <a:pPr marL="457200" indent="-457200">
-              <a:spcAft>
-                <a:spcPts val="0"/>
-              </a:spcAft>
-              <a:buFont typeface="Arial" panose="020B0604020202020204" pitchFamily="34" charset="0"/>
-              <a:buAutoNum type="arabicPeriod"/>
-            </a:pPr>
-            <a:endParaRPr lang="en-US" sz="1800" dirty="0">
-              <a:latin typeface="Arial" panose="020B0604020202020204" pitchFamily="34" charset="0"/>
-              <a:ea typeface="+mn-lt"/>
-              <a:cs typeface="Arial" panose="020B0604020202020204" pitchFamily="34" charset="0"/>
-            </a:endParaRPr>
-          </a:p>
-        </p:txBody>
-      </p:sp>
-      <p:sp>
-        <p:nvSpPr>
-          <p:cNvPr id="29" name="Flowchart: Connector 28">
-            <a:extLst>
-              <a:ext uri="{FF2B5EF4-FFF2-40B4-BE49-F238E27FC236}">
-                <a16:creationId xmlns:a16="http://schemas.microsoft.com/office/drawing/2014/main" id="{3393BEA2-4704-4A86-B97D-18BC2A158787}"/>
-              </a:ext>
-            </a:extLst>
-          </p:cNvPr>
-          <p:cNvSpPr/>
-          <p:nvPr/>
-        </p:nvSpPr>
-        <p:spPr>
-          <a:xfrm>
-            <a:off x="4225056" y="4116451"/>
-            <a:ext cx="353595" cy="353595"/>
-          </a:xfrm>
-          <a:prstGeom prst="flowChartConnector">
-            <a:avLst/>
-          </a:prstGeom>
-          <a:solidFill>
-            <a:srgbClr val="FF0000"/>
-          </a:solidFill>
-        </p:spPr>
-        <p:style>
-          <a:lnRef idx="2">
-            <a:schemeClr val="accent1">
-              <a:shade val="15000"/>
-            </a:schemeClr>
-          </a:lnRef>
-          <a:fillRef idx="1">
-            <a:schemeClr val="accent1"/>
-          </a:fillRef>
-          <a:effectRef idx="0">
-            <a:schemeClr val="accent1"/>
-          </a:effectRef>
-          <a:fontRef idx="minor">
-            <a:schemeClr val="lt1"/>
-          </a:fontRef>
-        </p:style>
-        <p:txBody>
-          <a:bodyPr rtlCol="0" anchor="ctr"/>
-          <a:lstStyle/>
-          <a:p>
-            <a:pPr algn="ctr"/>
-            <a:r>
-              <a:rPr lang="en-US" dirty="0">
-                <a:latin typeface="Arial" panose="020B0604020202020204" pitchFamily="34" charset="0"/>
-                <a:cs typeface="Arial" panose="020B0604020202020204" pitchFamily="34" charset="0"/>
-              </a:rPr>
-              <a:t>3</a:t>
-            </a:r>
-          </a:p>
-        </p:txBody>
-      </p:sp>
-      <p:sp>
-        <p:nvSpPr>
-          <p:cNvPr id="30" name="Flowchart: Connector 29">
-            <a:extLst>
-              <a:ext uri="{FF2B5EF4-FFF2-40B4-BE49-F238E27FC236}">
-                <a16:creationId xmlns:a16="http://schemas.microsoft.com/office/drawing/2014/main" id="{4B64C761-AB9B-5C55-053D-2B2D06DCC207}"/>
-              </a:ext>
-            </a:extLst>
-          </p:cNvPr>
-          <p:cNvSpPr/>
-          <p:nvPr/>
-        </p:nvSpPr>
-        <p:spPr>
-          <a:xfrm>
-            <a:off x="8057375" y="4054192"/>
-            <a:ext cx="353595" cy="353595"/>
-          </a:xfrm>
-          <a:prstGeom prst="flowChartConnector">
-            <a:avLst/>
-          </a:prstGeom>
-          <a:solidFill>
-            <a:srgbClr val="FF0000"/>
-          </a:solidFill>
-        </p:spPr>
-        <p:style>
-          <a:lnRef idx="2">
-            <a:schemeClr val="accent1">
-              <a:shade val="15000"/>
-            </a:schemeClr>
-          </a:lnRef>
-          <a:fillRef idx="1">
-            <a:schemeClr val="accent1"/>
-          </a:fillRef>
-          <a:effectRef idx="0">
-            <a:schemeClr val="accent1"/>
-          </a:effectRef>
-          <a:fontRef idx="minor">
-            <a:schemeClr val="lt1"/>
-          </a:fontRef>
-        </p:style>
-        <p:txBody>
-          <a:bodyPr rtlCol="0" anchor="ctr"/>
-          <a:lstStyle/>
-          <a:p>
-            <a:pPr algn="ctr"/>
-            <a:r>
-              <a:rPr lang="en-US" dirty="0">
-                <a:latin typeface="Arial" panose="020B0604020202020204" pitchFamily="34" charset="0"/>
-                <a:cs typeface="Arial" panose="020B0604020202020204" pitchFamily="34" charset="0"/>
-              </a:rPr>
-              <a:t>4</a:t>
-            </a:r>
-          </a:p>
-        </p:txBody>
-      </p:sp>
-      <p:cxnSp>
-        <p:nvCxnSpPr>
-          <p:cNvPr id="6" name="Straight Arrow Connector 5">
-            <a:extLst>
-              <a:ext uri="{FF2B5EF4-FFF2-40B4-BE49-F238E27FC236}">
-                <a16:creationId xmlns:a16="http://schemas.microsoft.com/office/drawing/2014/main" id="{CB2C69BB-3B88-F93D-33EF-6EF20DD4023D}"/>
-              </a:ext>
-            </a:extLst>
-          </p:cNvPr>
-          <p:cNvCxnSpPr>
-            <a:cxnSpLocks/>
-          </p:cNvCxnSpPr>
-          <p:nvPr/>
-        </p:nvCxnSpPr>
-        <p:spPr>
-          <a:xfrm flipH="1">
-            <a:off x="6765362" y="5315323"/>
-            <a:ext cx="590939" cy="0"/>
-          </a:xfrm>
-          <a:prstGeom prst="straightConnector1">
-            <a:avLst/>
-          </a:prstGeom>
-          <a:ln w="57150">
-            <a:solidFill>
-              <a:srgbClr val="FF0000"/>
-            </a:solidFill>
-            <a:tailEnd type="triangle"/>
-          </a:ln>
-        </p:spPr>
-        <p:style>
-          <a:lnRef idx="1">
-            <a:schemeClr val="accent1"/>
-          </a:lnRef>
-          <a:fillRef idx="0">
-            <a:schemeClr val="accent1"/>
-          </a:fillRef>
-          <a:effectRef idx="0">
-            <a:schemeClr val="accent1"/>
-          </a:effectRef>
-          <a:fontRef idx="minor">
-            <a:schemeClr val="tx1"/>
-          </a:fontRef>
-        </p:style>
-      </p:cxnSp>
-      <p:pic>
-        <p:nvPicPr>
-          <p:cNvPr id="2051" name="Picture 3">
-            <a:extLst>
-              <a:ext uri="{FF2B5EF4-FFF2-40B4-BE49-F238E27FC236}">
-                <a16:creationId xmlns:a16="http://schemas.microsoft.com/office/drawing/2014/main" id="{6038041C-EC85-FBF4-B380-A1E3D1F2DACC}"/>
-              </a:ext>
-            </a:extLst>
-          </p:cNvPr>
-          <p:cNvPicPr>
-            <a:picLocks noChangeAspect="1" noChangeArrowheads="1"/>
-          </p:cNvPicPr>
-          <p:nvPr/>
-        </p:nvPicPr>
-        <p:blipFill rotWithShape="1">
-          <a:blip r:embed="rId4">
-            <a:extLst>
-              <a:ext uri="{28A0092B-C50C-407E-A947-70E740481C1C}">
-                <a14:useLocalDpi xmlns:a14="http://schemas.microsoft.com/office/drawing/2010/main" val="0"/>
-              </a:ext>
-            </a:extLst>
-          </a:blip>
-          <a:srcRect t="12478"/>
-          <a:stretch/>
-        </p:blipFill>
-        <p:spPr bwMode="auto">
-          <a:xfrm>
-            <a:off x="889668" y="4277032"/>
-            <a:ext cx="2453300" cy="1858978"/>
-          </a:xfrm>
-          <a:prstGeom prst="rect">
-            <a:avLst/>
-          </a:prstGeom>
-          <a:noFill/>
-          <a:ln>
-            <a:noFill/>
-          </a:ln>
-          <a:extLst>
-            <a:ext uri="{909E8E84-426E-40DD-AFC4-6F175D3DCCD1}">
-              <a14:hiddenFill xmlns:a14="http://schemas.microsoft.com/office/drawing/2010/main">
-                <a:solidFill>
-                  <a:srgbClr val="FFFFFF"/>
-                </a:solidFill>
-              </a14:hiddenFill>
-            </a:ext>
-            <a:ext uri="{91240B29-F687-4F45-9708-019B960494DF}">
-              <a14:hiddenLine xmlns:a14="http://schemas.microsoft.com/office/drawing/2010/main" w="9525">
-                <a:solidFill>
-                  <a:srgbClr val="000000"/>
-                </a:solidFill>
-                <a:miter lim="800000"/>
-                <a:headEnd/>
-                <a:tailEnd/>
-              </a14:hiddenLine>
-            </a:ext>
-          </a:extLst>
-        </p:spPr>
-      </p:pic>
-      <p:sp>
-        <p:nvSpPr>
-          <p:cNvPr id="3" name="Flowchart: Connector 2">
-            <a:extLst>
-              <a:ext uri="{FF2B5EF4-FFF2-40B4-BE49-F238E27FC236}">
-                <a16:creationId xmlns:a16="http://schemas.microsoft.com/office/drawing/2014/main" id="{D5987DE6-CEE2-3F19-BBF7-AE410F235E9F}"/>
-              </a:ext>
-            </a:extLst>
-          </p:cNvPr>
-          <p:cNvSpPr/>
-          <p:nvPr/>
-        </p:nvSpPr>
-        <p:spPr>
-          <a:xfrm>
-            <a:off x="712870" y="4100234"/>
-            <a:ext cx="353595" cy="353595"/>
-          </a:xfrm>
-          <a:prstGeom prst="flowChartConnector">
-            <a:avLst/>
-          </a:prstGeom>
-          <a:solidFill>
-            <a:srgbClr val="FF0000"/>
-          </a:solidFill>
-        </p:spPr>
-        <p:style>
-          <a:lnRef idx="2">
-            <a:schemeClr val="accent1">
-              <a:shade val="15000"/>
-            </a:schemeClr>
-          </a:lnRef>
-          <a:fillRef idx="1">
-            <a:schemeClr val="accent1"/>
-          </a:fillRef>
-          <a:effectRef idx="0">
-            <a:schemeClr val="accent1"/>
-          </a:effectRef>
-          <a:fontRef idx="minor">
-            <a:schemeClr val="lt1"/>
-          </a:fontRef>
-        </p:style>
-        <p:txBody>
-          <a:bodyPr rtlCol="0" anchor="ctr"/>
-          <a:lstStyle/>
-          <a:p>
-            <a:pPr algn="ctr"/>
-            <a:r>
-              <a:rPr lang="en-US" dirty="0">
-                <a:latin typeface="Arial" panose="020B0604020202020204" pitchFamily="34" charset="0"/>
-                <a:cs typeface="Arial" panose="020B0604020202020204" pitchFamily="34" charset="0"/>
-              </a:rPr>
-              <a:t>2</a:t>
-            </a:r>
-          </a:p>
-        </p:txBody>
-      </p:sp>
-      <p:cxnSp>
-        <p:nvCxnSpPr>
-          <p:cNvPr id="7" name="Straight Arrow Connector 6">
-            <a:extLst>
-              <a:ext uri="{FF2B5EF4-FFF2-40B4-BE49-F238E27FC236}">
-                <a16:creationId xmlns:a16="http://schemas.microsoft.com/office/drawing/2014/main" id="{862FBCFE-74A5-A531-1C76-0E395DBBAF31}"/>
-              </a:ext>
-            </a:extLst>
-          </p:cNvPr>
-          <p:cNvCxnSpPr>
-            <a:cxnSpLocks/>
-          </p:cNvCxnSpPr>
-          <p:nvPr/>
-        </p:nvCxnSpPr>
-        <p:spPr>
-          <a:xfrm flipH="1">
-            <a:off x="3191336" y="5794161"/>
-            <a:ext cx="590939" cy="0"/>
-          </a:xfrm>
-          <a:prstGeom prst="straightConnector1">
-            <a:avLst/>
-          </a:prstGeom>
-          <a:ln w="57150">
-            <a:solidFill>
-              <a:srgbClr val="FF0000"/>
-            </a:solidFill>
-            <a:tailEnd type="triangle"/>
-          </a:ln>
-        </p:spPr>
-        <p:style>
-          <a:lnRef idx="1">
-            <a:schemeClr val="accent1"/>
-          </a:lnRef>
-          <a:fillRef idx="0">
-            <a:schemeClr val="accent1"/>
-          </a:fillRef>
-          <a:effectRef idx="0">
-            <a:schemeClr val="accent1"/>
-          </a:effectRef>
-          <a:fontRef idx="minor">
-            <a:schemeClr val="tx1"/>
-          </a:fontRef>
-        </p:style>
-      </p:cxnSp>
-      <p:sp>
-        <p:nvSpPr>
-          <p:cNvPr id="8" name="Rectangle 7">
-            <a:extLst>
-              <a:ext uri="{FF2B5EF4-FFF2-40B4-BE49-F238E27FC236}">
-                <a16:creationId xmlns:a16="http://schemas.microsoft.com/office/drawing/2014/main" id="{1C4D936A-FB26-BF03-84B3-1083298040CF}"/>
-              </a:ext>
-            </a:extLst>
-          </p:cNvPr>
-          <p:cNvSpPr/>
-          <p:nvPr/>
-        </p:nvSpPr>
-        <p:spPr>
-          <a:xfrm>
-            <a:off x="9581097" y="4787720"/>
-            <a:ext cx="546129" cy="216900"/>
-          </a:xfrm>
-          <a:prstGeom prst="rect">
-            <a:avLst/>
-          </a:prstGeom>
-          <a:noFill/>
-          <a:ln w="38100">
-            <a:solidFill>
-              <a:srgbClr val="FF0000"/>
-            </a:solidFill>
-          </a:ln>
-        </p:spPr>
-        <p:style>
-          <a:lnRef idx="2">
-            <a:schemeClr val="accent1">
-              <a:shade val="15000"/>
-            </a:schemeClr>
-          </a:lnRef>
-          <a:fillRef idx="1">
-            <a:schemeClr val="accent1"/>
-          </a:fillRef>
-          <a:effectRef idx="0">
-            <a:schemeClr val="accent1"/>
-          </a:effectRef>
-          <a:fontRef idx="minor">
-            <a:schemeClr val="lt1"/>
-          </a:fontRef>
-        </p:style>
-        <p:txBody>
-          <a:bodyPr rtlCol="0" anchor="ctr"/>
-          <a:lstStyle/>
-          <a:p>
-            <a:pPr algn="ctr"/>
-            <a:endParaRPr lang="en-US"/>
-          </a:p>
-        </p:txBody>
-      </p:sp>
-    </p:spTree>
-    <p:extLst>
-      <p:ext uri="{BB962C8B-B14F-4D97-AF65-F5344CB8AC3E}">
-        <p14:creationId xmlns:p14="http://schemas.microsoft.com/office/powerpoint/2010/main" val="2030711278"/>
-      </p:ext>
-    </p:extLst>
-  </p:cSld>
-  <p:clrMapOvr>
-    <a:masterClrMapping/>
-  </p:clrMapOvr>
-</p:sld>
-</file>
-
-<file path=ppt/slides/slide13.xml><?xml version="1.0" encoding="utf-8"?>
-<p:sld xmlns:a="http://schemas.openxmlformats.org/drawingml/2006/main" xmlns:r="http://schemas.openxmlformats.org/officeDocument/2006/relationships" xmlns:p="http://schemas.openxmlformats.org/presentationml/2006/main">
-  <p:cSld>
-    <p:spTree>
-      <p:nvGrpSpPr>
-        <p:cNvPr id="1" name=""/>
-        <p:cNvGrpSpPr/>
-        <p:nvPr/>
-      </p:nvGrpSpPr>
-      <p:grpSpPr>
-        <a:xfrm>
-          <a:off x="0" y="0"/>
-          <a:ext cx="0" cy="0"/>
-          <a:chOff x="0" y="0"/>
-          <a:chExt cx="0" cy="0"/>
-        </a:xfrm>
-      </p:grpSpPr>
-      <p:pic>
-        <p:nvPicPr>
-          <p:cNvPr id="4098" name="Picture 2">
-            <a:extLst>
-              <a:ext uri="{FF2B5EF4-FFF2-40B4-BE49-F238E27FC236}">
-                <a16:creationId xmlns:a16="http://schemas.microsoft.com/office/drawing/2014/main" id="{0E4A7942-3E11-5D4F-4756-9283850C4C24}"/>
-              </a:ext>
-            </a:extLst>
-          </p:cNvPr>
-          <p:cNvPicPr>
-            <a:picLocks noChangeAspect="1" noChangeArrowheads="1"/>
-          </p:cNvPicPr>
-          <p:nvPr/>
-        </p:nvPicPr>
-        <p:blipFill rotWithShape="1">
-          <a:blip r:embed="rId2">
-            <a:extLst>
-              <a:ext uri="{28A0092B-C50C-407E-A947-70E740481C1C}">
-                <a14:useLocalDpi xmlns:a14="http://schemas.microsoft.com/office/drawing/2010/main" val="0"/>
-              </a:ext>
-            </a:extLst>
-          </a:blip>
-          <a:srcRect t="32097" b="29507"/>
-          <a:stretch/>
-        </p:blipFill>
-        <p:spPr bwMode="auto">
-          <a:xfrm>
-            <a:off x="738156" y="4414684"/>
-            <a:ext cx="2739260" cy="2277454"/>
-          </a:xfrm>
-          <a:prstGeom prst="rect">
-            <a:avLst/>
-          </a:prstGeom>
-          <a:noFill/>
-          <a:ln>
-            <a:noFill/>
-          </a:ln>
-          <a:extLst>
-            <a:ext uri="{909E8E84-426E-40DD-AFC4-6F175D3DCCD1}">
-              <a14:hiddenFill xmlns:a14="http://schemas.microsoft.com/office/drawing/2010/main">
-                <a:solidFill>
-                  <a:srgbClr val="FFFFFF"/>
-                </a:solidFill>
-              </a14:hiddenFill>
-            </a:ext>
-            <a:ext uri="{91240B29-F687-4F45-9708-019B960494DF}">
-              <a14:hiddenLine xmlns:a14="http://schemas.microsoft.com/office/drawing/2010/main" w="9525">
-                <a:solidFill>
-                  <a:srgbClr val="000000"/>
-                </a:solidFill>
-                <a:miter lim="800000"/>
-                <a:headEnd/>
-                <a:tailEnd/>
-              </a14:hiddenLine>
-            </a:ext>
-          </a:extLst>
-        </p:spPr>
-      </p:pic>
-      <p:sp>
-        <p:nvSpPr>
-          <p:cNvPr id="2" name="Title 1">
-            <a:extLst>
-              <a:ext uri="{FF2B5EF4-FFF2-40B4-BE49-F238E27FC236}">
-                <a16:creationId xmlns:a16="http://schemas.microsoft.com/office/drawing/2014/main" id="{0046426E-F6F6-4A7C-9181-8C3090996261}"/>
-              </a:ext>
-            </a:extLst>
-          </p:cNvPr>
-          <p:cNvSpPr>
-            <a:spLocks noGrp="1"/>
-          </p:cNvSpPr>
-          <p:nvPr>
-            <p:ph type="title"/>
-          </p:nvPr>
-        </p:nvSpPr>
-        <p:spPr>
-          <a:xfrm>
-            <a:off x="561358" y="552762"/>
-            <a:ext cx="10961947" cy="802250"/>
-          </a:xfrm>
-        </p:spPr>
-        <p:txBody>
-          <a:bodyPr/>
-          <a:lstStyle/>
-          <a:p>
-            <a:r>
-              <a:rPr lang="en-US" sz="4400" dirty="0"/>
-              <a:t>Enabling Location </a:t>
-            </a:r>
-            <a:r>
-              <a:rPr lang="en-US" sz="3200" dirty="0"/>
-              <a:t>(Optional Setting)</a:t>
-            </a:r>
-            <a:endParaRPr lang="en-US" sz="3200" dirty="0">
-              <a:solidFill>
-                <a:schemeClr val="accent3">
-                  <a:lumMod val="60000"/>
-                  <a:lumOff val="40000"/>
-                </a:schemeClr>
-              </a:solidFill>
-            </a:endParaRPr>
-          </a:p>
-        </p:txBody>
-      </p:sp>
-      <p:sp>
-        <p:nvSpPr>
-          <p:cNvPr id="5" name="Content Placeholder 5">
-            <a:extLst>
-              <a:ext uri="{FF2B5EF4-FFF2-40B4-BE49-F238E27FC236}">
-                <a16:creationId xmlns:a16="http://schemas.microsoft.com/office/drawing/2014/main" id="{0E19797D-8A74-F7A2-B94C-8687111B4B42}"/>
-              </a:ext>
-            </a:extLst>
-          </p:cNvPr>
-          <p:cNvSpPr txBox="1">
-            <a:spLocks/>
-          </p:cNvSpPr>
-          <p:nvPr/>
-        </p:nvSpPr>
-        <p:spPr>
-          <a:xfrm>
-            <a:off x="561358" y="1460740"/>
-            <a:ext cx="10106642" cy="2953944"/>
-          </a:xfrm>
-          <a:prstGeom prst="rect">
-            <a:avLst/>
-          </a:prstGeom>
-        </p:spPr>
-        <p:txBody>
-          <a:bodyPr vert="horz" wrap="square" lIns="0" tIns="0" rIns="0" bIns="0" rtlCol="0" anchor="t" anchorCtr="0">
-            <a:noAutofit/>
-          </a:bodyPr>
-          <a:lstStyle>
-            <a:lvl1pPr marL="228600" indent="-228600" algn="l" defTabSz="914400" rtl="0" eaLnBrk="1" latinLnBrk="0" hangingPunct="1">
-              <a:lnSpc>
-                <a:spcPct val="110000"/>
-              </a:lnSpc>
-              <a:spcBef>
-                <a:spcPts val="1000"/>
-              </a:spcBef>
-              <a:spcAft>
-                <a:spcPts val="800"/>
-              </a:spcAft>
-              <a:buFont typeface="Arial" panose="020B0604020202020204" pitchFamily="34" charset="0"/>
-              <a:buNone/>
-              <a:defRPr sz="2000" kern="1200">
-                <a:solidFill>
-                  <a:schemeClr val="tx1">
-                    <a:alpha val="60000"/>
-                  </a:schemeClr>
-                </a:solidFill>
-                <a:latin typeface="+mn-lt"/>
-                <a:ea typeface="+mn-ea"/>
-                <a:cs typeface="+mn-cs"/>
-              </a:defRPr>
-            </a:lvl1pPr>
-            <a:lvl2pPr marL="685800" indent="-228600" algn="l" defTabSz="914400" rtl="0" eaLnBrk="1" latinLnBrk="0" hangingPunct="1">
-              <a:lnSpc>
-                <a:spcPct val="110000"/>
-              </a:lnSpc>
-              <a:spcBef>
-                <a:spcPts val="500"/>
-              </a:spcBef>
-              <a:spcAft>
-                <a:spcPts val="800"/>
-              </a:spcAft>
-              <a:buFont typeface="Arial" panose="020B0604020202020204" pitchFamily="34" charset="0"/>
-              <a:buChar char="•"/>
-              <a:defRPr sz="1400" kern="1200">
-                <a:solidFill>
-                  <a:schemeClr val="tx1">
-                    <a:alpha val="60000"/>
-                  </a:schemeClr>
-                </a:solidFill>
-                <a:latin typeface="+mn-lt"/>
-                <a:ea typeface="+mn-ea"/>
-                <a:cs typeface="+mn-cs"/>
-              </a:defRPr>
-            </a:lvl2pPr>
-            <a:lvl3pPr marL="1143000" indent="-228600" algn="l" defTabSz="914400" rtl="0" eaLnBrk="1" latinLnBrk="0" hangingPunct="1">
-              <a:lnSpc>
-                <a:spcPct val="110000"/>
-              </a:lnSpc>
-              <a:spcBef>
-                <a:spcPts val="500"/>
-              </a:spcBef>
-              <a:spcAft>
-                <a:spcPts val="800"/>
-              </a:spcAft>
-              <a:buFont typeface="Arial" panose="020B0604020202020204" pitchFamily="34" charset="0"/>
-              <a:buChar char="•"/>
-              <a:defRPr sz="1400" kern="1200">
-                <a:solidFill>
-                  <a:schemeClr val="tx1">
-                    <a:alpha val="60000"/>
-                  </a:schemeClr>
-                </a:solidFill>
-                <a:latin typeface="+mn-lt"/>
-                <a:ea typeface="+mn-ea"/>
-                <a:cs typeface="+mn-cs"/>
-              </a:defRPr>
-            </a:lvl3pPr>
-            <a:lvl4pPr marL="1600200" indent="-228600" algn="l" defTabSz="914400" rtl="0" eaLnBrk="1" latinLnBrk="0" hangingPunct="1">
-              <a:lnSpc>
-                <a:spcPct val="110000"/>
-              </a:lnSpc>
-              <a:spcBef>
-                <a:spcPts val="500"/>
-              </a:spcBef>
-              <a:spcAft>
-                <a:spcPts val="800"/>
-              </a:spcAft>
-              <a:buFont typeface="Arial" panose="020B0604020202020204" pitchFamily="34" charset="0"/>
-              <a:buChar char="•"/>
-              <a:defRPr sz="1400" kern="1200">
-                <a:solidFill>
-                  <a:schemeClr val="tx1">
-                    <a:alpha val="60000"/>
-                  </a:schemeClr>
-                </a:solidFill>
-                <a:latin typeface="+mn-lt"/>
-                <a:ea typeface="+mn-ea"/>
-                <a:cs typeface="+mn-cs"/>
-              </a:defRPr>
-            </a:lvl4pPr>
-            <a:lvl5pPr marL="2057400" indent="-228600" algn="l" defTabSz="914400" rtl="0" eaLnBrk="1" latinLnBrk="0" hangingPunct="1">
-              <a:lnSpc>
-                <a:spcPct val="110000"/>
-              </a:lnSpc>
-              <a:spcBef>
-                <a:spcPts val="500"/>
-              </a:spcBef>
-              <a:spcAft>
-                <a:spcPts val="800"/>
-              </a:spcAft>
-              <a:buFont typeface="Arial" panose="020B0604020202020204" pitchFamily="34" charset="0"/>
-              <a:buChar char="•"/>
-              <a:defRPr sz="1400" kern="1200">
-                <a:solidFill>
-                  <a:schemeClr val="tx1">
-                    <a:alpha val="60000"/>
-                  </a:schemeClr>
-                </a:solidFill>
-                <a:latin typeface="+mn-lt"/>
-                <a:ea typeface="+mn-ea"/>
-                <a:cs typeface="+mn-cs"/>
-              </a:defRPr>
-            </a:lvl5pPr>
-            <a:lvl6pPr marL="2514600" indent="-228600" algn="l" defTabSz="914400" rtl="0" eaLnBrk="1" latinLnBrk="0" hangingPunct="1">
-              <a:lnSpc>
-                <a:spcPct val="90000"/>
-              </a:lnSpc>
-              <a:spcBef>
-                <a:spcPts val="500"/>
-              </a:spcBef>
-              <a:buFont typeface="Arial" panose="020B0604020202020204" pitchFamily="34" charset="0"/>
-              <a:buChar char="•"/>
-              <a:defRPr sz="1800" kern="1200">
-                <a:solidFill>
-                  <a:schemeClr val="tx1"/>
-                </a:solidFill>
-                <a:latin typeface="+mn-lt"/>
-                <a:ea typeface="+mn-ea"/>
-                <a:cs typeface="+mn-cs"/>
-              </a:defRPr>
-            </a:lvl6pPr>
-            <a:lvl7pPr marL="2971800" indent="-228600" algn="l" defTabSz="914400" rtl="0" eaLnBrk="1" latinLnBrk="0" hangingPunct="1">
-              <a:lnSpc>
-                <a:spcPct val="90000"/>
-              </a:lnSpc>
-              <a:spcBef>
-                <a:spcPts val="500"/>
-              </a:spcBef>
-              <a:buFont typeface="Arial" panose="020B0604020202020204" pitchFamily="34" charset="0"/>
-              <a:buChar char="•"/>
-              <a:defRPr sz="1800" kern="1200">
-                <a:solidFill>
-                  <a:schemeClr val="tx1"/>
-                </a:solidFill>
-                <a:latin typeface="+mn-lt"/>
-                <a:ea typeface="+mn-ea"/>
-                <a:cs typeface="+mn-cs"/>
-              </a:defRPr>
-            </a:lvl7pPr>
-            <a:lvl8pPr marL="3429000" indent="-228600" algn="l" defTabSz="914400" rtl="0" eaLnBrk="1" latinLnBrk="0" hangingPunct="1">
-              <a:lnSpc>
-                <a:spcPct val="90000"/>
-              </a:lnSpc>
-              <a:spcBef>
-                <a:spcPts val="500"/>
-              </a:spcBef>
-              <a:buFont typeface="Arial" panose="020B0604020202020204" pitchFamily="34" charset="0"/>
-              <a:buChar char="•"/>
-              <a:defRPr sz="1800" kern="1200">
-                <a:solidFill>
-                  <a:schemeClr val="tx1"/>
-                </a:solidFill>
-                <a:latin typeface="+mn-lt"/>
-                <a:ea typeface="+mn-ea"/>
-                <a:cs typeface="+mn-cs"/>
-              </a:defRPr>
-            </a:lvl8pPr>
-            <a:lvl9pPr marL="3886200" indent="-228600" algn="l" defTabSz="914400" rtl="0" eaLnBrk="1" latinLnBrk="0" hangingPunct="1">
-              <a:lnSpc>
-                <a:spcPct val="90000"/>
-              </a:lnSpc>
-              <a:spcBef>
-                <a:spcPts val="500"/>
-              </a:spcBef>
-              <a:buFont typeface="Arial" panose="020B0604020202020204" pitchFamily="34" charset="0"/>
-              <a:buChar char="•"/>
-              <a:defRPr sz="1800" kern="1200">
-                <a:solidFill>
-                  <a:schemeClr val="tx1"/>
-                </a:solidFill>
-                <a:latin typeface="+mn-lt"/>
-                <a:ea typeface="+mn-ea"/>
-                <a:cs typeface="+mn-cs"/>
-              </a:defRPr>
-            </a:lvl9pPr>
-          </a:lstStyle>
-          <a:p>
-            <a:pPr marL="0" indent="0">
-              <a:spcAft>
-                <a:spcPts val="0"/>
-              </a:spcAft>
-            </a:pPr>
-            <a:r>
-              <a:rPr lang="en-US" sz="1800" i="1" dirty="0">
-                <a:latin typeface="Arial" panose="020B0604020202020204" pitchFamily="34" charset="0"/>
-                <a:ea typeface="+mn-lt"/>
-                <a:cs typeface="Arial" panose="020B0604020202020204" pitchFamily="34" charset="0"/>
-              </a:rPr>
-              <a:t>This is an optional settings for Field Maps. By turning on Location access in your phones settings the application will monitor your location and show your proximity to the well.</a:t>
-            </a:r>
-          </a:p>
-          <a:p>
-            <a:pPr marL="0" indent="0">
-              <a:spcAft>
-                <a:spcPts val="0"/>
-              </a:spcAft>
-            </a:pPr>
-            <a:r>
-              <a:rPr lang="en-US" sz="1800" i="1" dirty="0">
-                <a:latin typeface="Arial" panose="020B0604020202020204" pitchFamily="34" charset="0"/>
-                <a:ea typeface="+mn-lt"/>
-                <a:cs typeface="Arial" panose="020B0604020202020204" pitchFamily="34" charset="0"/>
-              </a:rPr>
-              <a:t>Setting configuration will vary depending on device (iOS/Android)</a:t>
-            </a:r>
-          </a:p>
-          <a:p>
-            <a:pPr marL="457200" indent="-457200">
-              <a:spcAft>
-                <a:spcPts val="0"/>
-              </a:spcAft>
-              <a:buFont typeface="Arial" panose="020B0604020202020204" pitchFamily="34" charset="0"/>
-              <a:buAutoNum type="arabicPeriod"/>
-            </a:pPr>
-            <a:r>
-              <a:rPr lang="en-US" sz="1800" dirty="0">
-                <a:latin typeface="Arial" panose="020B0604020202020204" pitchFamily="34" charset="0"/>
-                <a:ea typeface="+mn-lt"/>
-                <a:cs typeface="Arial" panose="020B0604020202020204" pitchFamily="34" charset="0"/>
-              </a:rPr>
-              <a:t>Once the ‘Online Map’ is opened a dialog box will appear to update the setting. Alternative you may go directly to the settings app on your device</a:t>
-            </a:r>
-          </a:p>
-          <a:p>
-            <a:pPr marL="457200" indent="-457200">
-              <a:spcAft>
-                <a:spcPts val="0"/>
-              </a:spcAft>
-              <a:buFont typeface="Arial" panose="020B0604020202020204" pitchFamily="34" charset="0"/>
-              <a:buAutoNum type="arabicPeriod"/>
-            </a:pPr>
-            <a:r>
-              <a:rPr lang="en-US" sz="1800" dirty="0">
-                <a:latin typeface="Arial" panose="020B0604020202020204" pitchFamily="34" charset="0"/>
-                <a:ea typeface="+mn-lt"/>
-                <a:cs typeface="Arial" panose="020B0604020202020204" pitchFamily="34" charset="0"/>
-              </a:rPr>
-              <a:t>Change the Location setting to ‘While Using’ or ‘Always’</a:t>
-            </a:r>
-          </a:p>
-          <a:p>
-            <a:pPr marL="457200" indent="-457200">
-              <a:spcAft>
-                <a:spcPts val="0"/>
-              </a:spcAft>
-              <a:buFont typeface="Arial" panose="020B0604020202020204" pitchFamily="34" charset="0"/>
-              <a:buAutoNum type="arabicPeriod"/>
-            </a:pPr>
-            <a:r>
-              <a:rPr lang="en-US" sz="1800" dirty="0">
-                <a:latin typeface="Arial" panose="020B0604020202020204" pitchFamily="34" charset="0"/>
-                <a:ea typeface="+mn-lt"/>
-                <a:cs typeface="Arial" panose="020B0604020202020204" pitchFamily="34" charset="0"/>
-              </a:rPr>
-              <a:t>View your location on the map via the blue dot</a:t>
-            </a:r>
-          </a:p>
-          <a:p>
-            <a:pPr marL="457200" indent="-457200">
-              <a:spcAft>
-                <a:spcPts val="0"/>
-              </a:spcAft>
-              <a:buFont typeface="Arial" panose="020B0604020202020204" pitchFamily="34" charset="0"/>
-              <a:buAutoNum type="arabicPeriod"/>
-            </a:pPr>
-            <a:endParaRPr lang="en-US" sz="1800" dirty="0">
-              <a:latin typeface="Arial" panose="020B0604020202020204" pitchFamily="34" charset="0"/>
-              <a:ea typeface="+mn-lt"/>
-              <a:cs typeface="Arial" panose="020B0604020202020204" pitchFamily="34" charset="0"/>
-            </a:endParaRPr>
-          </a:p>
-        </p:txBody>
-      </p:sp>
-      <p:sp>
-        <p:nvSpPr>
-          <p:cNvPr id="29" name="Flowchart: Connector 28">
-            <a:extLst>
-              <a:ext uri="{FF2B5EF4-FFF2-40B4-BE49-F238E27FC236}">
-                <a16:creationId xmlns:a16="http://schemas.microsoft.com/office/drawing/2014/main" id="{3393BEA2-4704-4A86-B97D-18BC2A158787}"/>
-              </a:ext>
-            </a:extLst>
-          </p:cNvPr>
-          <p:cNvSpPr/>
-          <p:nvPr/>
-        </p:nvSpPr>
-        <p:spPr>
-          <a:xfrm>
-            <a:off x="561358" y="4143133"/>
-            <a:ext cx="353595" cy="353595"/>
-          </a:xfrm>
-          <a:prstGeom prst="flowChartConnector">
-            <a:avLst/>
-          </a:prstGeom>
-          <a:solidFill>
-            <a:srgbClr val="FF0000"/>
-          </a:solidFill>
-        </p:spPr>
-        <p:style>
-          <a:lnRef idx="2">
-            <a:schemeClr val="accent1">
-              <a:shade val="15000"/>
-            </a:schemeClr>
-          </a:lnRef>
-          <a:fillRef idx="1">
-            <a:schemeClr val="accent1"/>
-          </a:fillRef>
-          <a:effectRef idx="0">
-            <a:schemeClr val="accent1"/>
-          </a:effectRef>
-          <a:fontRef idx="minor">
-            <a:schemeClr val="lt1"/>
-          </a:fontRef>
-        </p:style>
-        <p:txBody>
-          <a:bodyPr rtlCol="0" anchor="ctr"/>
-          <a:lstStyle/>
-          <a:p>
-            <a:pPr algn="ctr"/>
-            <a:r>
-              <a:rPr lang="en-US" dirty="0">
-                <a:latin typeface="Arial" panose="020B0604020202020204" pitchFamily="34" charset="0"/>
-                <a:cs typeface="Arial" panose="020B0604020202020204" pitchFamily="34" charset="0"/>
-              </a:rPr>
-              <a:t>1</a:t>
-            </a:r>
-          </a:p>
-        </p:txBody>
-      </p:sp>
-      <p:pic>
-        <p:nvPicPr>
-          <p:cNvPr id="4099" name="Picture 3">
-            <a:extLst>
-              <a:ext uri="{FF2B5EF4-FFF2-40B4-BE49-F238E27FC236}">
-                <a16:creationId xmlns:a16="http://schemas.microsoft.com/office/drawing/2014/main" id="{3EBDC93E-5AC3-FE50-2AA2-B1A6AD6A1649}"/>
-              </a:ext>
-            </a:extLst>
-          </p:cNvPr>
-          <p:cNvPicPr>
-            <a:picLocks noChangeAspect="1" noChangeArrowheads="1"/>
-          </p:cNvPicPr>
-          <p:nvPr/>
-        </p:nvPicPr>
-        <p:blipFill>
-          <a:blip r:embed="rId3">
-            <a:extLst>
-              <a:ext uri="{28A0092B-C50C-407E-A947-70E740481C1C}">
-                <a14:useLocalDpi xmlns:a14="http://schemas.microsoft.com/office/drawing/2010/main" val="0"/>
-              </a:ext>
-            </a:extLst>
-          </a:blip>
-          <a:srcRect/>
-          <a:stretch>
-            <a:fillRect/>
-          </a:stretch>
-        </p:blipFill>
-        <p:spPr bwMode="auto">
-          <a:xfrm>
-            <a:off x="4169468" y="4496728"/>
-            <a:ext cx="2156011" cy="1582991"/>
-          </a:xfrm>
-          <a:prstGeom prst="rect">
-            <a:avLst/>
-          </a:prstGeom>
-          <a:noFill/>
-          <a:ln>
-            <a:noFill/>
-          </a:ln>
-          <a:extLst>
-            <a:ext uri="{909E8E84-426E-40DD-AFC4-6F175D3DCCD1}">
-              <a14:hiddenFill xmlns:a14="http://schemas.microsoft.com/office/drawing/2010/main">
-                <a:solidFill>
-                  <a:srgbClr val="FFFFFF"/>
-                </a:solidFill>
-              </a14:hiddenFill>
-            </a:ext>
-            <a:ext uri="{91240B29-F687-4F45-9708-019B960494DF}">
-              <a14:hiddenLine xmlns:a14="http://schemas.microsoft.com/office/drawing/2010/main" w="9525">
-                <a:solidFill>
-                  <a:srgbClr val="000000"/>
-                </a:solidFill>
-                <a:miter lim="800000"/>
-                <a:headEnd/>
-                <a:tailEnd/>
-              </a14:hiddenLine>
-            </a:ext>
-          </a:extLst>
-        </p:spPr>
-      </p:pic>
-      <p:cxnSp>
-        <p:nvCxnSpPr>
-          <p:cNvPr id="3" name="Straight Arrow Connector 2">
-            <a:extLst>
-              <a:ext uri="{FF2B5EF4-FFF2-40B4-BE49-F238E27FC236}">
-                <a16:creationId xmlns:a16="http://schemas.microsoft.com/office/drawing/2014/main" id="{44D834B1-06D9-2D2E-9BB0-3704CA8879FA}"/>
-              </a:ext>
-            </a:extLst>
-          </p:cNvPr>
-          <p:cNvCxnSpPr>
-            <a:cxnSpLocks/>
-          </p:cNvCxnSpPr>
-          <p:nvPr/>
-        </p:nvCxnSpPr>
-        <p:spPr>
-          <a:xfrm flipH="1">
-            <a:off x="6185259" y="5482225"/>
-            <a:ext cx="590939" cy="0"/>
-          </a:xfrm>
-          <a:prstGeom prst="straightConnector1">
-            <a:avLst/>
-          </a:prstGeom>
-          <a:ln w="57150">
-            <a:solidFill>
-              <a:srgbClr val="FF0000"/>
-            </a:solidFill>
-            <a:tailEnd type="triangle"/>
-          </a:ln>
-        </p:spPr>
-        <p:style>
-          <a:lnRef idx="1">
-            <a:schemeClr val="accent1"/>
-          </a:lnRef>
-          <a:fillRef idx="0">
-            <a:schemeClr val="accent1"/>
-          </a:fillRef>
-          <a:effectRef idx="0">
-            <a:schemeClr val="accent1"/>
-          </a:effectRef>
-          <a:fontRef idx="minor">
-            <a:schemeClr val="tx1"/>
-          </a:fontRef>
-        </p:style>
-      </p:cxnSp>
-      <p:sp>
-        <p:nvSpPr>
-          <p:cNvPr id="7" name="Flowchart: Connector 6">
-            <a:extLst>
-              <a:ext uri="{FF2B5EF4-FFF2-40B4-BE49-F238E27FC236}">
-                <a16:creationId xmlns:a16="http://schemas.microsoft.com/office/drawing/2014/main" id="{4B2C0108-06A6-D0C6-3A06-9ADDD6C13505}"/>
-              </a:ext>
-            </a:extLst>
-          </p:cNvPr>
-          <p:cNvSpPr/>
-          <p:nvPr/>
-        </p:nvSpPr>
-        <p:spPr>
-          <a:xfrm>
-            <a:off x="3942918" y="4237886"/>
-            <a:ext cx="353595" cy="353595"/>
-          </a:xfrm>
-          <a:prstGeom prst="flowChartConnector">
-            <a:avLst/>
-          </a:prstGeom>
-          <a:solidFill>
-            <a:srgbClr val="FF0000"/>
-          </a:solidFill>
-        </p:spPr>
-        <p:style>
-          <a:lnRef idx="2">
-            <a:schemeClr val="accent1">
-              <a:shade val="15000"/>
-            </a:schemeClr>
-          </a:lnRef>
-          <a:fillRef idx="1">
-            <a:schemeClr val="accent1"/>
-          </a:fillRef>
-          <a:effectRef idx="0">
-            <a:schemeClr val="accent1"/>
-          </a:effectRef>
-          <a:fontRef idx="minor">
-            <a:schemeClr val="lt1"/>
-          </a:fontRef>
-        </p:style>
-        <p:txBody>
-          <a:bodyPr rtlCol="0" anchor="ctr"/>
-          <a:lstStyle/>
-          <a:p>
-            <a:pPr algn="ctr"/>
-            <a:r>
-              <a:rPr lang="en-US" dirty="0">
-                <a:latin typeface="Arial" panose="020B0604020202020204" pitchFamily="34" charset="0"/>
-                <a:cs typeface="Arial" panose="020B0604020202020204" pitchFamily="34" charset="0"/>
-              </a:rPr>
-              <a:t>2</a:t>
-            </a:r>
-          </a:p>
-        </p:txBody>
-      </p:sp>
-      <p:pic>
-        <p:nvPicPr>
-          <p:cNvPr id="4101" name="Picture 5" descr="Get started with geofences in ArcGIS Field Maps">
-            <a:extLst>
-              <a:ext uri="{FF2B5EF4-FFF2-40B4-BE49-F238E27FC236}">
-                <a16:creationId xmlns:a16="http://schemas.microsoft.com/office/drawing/2014/main" id="{63C5D968-4DC9-453D-075D-842DE44A3F17}"/>
-              </a:ext>
-            </a:extLst>
-          </p:cNvPr>
-          <p:cNvPicPr>
-            <a:picLocks noChangeAspect="1" noChangeArrowheads="1"/>
-          </p:cNvPicPr>
-          <p:nvPr/>
-        </p:nvPicPr>
-        <p:blipFill rotWithShape="1">
-          <a:blip r:embed="rId4">
-            <a:extLst>
-              <a:ext uri="{28A0092B-C50C-407E-A947-70E740481C1C}">
-                <a14:useLocalDpi xmlns:a14="http://schemas.microsoft.com/office/drawing/2010/main" val="0"/>
-              </a:ext>
-            </a:extLst>
-          </a:blip>
-          <a:srcRect t="17843"/>
-          <a:stretch/>
-        </p:blipFill>
-        <p:spPr bwMode="auto">
-          <a:xfrm>
-            <a:off x="7492502" y="4479474"/>
-            <a:ext cx="2005460" cy="2139474"/>
-          </a:xfrm>
-          <a:prstGeom prst="rect">
-            <a:avLst/>
-          </a:prstGeom>
-          <a:noFill/>
-          <a:extLst>
-            <a:ext uri="{909E8E84-426E-40DD-AFC4-6F175D3DCCD1}">
-              <a14:hiddenFill xmlns:a14="http://schemas.microsoft.com/office/drawing/2010/main">
-                <a:solidFill>
-                  <a:srgbClr val="FFFFFF"/>
-                </a:solidFill>
-              </a14:hiddenFill>
-            </a:ext>
-          </a:extLst>
-        </p:spPr>
-      </p:pic>
-      <p:sp>
-        <p:nvSpPr>
-          <p:cNvPr id="8" name="Flowchart: Connector 7">
-            <a:extLst>
-              <a:ext uri="{FF2B5EF4-FFF2-40B4-BE49-F238E27FC236}">
-                <a16:creationId xmlns:a16="http://schemas.microsoft.com/office/drawing/2014/main" id="{8F294EE1-4E4D-F162-90B3-FEC60CB6C7EE}"/>
-              </a:ext>
-            </a:extLst>
-          </p:cNvPr>
-          <p:cNvSpPr/>
-          <p:nvPr/>
-        </p:nvSpPr>
-        <p:spPr>
-          <a:xfrm>
-            <a:off x="7305459" y="4237885"/>
-            <a:ext cx="353595" cy="353595"/>
-          </a:xfrm>
-          <a:prstGeom prst="flowChartConnector">
-            <a:avLst/>
-          </a:prstGeom>
-          <a:solidFill>
-            <a:srgbClr val="FF0000"/>
-          </a:solidFill>
-        </p:spPr>
-        <p:style>
-          <a:lnRef idx="2">
-            <a:schemeClr val="accent1">
-              <a:shade val="15000"/>
-            </a:schemeClr>
-          </a:lnRef>
-          <a:fillRef idx="1">
-            <a:schemeClr val="accent1"/>
-          </a:fillRef>
-          <a:effectRef idx="0">
-            <a:schemeClr val="accent1"/>
-          </a:effectRef>
-          <a:fontRef idx="minor">
-            <a:schemeClr val="lt1"/>
-          </a:fontRef>
-        </p:style>
-        <p:txBody>
-          <a:bodyPr rtlCol="0" anchor="ctr"/>
-          <a:lstStyle/>
-          <a:p>
-            <a:pPr algn="ctr"/>
-            <a:r>
-              <a:rPr lang="en-US" dirty="0">
-                <a:latin typeface="Arial" panose="020B0604020202020204" pitchFamily="34" charset="0"/>
-                <a:cs typeface="Arial" panose="020B0604020202020204" pitchFamily="34" charset="0"/>
-              </a:rPr>
-              <a:t>3</a:t>
-            </a:r>
-          </a:p>
-        </p:txBody>
-      </p:sp>
-    </p:spTree>
-    <p:extLst>
-      <p:ext uri="{BB962C8B-B14F-4D97-AF65-F5344CB8AC3E}">
-        <p14:creationId xmlns:p14="http://schemas.microsoft.com/office/powerpoint/2010/main" val="1781803377"/>
-      </p:ext>
-    </p:extLst>
-  </p:cSld>
-  <p:clrMapOvr>
-    <a:masterClrMapping/>
-  </p:clrMapOvr>
-</p:sld>
-</file>
-
-<file path=ppt/slides/slide14.xml><?xml version="1.0" encoding="utf-8"?>
-<p:sld xmlns:a="http://schemas.openxmlformats.org/drawingml/2006/main" xmlns:r="http://schemas.openxmlformats.org/officeDocument/2006/relationships" xmlns:p="http://schemas.openxmlformats.org/presentationml/2006/main">
-  <p:cSld>
-    <p:spTree>
-      <p:nvGrpSpPr>
-        <p:cNvPr id="1" name=""/>
-        <p:cNvGrpSpPr/>
-        <p:nvPr/>
-      </p:nvGrpSpPr>
-      <p:grpSpPr>
-        <a:xfrm>
-          <a:off x="0" y="0"/>
-          <a:ext cx="0" cy="0"/>
-          <a:chOff x="0" y="0"/>
-          <a:chExt cx="0" cy="0"/>
-        </a:xfrm>
-      </p:grpSpPr>
-      <p:pic>
-        <p:nvPicPr>
-          <p:cNvPr id="3075" name="Picture 3">
-            <a:extLst>
-              <a:ext uri="{FF2B5EF4-FFF2-40B4-BE49-F238E27FC236}">
-                <a16:creationId xmlns:a16="http://schemas.microsoft.com/office/drawing/2014/main" id="{596A6DE4-E488-F825-6236-82F142C0100B}"/>
-              </a:ext>
-            </a:extLst>
-          </p:cNvPr>
-          <p:cNvPicPr>
-            <a:picLocks noChangeAspect="1" noChangeArrowheads="1"/>
-          </p:cNvPicPr>
-          <p:nvPr/>
-        </p:nvPicPr>
-        <p:blipFill>
-          <a:blip r:embed="rId2">
-            <a:extLst>
-              <a:ext uri="{28A0092B-C50C-407E-A947-70E740481C1C}">
-                <a14:useLocalDpi xmlns:a14="http://schemas.microsoft.com/office/drawing/2010/main" val="0"/>
-              </a:ext>
-            </a:extLst>
-          </a:blip>
-          <a:srcRect/>
-          <a:stretch>
-            <a:fillRect/>
-          </a:stretch>
-        </p:blipFill>
-        <p:spPr bwMode="auto">
-          <a:xfrm>
-            <a:off x="9700755" y="3151476"/>
-            <a:ext cx="1822550" cy="3518736"/>
-          </a:xfrm>
-          <a:prstGeom prst="rect">
-            <a:avLst/>
-          </a:prstGeom>
-          <a:noFill/>
-          <a:ln>
-            <a:noFill/>
-          </a:ln>
-          <a:extLst>
-            <a:ext uri="{909E8E84-426E-40DD-AFC4-6F175D3DCCD1}">
-              <a14:hiddenFill xmlns:a14="http://schemas.microsoft.com/office/drawing/2010/main">
-                <a:solidFill>
-                  <a:srgbClr val="FFFFFF"/>
-                </a:solidFill>
-              </a14:hiddenFill>
-            </a:ext>
-            <a:ext uri="{91240B29-F687-4F45-9708-019B960494DF}">
-              <a14:hiddenLine xmlns:a14="http://schemas.microsoft.com/office/drawing/2010/main" w="9525">
-                <a:solidFill>
-                  <a:srgbClr val="000000"/>
-                </a:solidFill>
-                <a:miter lim="800000"/>
-                <a:headEnd/>
-                <a:tailEnd/>
-              </a14:hiddenLine>
-            </a:ext>
-          </a:extLst>
-        </p:spPr>
-      </p:pic>
-      <p:pic>
-        <p:nvPicPr>
-          <p:cNvPr id="3074" name="Picture 2">
-            <a:extLst>
-              <a:ext uri="{FF2B5EF4-FFF2-40B4-BE49-F238E27FC236}">
-                <a16:creationId xmlns:a16="http://schemas.microsoft.com/office/drawing/2014/main" id="{99700B93-5F90-F6B6-8B49-48F45AF7FE24}"/>
-              </a:ext>
-            </a:extLst>
-          </p:cNvPr>
-          <p:cNvPicPr>
-            <a:picLocks noChangeAspect="1" noChangeArrowheads="1"/>
-          </p:cNvPicPr>
-          <p:nvPr/>
-        </p:nvPicPr>
-        <p:blipFill rotWithShape="1">
-          <a:blip r:embed="rId3">
-            <a:extLst>
-              <a:ext uri="{28A0092B-C50C-407E-A947-70E740481C1C}">
-                <a14:useLocalDpi xmlns:a14="http://schemas.microsoft.com/office/drawing/2010/main" val="0"/>
-              </a:ext>
-            </a:extLst>
-          </a:blip>
-          <a:srcRect t="20231" b="10843"/>
-          <a:stretch/>
-        </p:blipFill>
-        <p:spPr bwMode="auto">
-          <a:xfrm>
-            <a:off x="4194246" y="4772582"/>
-            <a:ext cx="2831299" cy="1996598"/>
-          </a:xfrm>
-          <a:prstGeom prst="rect">
-            <a:avLst/>
-          </a:prstGeom>
-          <a:noFill/>
-          <a:ln>
-            <a:noFill/>
-          </a:ln>
-          <a:extLst>
-            <a:ext uri="{909E8E84-426E-40DD-AFC4-6F175D3DCCD1}">
-              <a14:hiddenFill xmlns:a14="http://schemas.microsoft.com/office/drawing/2010/main">
-                <a:solidFill>
-                  <a:srgbClr val="FFFFFF"/>
-                </a:solidFill>
-              </a14:hiddenFill>
-            </a:ext>
-            <a:ext uri="{91240B29-F687-4F45-9708-019B960494DF}">
-              <a14:hiddenLine xmlns:a14="http://schemas.microsoft.com/office/drawing/2010/main" w="9525">
-                <a:solidFill>
-                  <a:srgbClr val="000000"/>
-                </a:solidFill>
-                <a:miter lim="800000"/>
-                <a:headEnd/>
-                <a:tailEnd/>
-              </a14:hiddenLine>
-            </a:ext>
-          </a:extLst>
-        </p:spPr>
-      </p:pic>
-      <p:pic>
-        <p:nvPicPr>
-          <p:cNvPr id="3" name="Picture 3">
-            <a:extLst>
-              <a:ext uri="{FF2B5EF4-FFF2-40B4-BE49-F238E27FC236}">
-                <a16:creationId xmlns:a16="http://schemas.microsoft.com/office/drawing/2014/main" id="{4788438A-6990-3F03-1F70-BDC03991C8C7}"/>
-              </a:ext>
-            </a:extLst>
-          </p:cNvPr>
-          <p:cNvPicPr>
-            <a:picLocks noChangeAspect="1" noChangeArrowheads="1"/>
-          </p:cNvPicPr>
-          <p:nvPr/>
-        </p:nvPicPr>
-        <p:blipFill rotWithShape="1">
-          <a:blip r:embed="rId4">
-            <a:extLst>
-              <a:ext uri="{28A0092B-C50C-407E-A947-70E740481C1C}">
-                <a14:useLocalDpi xmlns:a14="http://schemas.microsoft.com/office/drawing/2010/main" val="0"/>
-              </a:ext>
-            </a:extLst>
-          </a:blip>
-          <a:srcRect t="12478"/>
-          <a:stretch/>
-        </p:blipFill>
-        <p:spPr bwMode="auto">
-          <a:xfrm>
-            <a:off x="452828" y="4811234"/>
-            <a:ext cx="2453300" cy="1858978"/>
-          </a:xfrm>
-          <a:prstGeom prst="rect">
-            <a:avLst/>
-          </a:prstGeom>
-          <a:noFill/>
-          <a:ln>
-            <a:noFill/>
-          </a:ln>
-          <a:extLst>
-            <a:ext uri="{909E8E84-426E-40DD-AFC4-6F175D3DCCD1}">
-              <a14:hiddenFill xmlns:a14="http://schemas.microsoft.com/office/drawing/2010/main">
-                <a:solidFill>
-                  <a:srgbClr val="FFFFFF"/>
-                </a:solidFill>
-              </a14:hiddenFill>
-            </a:ext>
-            <a:ext uri="{91240B29-F687-4F45-9708-019B960494DF}">
-              <a14:hiddenLine xmlns:a14="http://schemas.microsoft.com/office/drawing/2010/main" w="9525">
-                <a:solidFill>
-                  <a:srgbClr val="000000"/>
-                </a:solidFill>
-                <a:miter lim="800000"/>
-                <a:headEnd/>
-                <a:tailEnd/>
-              </a14:hiddenLine>
-            </a:ext>
-          </a:extLst>
-        </p:spPr>
-      </p:pic>
-      <p:sp>
-        <p:nvSpPr>
-          <p:cNvPr id="2" name="Title 1">
-            <a:extLst>
-              <a:ext uri="{FF2B5EF4-FFF2-40B4-BE49-F238E27FC236}">
-                <a16:creationId xmlns:a16="http://schemas.microsoft.com/office/drawing/2014/main" id="{0046426E-F6F6-4A7C-9181-8C3090996261}"/>
-              </a:ext>
-            </a:extLst>
-          </p:cNvPr>
-          <p:cNvSpPr>
-            <a:spLocks noGrp="1"/>
-          </p:cNvSpPr>
-          <p:nvPr>
-            <p:ph type="title"/>
-          </p:nvPr>
-        </p:nvSpPr>
-        <p:spPr>
-          <a:xfrm>
-            <a:off x="561358" y="552762"/>
-            <a:ext cx="10961947" cy="802250"/>
-          </a:xfrm>
-        </p:spPr>
-        <p:txBody>
-          <a:bodyPr/>
-          <a:lstStyle/>
-          <a:p>
-            <a:r>
-              <a:rPr lang="en-US" sz="4400" dirty="0"/>
-              <a:t>How to Use Field Maps </a:t>
-            </a:r>
-            <a:r>
-              <a:rPr lang="en-US" sz="3200" dirty="0"/>
-              <a:t>(In the Field)</a:t>
-            </a:r>
-            <a:endParaRPr lang="en-US" sz="3200" dirty="0">
-              <a:solidFill>
-                <a:schemeClr val="accent3">
-                  <a:lumMod val="60000"/>
-                  <a:lumOff val="40000"/>
-                </a:schemeClr>
-              </a:solidFill>
-            </a:endParaRPr>
-          </a:p>
-        </p:txBody>
-      </p:sp>
-      <p:sp>
-        <p:nvSpPr>
-          <p:cNvPr id="5" name="Content Placeholder 5">
-            <a:extLst>
-              <a:ext uri="{FF2B5EF4-FFF2-40B4-BE49-F238E27FC236}">
-                <a16:creationId xmlns:a16="http://schemas.microsoft.com/office/drawing/2014/main" id="{0E19797D-8A74-F7A2-B94C-8687111B4B42}"/>
-              </a:ext>
-            </a:extLst>
-          </p:cNvPr>
-          <p:cNvSpPr txBox="1">
-            <a:spLocks/>
-          </p:cNvSpPr>
-          <p:nvPr/>
-        </p:nvSpPr>
-        <p:spPr>
-          <a:xfrm>
-            <a:off x="561358" y="1460740"/>
-            <a:ext cx="9139397" cy="4204413"/>
-          </a:xfrm>
-          <a:prstGeom prst="rect">
-            <a:avLst/>
-          </a:prstGeom>
-        </p:spPr>
-        <p:txBody>
-          <a:bodyPr vert="horz" wrap="square" lIns="0" tIns="0" rIns="0" bIns="0" rtlCol="0" anchor="t" anchorCtr="0">
-            <a:noAutofit/>
-          </a:bodyPr>
-          <a:lstStyle>
-            <a:lvl1pPr marL="228600" indent="-228600" algn="l" defTabSz="914400" rtl="0" eaLnBrk="1" latinLnBrk="0" hangingPunct="1">
-              <a:lnSpc>
-                <a:spcPct val="110000"/>
-              </a:lnSpc>
-              <a:spcBef>
-                <a:spcPts val="1000"/>
-              </a:spcBef>
-              <a:spcAft>
-                <a:spcPts val="800"/>
-              </a:spcAft>
-              <a:buFont typeface="Arial" panose="020B0604020202020204" pitchFamily="34" charset="0"/>
-              <a:buNone/>
-              <a:defRPr sz="2000" kern="1200">
-                <a:solidFill>
-                  <a:schemeClr val="tx1">
-                    <a:alpha val="60000"/>
-                  </a:schemeClr>
-                </a:solidFill>
-                <a:latin typeface="+mn-lt"/>
-                <a:ea typeface="+mn-ea"/>
-                <a:cs typeface="+mn-cs"/>
-              </a:defRPr>
-            </a:lvl1pPr>
-            <a:lvl2pPr marL="685800" indent="-228600" algn="l" defTabSz="914400" rtl="0" eaLnBrk="1" latinLnBrk="0" hangingPunct="1">
-              <a:lnSpc>
-                <a:spcPct val="110000"/>
-              </a:lnSpc>
-              <a:spcBef>
-                <a:spcPts val="500"/>
-              </a:spcBef>
-              <a:spcAft>
-                <a:spcPts val="800"/>
-              </a:spcAft>
-              <a:buFont typeface="Arial" panose="020B0604020202020204" pitchFamily="34" charset="0"/>
-              <a:buChar char="•"/>
-              <a:defRPr sz="1400" kern="1200">
-                <a:solidFill>
-                  <a:schemeClr val="tx1">
-                    <a:alpha val="60000"/>
-                  </a:schemeClr>
-                </a:solidFill>
-                <a:latin typeface="+mn-lt"/>
-                <a:ea typeface="+mn-ea"/>
-                <a:cs typeface="+mn-cs"/>
-              </a:defRPr>
-            </a:lvl2pPr>
-            <a:lvl3pPr marL="1143000" indent="-228600" algn="l" defTabSz="914400" rtl="0" eaLnBrk="1" latinLnBrk="0" hangingPunct="1">
-              <a:lnSpc>
-                <a:spcPct val="110000"/>
-              </a:lnSpc>
-              <a:spcBef>
-                <a:spcPts val="500"/>
-              </a:spcBef>
-              <a:spcAft>
-                <a:spcPts val="800"/>
-              </a:spcAft>
-              <a:buFont typeface="Arial" panose="020B0604020202020204" pitchFamily="34" charset="0"/>
-              <a:buChar char="•"/>
-              <a:defRPr sz="1400" kern="1200">
-                <a:solidFill>
-                  <a:schemeClr val="tx1">
-                    <a:alpha val="60000"/>
-                  </a:schemeClr>
-                </a:solidFill>
-                <a:latin typeface="+mn-lt"/>
-                <a:ea typeface="+mn-ea"/>
-                <a:cs typeface="+mn-cs"/>
-              </a:defRPr>
-            </a:lvl3pPr>
-            <a:lvl4pPr marL="1600200" indent="-228600" algn="l" defTabSz="914400" rtl="0" eaLnBrk="1" latinLnBrk="0" hangingPunct="1">
-              <a:lnSpc>
-                <a:spcPct val="110000"/>
-              </a:lnSpc>
-              <a:spcBef>
-                <a:spcPts val="500"/>
-              </a:spcBef>
-              <a:spcAft>
-                <a:spcPts val="800"/>
-              </a:spcAft>
-              <a:buFont typeface="Arial" panose="020B0604020202020204" pitchFamily="34" charset="0"/>
-              <a:buChar char="•"/>
-              <a:defRPr sz="1400" kern="1200">
-                <a:solidFill>
-                  <a:schemeClr val="tx1">
-                    <a:alpha val="60000"/>
-                  </a:schemeClr>
-                </a:solidFill>
-                <a:latin typeface="+mn-lt"/>
-                <a:ea typeface="+mn-ea"/>
-                <a:cs typeface="+mn-cs"/>
-              </a:defRPr>
-            </a:lvl4pPr>
-            <a:lvl5pPr marL="2057400" indent="-228600" algn="l" defTabSz="914400" rtl="0" eaLnBrk="1" latinLnBrk="0" hangingPunct="1">
-              <a:lnSpc>
-                <a:spcPct val="110000"/>
-              </a:lnSpc>
-              <a:spcBef>
-                <a:spcPts val="500"/>
-              </a:spcBef>
-              <a:spcAft>
-                <a:spcPts val="800"/>
-              </a:spcAft>
-              <a:buFont typeface="Arial" panose="020B0604020202020204" pitchFamily="34" charset="0"/>
-              <a:buChar char="•"/>
-              <a:defRPr sz="1400" kern="1200">
-                <a:solidFill>
-                  <a:schemeClr val="tx1">
-                    <a:alpha val="60000"/>
-                  </a:schemeClr>
-                </a:solidFill>
-                <a:latin typeface="+mn-lt"/>
-                <a:ea typeface="+mn-ea"/>
-                <a:cs typeface="+mn-cs"/>
-              </a:defRPr>
-            </a:lvl5pPr>
-            <a:lvl6pPr marL="2514600" indent="-228600" algn="l" defTabSz="914400" rtl="0" eaLnBrk="1" latinLnBrk="0" hangingPunct="1">
-              <a:lnSpc>
-                <a:spcPct val="90000"/>
-              </a:lnSpc>
-              <a:spcBef>
-                <a:spcPts val="500"/>
-              </a:spcBef>
-              <a:buFont typeface="Arial" panose="020B0604020202020204" pitchFamily="34" charset="0"/>
-              <a:buChar char="•"/>
-              <a:defRPr sz="1800" kern="1200">
-                <a:solidFill>
-                  <a:schemeClr val="tx1"/>
-                </a:solidFill>
-                <a:latin typeface="+mn-lt"/>
-                <a:ea typeface="+mn-ea"/>
-                <a:cs typeface="+mn-cs"/>
-              </a:defRPr>
-            </a:lvl6pPr>
-            <a:lvl7pPr marL="2971800" indent="-228600" algn="l" defTabSz="914400" rtl="0" eaLnBrk="1" latinLnBrk="0" hangingPunct="1">
-              <a:lnSpc>
-                <a:spcPct val="90000"/>
-              </a:lnSpc>
-              <a:spcBef>
-                <a:spcPts val="500"/>
-              </a:spcBef>
-              <a:buFont typeface="Arial" panose="020B0604020202020204" pitchFamily="34" charset="0"/>
-              <a:buChar char="•"/>
-              <a:defRPr sz="1800" kern="1200">
-                <a:solidFill>
-                  <a:schemeClr val="tx1"/>
-                </a:solidFill>
-                <a:latin typeface="+mn-lt"/>
-                <a:ea typeface="+mn-ea"/>
-                <a:cs typeface="+mn-cs"/>
-              </a:defRPr>
-            </a:lvl7pPr>
-            <a:lvl8pPr marL="3429000" indent="-228600" algn="l" defTabSz="914400" rtl="0" eaLnBrk="1" latinLnBrk="0" hangingPunct="1">
-              <a:lnSpc>
-                <a:spcPct val="90000"/>
-              </a:lnSpc>
-              <a:spcBef>
-                <a:spcPts val="500"/>
-              </a:spcBef>
-              <a:buFont typeface="Arial" panose="020B0604020202020204" pitchFamily="34" charset="0"/>
-              <a:buChar char="•"/>
-              <a:defRPr sz="1800" kern="1200">
-                <a:solidFill>
-                  <a:schemeClr val="tx1"/>
-                </a:solidFill>
-                <a:latin typeface="+mn-lt"/>
-                <a:ea typeface="+mn-ea"/>
-                <a:cs typeface="+mn-cs"/>
-              </a:defRPr>
-            </a:lvl8pPr>
-            <a:lvl9pPr marL="3886200" indent="-228600" algn="l" defTabSz="914400" rtl="0" eaLnBrk="1" latinLnBrk="0" hangingPunct="1">
-              <a:lnSpc>
-                <a:spcPct val="90000"/>
-              </a:lnSpc>
-              <a:spcBef>
-                <a:spcPts val="500"/>
-              </a:spcBef>
-              <a:buFont typeface="Arial" panose="020B0604020202020204" pitchFamily="34" charset="0"/>
-              <a:buChar char="•"/>
-              <a:defRPr sz="1800" kern="1200">
-                <a:solidFill>
-                  <a:schemeClr val="tx1"/>
-                </a:solidFill>
-                <a:latin typeface="+mn-lt"/>
-                <a:ea typeface="+mn-ea"/>
-                <a:cs typeface="+mn-cs"/>
-              </a:defRPr>
-            </a:lvl9pPr>
-          </a:lstStyle>
-          <a:p>
-            <a:pPr marL="0" indent="0">
-              <a:spcAft>
-                <a:spcPts val="0"/>
-              </a:spcAft>
-            </a:pPr>
-            <a:r>
-              <a:rPr lang="en-US" sz="1800" i="1" dirty="0">
-                <a:latin typeface="Arial" panose="020B0604020202020204" pitchFamily="34" charset="0"/>
-                <a:ea typeface="+mn-lt"/>
-                <a:cs typeface="Arial" panose="020B0604020202020204" pitchFamily="34" charset="0"/>
-              </a:rPr>
-              <a:t>This workflow will be completed while the fieldworker is in the field.</a:t>
-            </a:r>
-            <a:endParaRPr lang="en-US" sz="1800" dirty="0">
-              <a:latin typeface="Arial" panose="020B0604020202020204" pitchFamily="34" charset="0"/>
-              <a:ea typeface="+mn-lt"/>
-              <a:cs typeface="Arial" panose="020B0604020202020204" pitchFamily="34" charset="0"/>
-            </a:endParaRPr>
-          </a:p>
-          <a:p>
-            <a:pPr marL="457200" indent="-457200">
-              <a:spcAft>
-                <a:spcPts val="0"/>
-              </a:spcAft>
-              <a:buFont typeface="Arial" panose="020B0604020202020204" pitchFamily="34" charset="0"/>
-              <a:buAutoNum type="arabicPeriod"/>
-            </a:pPr>
-            <a:r>
-              <a:rPr lang="en-US" sz="1800" dirty="0">
-                <a:latin typeface="Arial" panose="020B0604020202020204" pitchFamily="34" charset="0"/>
-                <a:ea typeface="+mn-lt"/>
-                <a:cs typeface="Arial" panose="020B0604020202020204" pitchFamily="34" charset="0"/>
-              </a:rPr>
-              <a:t>Open the Field Maps application on your mobile device</a:t>
-            </a:r>
-          </a:p>
-          <a:p>
-            <a:pPr marL="457200" indent="-457200">
-              <a:spcAft>
-                <a:spcPts val="0"/>
-              </a:spcAft>
-              <a:buFont typeface="Arial" panose="020B0604020202020204" pitchFamily="34" charset="0"/>
-              <a:buAutoNum type="arabicPeriod"/>
-            </a:pPr>
-            <a:r>
-              <a:rPr lang="en-US" sz="1800" dirty="0">
-                <a:latin typeface="Arial" panose="020B0604020202020204" pitchFamily="34" charset="0"/>
-                <a:ea typeface="+mn-lt"/>
-                <a:cs typeface="Arial" panose="020B0604020202020204" pitchFamily="34" charset="0"/>
-              </a:rPr>
-              <a:t>Open the map called ‘Hydrologic Monitoring Field Collection (Field Maps)’</a:t>
-            </a:r>
-          </a:p>
-          <a:p>
-            <a:pPr marL="457200" indent="-457200">
-              <a:spcAft>
-                <a:spcPts val="0"/>
-              </a:spcAft>
-              <a:buFont typeface="Arial" panose="020B0604020202020204" pitchFamily="34" charset="0"/>
-              <a:buAutoNum type="arabicPeriod"/>
-            </a:pPr>
-            <a:r>
-              <a:rPr lang="en-US" sz="1800" dirty="0">
-                <a:latin typeface="Arial" panose="020B0604020202020204" pitchFamily="34" charset="0"/>
-                <a:ea typeface="+mn-lt"/>
-                <a:cs typeface="Arial" panose="020B0604020202020204" pitchFamily="34" charset="0"/>
-              </a:rPr>
-              <a:t>Select the ‘Online Map’ if you have signal connection, otherwise if your device is offline use the option ‘On Device’</a:t>
-            </a:r>
-          </a:p>
-          <a:p>
-            <a:pPr marL="457200" indent="-457200">
-              <a:spcAft>
-                <a:spcPts val="0"/>
-              </a:spcAft>
-              <a:buFont typeface="Arial" panose="020B0604020202020204" pitchFamily="34" charset="0"/>
-              <a:buAutoNum type="arabicPeriod"/>
-            </a:pPr>
-            <a:r>
-              <a:rPr lang="en-US" sz="1800" dirty="0">
-                <a:latin typeface="Arial" panose="020B0604020202020204" pitchFamily="34" charset="0"/>
-                <a:ea typeface="+mn-lt"/>
-                <a:cs typeface="Arial" panose="020B0604020202020204" pitchFamily="34" charset="0"/>
-              </a:rPr>
-              <a:t>Once the map opens, zoom into the location of interest on the map and select the point</a:t>
-            </a:r>
-          </a:p>
-          <a:p>
-            <a:pPr marL="457200" indent="-457200">
-              <a:spcAft>
-                <a:spcPts val="0"/>
-              </a:spcAft>
-              <a:buFont typeface="Arial" panose="020B0604020202020204" pitchFamily="34" charset="0"/>
-              <a:buAutoNum type="arabicPeriod"/>
-            </a:pPr>
-            <a:r>
-              <a:rPr lang="en-US" sz="1800" dirty="0">
-                <a:latin typeface="Arial" panose="020B0604020202020204" pitchFamily="34" charset="0"/>
-                <a:ea typeface="+mn-lt"/>
-                <a:cs typeface="Arial" panose="020B0604020202020204" pitchFamily="34" charset="0"/>
-              </a:rPr>
-              <a:t>View any historical field visits, Measuring Point photos </a:t>
-            </a:r>
-            <a:r>
-              <a:rPr lang="en-US" sz="1800" dirty="0" err="1">
-                <a:latin typeface="Arial" panose="020B0604020202020204" pitchFamily="34" charset="0"/>
-                <a:ea typeface="+mn-lt"/>
-                <a:cs typeface="Arial" panose="020B0604020202020204" pitchFamily="34" charset="0"/>
-              </a:rPr>
-              <a:t>etc</a:t>
-            </a:r>
-            <a:endParaRPr lang="en-US" sz="1800" dirty="0">
-              <a:latin typeface="Arial" panose="020B0604020202020204" pitchFamily="34" charset="0"/>
-              <a:ea typeface="+mn-lt"/>
-              <a:cs typeface="Arial" panose="020B0604020202020204" pitchFamily="34" charset="0"/>
-            </a:endParaRPr>
-          </a:p>
-        </p:txBody>
-      </p:sp>
-      <p:sp>
-        <p:nvSpPr>
-          <p:cNvPr id="29" name="Flowchart: Connector 28">
-            <a:extLst>
-              <a:ext uri="{FF2B5EF4-FFF2-40B4-BE49-F238E27FC236}">
-                <a16:creationId xmlns:a16="http://schemas.microsoft.com/office/drawing/2014/main" id="{3393BEA2-4704-4A86-B97D-18BC2A158787}"/>
-              </a:ext>
-            </a:extLst>
-          </p:cNvPr>
-          <p:cNvSpPr/>
-          <p:nvPr/>
-        </p:nvSpPr>
-        <p:spPr>
-          <a:xfrm>
-            <a:off x="207763" y="4689410"/>
-            <a:ext cx="353595" cy="353595"/>
-          </a:xfrm>
-          <a:prstGeom prst="flowChartConnector">
-            <a:avLst/>
-          </a:prstGeom>
-          <a:solidFill>
-            <a:srgbClr val="FF0000"/>
-          </a:solidFill>
-        </p:spPr>
-        <p:style>
-          <a:lnRef idx="2">
-            <a:schemeClr val="accent1">
-              <a:shade val="15000"/>
-            </a:schemeClr>
-          </a:lnRef>
-          <a:fillRef idx="1">
-            <a:schemeClr val="accent1"/>
-          </a:fillRef>
-          <a:effectRef idx="0">
-            <a:schemeClr val="accent1"/>
-          </a:effectRef>
-          <a:fontRef idx="minor">
-            <a:schemeClr val="lt1"/>
-          </a:fontRef>
-        </p:style>
-        <p:txBody>
-          <a:bodyPr rtlCol="0" anchor="ctr"/>
-          <a:lstStyle/>
-          <a:p>
-            <a:pPr algn="ctr"/>
-            <a:r>
-              <a:rPr lang="en-US" dirty="0">
-                <a:latin typeface="Arial" panose="020B0604020202020204" pitchFamily="34" charset="0"/>
-                <a:cs typeface="Arial" panose="020B0604020202020204" pitchFamily="34" charset="0"/>
-              </a:rPr>
-              <a:t>2</a:t>
-            </a:r>
-          </a:p>
-        </p:txBody>
-      </p:sp>
-      <p:sp>
-        <p:nvSpPr>
-          <p:cNvPr id="32" name="Flowchart: Connector 31">
-            <a:extLst>
-              <a:ext uri="{FF2B5EF4-FFF2-40B4-BE49-F238E27FC236}">
-                <a16:creationId xmlns:a16="http://schemas.microsoft.com/office/drawing/2014/main" id="{F3FE75FB-A550-7B77-8141-7E80B6A7E34A}"/>
-              </a:ext>
-            </a:extLst>
-          </p:cNvPr>
-          <p:cNvSpPr/>
-          <p:nvPr/>
-        </p:nvSpPr>
-        <p:spPr>
-          <a:xfrm>
-            <a:off x="9455690" y="2974678"/>
-            <a:ext cx="353595" cy="353595"/>
-          </a:xfrm>
-          <a:prstGeom prst="flowChartConnector">
-            <a:avLst/>
-          </a:prstGeom>
-          <a:solidFill>
-            <a:srgbClr val="FF0000"/>
-          </a:solidFill>
-        </p:spPr>
-        <p:style>
-          <a:lnRef idx="2">
-            <a:schemeClr val="accent1">
-              <a:shade val="15000"/>
-            </a:schemeClr>
-          </a:lnRef>
-          <a:fillRef idx="1">
-            <a:schemeClr val="accent1"/>
-          </a:fillRef>
-          <a:effectRef idx="0">
-            <a:schemeClr val="accent1"/>
-          </a:effectRef>
-          <a:fontRef idx="minor">
-            <a:schemeClr val="lt1"/>
-          </a:fontRef>
-        </p:style>
-        <p:txBody>
-          <a:bodyPr rtlCol="0" anchor="ctr"/>
-          <a:lstStyle/>
-          <a:p>
-            <a:pPr algn="ctr"/>
-            <a:r>
-              <a:rPr lang="en-US" dirty="0">
-                <a:latin typeface="Arial" panose="020B0604020202020204" pitchFamily="34" charset="0"/>
-                <a:cs typeface="Arial" panose="020B0604020202020204" pitchFamily="34" charset="0"/>
-              </a:rPr>
-              <a:t>4</a:t>
-            </a:r>
-          </a:p>
-        </p:txBody>
-      </p:sp>
-      <p:sp>
-        <p:nvSpPr>
-          <p:cNvPr id="30" name="Flowchart: Connector 29">
-            <a:extLst>
-              <a:ext uri="{FF2B5EF4-FFF2-40B4-BE49-F238E27FC236}">
-                <a16:creationId xmlns:a16="http://schemas.microsoft.com/office/drawing/2014/main" id="{4B64C761-AB9B-5C55-053D-2B2D06DCC207}"/>
-              </a:ext>
-            </a:extLst>
-          </p:cNvPr>
-          <p:cNvSpPr/>
-          <p:nvPr/>
-        </p:nvSpPr>
-        <p:spPr>
-          <a:xfrm>
-            <a:off x="3963184" y="4634436"/>
-            <a:ext cx="353595" cy="353595"/>
-          </a:xfrm>
-          <a:prstGeom prst="flowChartConnector">
-            <a:avLst/>
-          </a:prstGeom>
-          <a:solidFill>
-            <a:srgbClr val="FF0000"/>
-          </a:solidFill>
-        </p:spPr>
-        <p:style>
-          <a:lnRef idx="2">
-            <a:schemeClr val="accent1">
-              <a:shade val="15000"/>
-            </a:schemeClr>
-          </a:lnRef>
-          <a:fillRef idx="1">
-            <a:schemeClr val="accent1"/>
-          </a:fillRef>
-          <a:effectRef idx="0">
-            <a:schemeClr val="accent1"/>
-          </a:effectRef>
-          <a:fontRef idx="minor">
-            <a:schemeClr val="lt1"/>
-          </a:fontRef>
-        </p:style>
-        <p:txBody>
-          <a:bodyPr rtlCol="0" anchor="ctr"/>
-          <a:lstStyle/>
-          <a:p>
-            <a:pPr algn="ctr"/>
-            <a:r>
-              <a:rPr lang="en-US" dirty="0">
-                <a:latin typeface="Arial" panose="020B0604020202020204" pitchFamily="34" charset="0"/>
-                <a:cs typeface="Arial" panose="020B0604020202020204" pitchFamily="34" charset="0"/>
-              </a:rPr>
-              <a:t>3</a:t>
-            </a:r>
-          </a:p>
-        </p:txBody>
-      </p:sp>
-      <p:cxnSp>
-        <p:nvCxnSpPr>
-          <p:cNvPr id="6" name="Straight Arrow Connector 5">
-            <a:extLst>
-              <a:ext uri="{FF2B5EF4-FFF2-40B4-BE49-F238E27FC236}">
-                <a16:creationId xmlns:a16="http://schemas.microsoft.com/office/drawing/2014/main" id="{53E24026-2319-7F36-3A8E-2878282AB428}"/>
-              </a:ext>
-            </a:extLst>
-          </p:cNvPr>
-          <p:cNvCxnSpPr>
-            <a:cxnSpLocks/>
-          </p:cNvCxnSpPr>
-          <p:nvPr/>
-        </p:nvCxnSpPr>
-        <p:spPr>
-          <a:xfrm flipH="1">
-            <a:off x="2762864" y="6289726"/>
-            <a:ext cx="517489" cy="0"/>
-          </a:xfrm>
-          <a:prstGeom prst="straightConnector1">
-            <a:avLst/>
-          </a:prstGeom>
-          <a:ln w="57150">
-            <a:solidFill>
-              <a:srgbClr val="FF0000"/>
-            </a:solidFill>
-            <a:tailEnd type="triangle"/>
-          </a:ln>
-        </p:spPr>
-        <p:style>
-          <a:lnRef idx="1">
-            <a:schemeClr val="accent1"/>
-          </a:lnRef>
-          <a:fillRef idx="0">
-            <a:schemeClr val="accent1"/>
-          </a:fillRef>
-          <a:effectRef idx="0">
-            <a:schemeClr val="accent1"/>
-          </a:effectRef>
-          <a:fontRef idx="minor">
-            <a:schemeClr val="tx1"/>
-          </a:fontRef>
-        </p:style>
-      </p:cxnSp>
-      <p:cxnSp>
-        <p:nvCxnSpPr>
-          <p:cNvPr id="20" name="Straight Arrow Connector 19">
-            <a:extLst>
-              <a:ext uri="{FF2B5EF4-FFF2-40B4-BE49-F238E27FC236}">
-                <a16:creationId xmlns:a16="http://schemas.microsoft.com/office/drawing/2014/main" id="{2D4E0721-D009-2C83-9ED4-C65558DFD962}"/>
-              </a:ext>
-            </a:extLst>
-          </p:cNvPr>
-          <p:cNvCxnSpPr>
-            <a:cxnSpLocks/>
-          </p:cNvCxnSpPr>
-          <p:nvPr/>
-        </p:nvCxnSpPr>
-        <p:spPr>
-          <a:xfrm>
-            <a:off x="9948455" y="4189295"/>
-            <a:ext cx="467813" cy="0"/>
-          </a:xfrm>
-          <a:prstGeom prst="straightConnector1">
-            <a:avLst/>
-          </a:prstGeom>
-          <a:ln w="57150">
-            <a:solidFill>
-              <a:srgbClr val="FF0000"/>
-            </a:solidFill>
-            <a:tailEnd type="triangle"/>
-          </a:ln>
-        </p:spPr>
-        <p:style>
-          <a:lnRef idx="1">
-            <a:schemeClr val="accent1"/>
-          </a:lnRef>
-          <a:fillRef idx="0">
-            <a:schemeClr val="accent1"/>
-          </a:fillRef>
-          <a:effectRef idx="0">
-            <a:schemeClr val="accent1"/>
-          </a:effectRef>
-          <a:fontRef idx="minor">
-            <a:schemeClr val="tx1"/>
-          </a:fontRef>
-        </p:style>
-      </p:cxnSp>
-    </p:spTree>
-    <p:extLst>
-      <p:ext uri="{BB962C8B-B14F-4D97-AF65-F5344CB8AC3E}">
-        <p14:creationId xmlns:p14="http://schemas.microsoft.com/office/powerpoint/2010/main" val="3264566659"/>
       </p:ext>
     </p:extLst>
   </p:cSld>
@@ -37191,6 +34254,15 @@
 </file>
 
 <file path=customXml/item1.xml><?xml version="1.0" encoding="utf-8"?>
+<?mso-contentType ?>
+<FormTemplates xmlns="http://schemas.microsoft.com/sharepoint/v3/contenttype/forms">
+  <Display>DocumentLibraryForm</Display>
+  <Edit>DocumentLibraryForm</Edit>
+  <New>DocumentLibraryForm</New>
+</FormTemplates>
+</file>
+
+<file path=customXml/item2.xml><?xml version="1.0" encoding="utf-8"?>
 <ct:contentTypeSchema xmlns:ct="http://schemas.microsoft.com/office/2006/metadata/contentType" xmlns:ma="http://schemas.microsoft.com/office/2006/metadata/properties/metaAttributes" ct:_="" ma:_="" ma:contentTypeName="Document" ma:contentTypeID="0x010100BE0EA4252DA4C44392747A616AA88B25" ma:contentTypeVersion="15" ma:contentTypeDescription="Create a new document." ma:contentTypeScope="" ma:versionID="fe6ef71d6c346ae31fda0586df2badae">
   <xsd:schema xmlns:xsd="http://www.w3.org/2001/XMLSchema" xmlns:xs="http://www.w3.org/2001/XMLSchema" xmlns:p="http://schemas.microsoft.com/office/2006/metadata/properties" xmlns:ns2="a37483bb-355d-4cde-a7e8-a7b4efd217ae" xmlns:ns3="dcdee733-fb76-4ecc-9fd9-c176319f5bd5" targetNamespace="http://schemas.microsoft.com/office/2006/metadata/properties" ma:root="true" ma:fieldsID="1b930b4465c725f12df9bf3c6bc1a927" ns2:_="" ns3:_="">
     <xsd:import namespace="a37483bb-355d-4cde-a7e8-a7b4efd217ae"/>
@@ -37427,15 +34499,6 @@
 </ct:contentTypeSchema>
 </file>
 
-<file path=customXml/item2.xml><?xml version="1.0" encoding="utf-8"?>
-<?mso-contentType ?>
-<FormTemplates xmlns="http://schemas.microsoft.com/sharepoint/v3/contenttype/forms">
-  <Display>DocumentLibraryForm</Display>
-  <Edit>DocumentLibraryForm</Edit>
-  <New>DocumentLibraryForm</New>
-</FormTemplates>
-</file>
-
 <file path=customXml/item3.xml><?xml version="1.0" encoding="utf-8"?>
 <p:properties xmlns:p="http://schemas.microsoft.com/office/2006/metadata/properties" xmlns:xsi="http://www.w3.org/2001/XMLSchema-instance" xmlns:pc="http://schemas.microsoft.com/office/infopath/2007/PartnerControls">
   <documentManagement>
@@ -37476,6 +34539,14 @@
 </file>
 
 <file path=customXml/itemProps1.xml><?xml version="1.0" encoding="utf-8"?>
+<ds:datastoreItem xmlns:ds="http://schemas.openxmlformats.org/officeDocument/2006/customXml" ds:itemID="{904751AB-E840-446F-8D49-E697067EC887}">
+  <ds:schemaRefs>
+    <ds:schemaRef ds:uri="http://schemas.microsoft.com/sharepoint/v3/contenttype/forms"/>
+  </ds:schemaRefs>
+</ds:datastoreItem>
+</file>
+
+<file path=customXml/itemProps2.xml><?xml version="1.0" encoding="utf-8"?>
 <ds:datastoreItem xmlns:ds="http://schemas.openxmlformats.org/officeDocument/2006/customXml" ds:itemID="{94560A0A-620D-4757-BDEF-5770E4172447}">
   <ds:schemaRefs>
     <ds:schemaRef ds:uri="a37483bb-355d-4cde-a7e8-a7b4efd217ae"/>
@@ -37490,14 +34561,6 @@
     <ds:schemaRef ds:uri="http://schemas.microsoft.com/office/infopath/2007/PartnerControls"/>
     <ds:schemaRef ds:uri="http://schemas.openxmlformats.org/package/2006/metadata/core-properties"/>
     <ds:schemaRef ds:uri="http://www.w3.org/2001/XMLSchema"/>
-  </ds:schemaRefs>
-</ds:datastoreItem>
-</file>
-
-<file path=customXml/itemProps2.xml><?xml version="1.0" encoding="utf-8"?>
-<ds:datastoreItem xmlns:ds="http://schemas.openxmlformats.org/officeDocument/2006/customXml" ds:itemID="{904751AB-E840-446F-8D49-E697067EC887}">
-  <ds:schemaRefs>
-    <ds:schemaRef ds:uri="http://schemas.microsoft.com/sharepoint/v3/contenttype/forms"/>
   </ds:schemaRefs>
 </ds:datastoreItem>
 </file>

</xml_diff>